<commit_message>
Correctly outputs loadings of all items for easier comparison
The Confirmatory Factor Analysis method does not work correctly since CFA does not converge. This means we don't have a metric to compare across the different number of factors and need to do it by hand. This fixes the EFA loadings so that we can compare all n.
</commit_message>
<xml_diff>
--- a/Analysis_explanation.pptx
+++ b/Analysis_explanation.pptx
@@ -18,12 +18,12 @@
     <p:sldId id="717" r:id="rId9"/>
     <p:sldId id="734" r:id="rId10"/>
     <p:sldId id="713" r:id="rId11"/>
-    <p:sldId id="719" r:id="rId12"/>
-    <p:sldId id="718" r:id="rId13"/>
-    <p:sldId id="720" r:id="rId14"/>
-    <p:sldId id="731" r:id="rId15"/>
-    <p:sldId id="733" r:id="rId16"/>
-    <p:sldId id="732" r:id="rId17"/>
+    <p:sldId id="718" r:id="rId12"/>
+    <p:sldId id="720" r:id="rId13"/>
+    <p:sldId id="731" r:id="rId14"/>
+    <p:sldId id="732" r:id="rId15"/>
+    <p:sldId id="735" r:id="rId16"/>
+    <p:sldId id="733" r:id="rId17"/>
     <p:sldId id="724" r:id="rId18"/>
     <p:sldId id="725" r:id="rId19"/>
     <p:sldId id="726" r:id="rId20"/>
@@ -174,12 +174,12 @@
             <p14:sldId id="717"/>
             <p14:sldId id="734"/>
             <p14:sldId id="713"/>
-            <p14:sldId id="719"/>
             <p14:sldId id="718"/>
             <p14:sldId id="720"/>
             <p14:sldId id="731"/>
+            <p14:sldId id="732"/>
+            <p14:sldId id="735"/>
             <p14:sldId id="733"/>
-            <p14:sldId id="732"/>
           </p14:sldIdLst>
         </p14:section>
         <p14:section name="S22 inverted questions" id="{1744F6FA-5B5E-4DF4-AE64-8534E8A40760}">
@@ -390,7 +390,7 @@
               <a:pPr>
                 <a:defRPr/>
               </a:pPr>
-              <a:t>1/4/2023</a:t>
+              <a:t>09-Jan-23</a:t>
             </a:fld>
             <a:endParaRPr lang="en-US" dirty="0"/>
           </a:p>
@@ -902,7 +902,7 @@
     </p:spTree>
     <p:extLst>
       <p:ext uri="{BB962C8B-B14F-4D97-AF65-F5344CB8AC3E}">
-        <p14:creationId xmlns:p14="http://schemas.microsoft.com/office/powerpoint/2010/main" val="4034527610"/>
+        <p14:creationId xmlns:p14="http://schemas.microsoft.com/office/powerpoint/2010/main" val="2695506180"/>
       </p:ext>
     </p:extLst>
   </p:cSld>
@@ -985,14 +985,14 @@
               </a:pPr>
               <a:t>11</a:t>
             </a:fld>
-            <a:endParaRPr lang="en-US"/>
+            <a:endParaRPr lang="en-US" dirty="0"/>
           </a:p>
         </p:txBody>
       </p:sp>
     </p:spTree>
     <p:extLst>
       <p:ext uri="{BB962C8B-B14F-4D97-AF65-F5344CB8AC3E}">
-        <p14:creationId xmlns:p14="http://schemas.microsoft.com/office/powerpoint/2010/main" val="2695506180"/>
+        <p14:creationId xmlns:p14="http://schemas.microsoft.com/office/powerpoint/2010/main" val="3653520506"/>
       </p:ext>
     </p:extLst>
   </p:cSld>
@@ -1082,7 +1082,7 @@
     </p:spTree>
     <p:extLst>
       <p:ext uri="{BB962C8B-B14F-4D97-AF65-F5344CB8AC3E}">
-        <p14:creationId xmlns:p14="http://schemas.microsoft.com/office/powerpoint/2010/main" val="3653520506"/>
+        <p14:creationId xmlns:p14="http://schemas.microsoft.com/office/powerpoint/2010/main" val="3907082443"/>
       </p:ext>
     </p:extLst>
   </p:cSld>
@@ -1172,7 +1172,7 @@
     </p:spTree>
     <p:extLst>
       <p:ext uri="{BB962C8B-B14F-4D97-AF65-F5344CB8AC3E}">
-        <p14:creationId xmlns:p14="http://schemas.microsoft.com/office/powerpoint/2010/main" val="61301143"/>
+        <p14:creationId xmlns:p14="http://schemas.microsoft.com/office/powerpoint/2010/main" val="697544805"/>
       </p:ext>
     </p:extLst>
   </p:cSld>
@@ -1262,7 +1262,7 @@
     </p:spTree>
     <p:extLst>
       <p:ext uri="{BB962C8B-B14F-4D97-AF65-F5344CB8AC3E}">
-        <p14:creationId xmlns:p14="http://schemas.microsoft.com/office/powerpoint/2010/main" val="3907082443"/>
+        <p14:creationId xmlns:p14="http://schemas.microsoft.com/office/powerpoint/2010/main" val="61301143"/>
       </p:ext>
     </p:extLst>
   </p:cSld>
@@ -2792,7 +2792,7 @@
     </p:spTree>
     <p:extLst>
       <p:ext uri="{BB962C8B-B14F-4D97-AF65-F5344CB8AC3E}">
-        <p14:creationId xmlns:p14="http://schemas.microsoft.com/office/powerpoint/2010/main" val="4168174246"/>
+        <p14:creationId xmlns:p14="http://schemas.microsoft.com/office/powerpoint/2010/main" val="4034527610"/>
       </p:ext>
     </p:extLst>
   </p:cSld>
@@ -6873,99 +6873,255 @@
             <a:spLocks noGrp="1"/>
           </p:cNvSpPr>
           <p:nvPr>
-            <p:ph sz="half" idx="1"/>
+            <p:ph idx="1"/>
           </p:nvPr>
         </p:nvSpPr>
         <p:spPr/>
         <p:txBody>
           <a:bodyPr>
-            <a:normAutofit/>
+            <a:normAutofit fontScale="62500" lnSpcReduction="20000"/>
           </a:bodyPr>
           <a:lstStyle/>
           <a:p>
             <a:r>
               <a:rPr lang="en-US" sz="2000" dirty="0"/>
-              <a:t>First produce eigenvalues for arbitrary number of factors</a:t>
-            </a:r>
+              <a:t>Follows algorithm described in Section II.A from Eaton et al 2019</a:t>
+            </a:r>
+          </a:p>
+          <a:p>
+            <a:pPr marL="857250" lvl="1" indent="-457200">
+              <a:buFont typeface="+mj-lt"/>
+              <a:buAutoNum type="arabicPeriod"/>
+            </a:pPr>
+            <a:r>
+              <a:rPr lang="en-US" sz="1600" dirty="0"/>
+              <a:t>Calculate the Kaiser-Meyer-Olkin (KMO) values for every item. If any items have a KMO below the cutoff value, then the item with the lowest value is removed and the step is repeated. KMO values above 0.6 are kept, though above 0.8 are preferred.</a:t>
+            </a:r>
+          </a:p>
+          <a:p>
+            <a:pPr marL="1257300" lvl="2" indent="-457200"/>
+            <a:r>
+              <a:rPr lang="en-US" sz="1200" dirty="0"/>
+              <a:t>KMO measures the suitability for factor analysis by estimating the proportion of variance among all observed variables</a:t>
+            </a:r>
+          </a:p>
+          <a:p>
+            <a:pPr marL="857250" lvl="1" indent="-457200">
+              <a:buFont typeface="+mj-lt"/>
+              <a:buAutoNum type="arabicPeriod"/>
+            </a:pPr>
+            <a:r>
+              <a:rPr lang="en-US" sz="1600" dirty="0"/>
+              <a:t>Check whether the items can be factored using Bartlett's test of sphericity. A low p-score indicates that factor analysis can be performed.</a:t>
+            </a:r>
+          </a:p>
+          <a:p>
+            <a:pPr marL="1257300" lvl="2" indent="-457200"/>
+            <a:r>
+              <a:rPr lang="en-US" sz="1200" dirty="0"/>
+              <a:t>Compares the correlation matrix to the identity matrix (checks whether there are correlations)</a:t>
+            </a:r>
+          </a:p>
+          <a:p>
+            <a:pPr marL="857250" lvl="1" indent="-457200">
+              <a:buFont typeface="+mj-lt"/>
+              <a:buAutoNum type="arabicPeriod"/>
+            </a:pPr>
+            <a:r>
+              <a:rPr lang="en-US" sz="1600" dirty="0"/>
+              <a:t>Calculate the EFA model using factoring and a specified number of factors.</a:t>
+            </a:r>
+          </a:p>
+          <a:p>
+            <a:pPr marL="857250" lvl="1" indent="-457200">
+              <a:buFont typeface="+mj-lt"/>
+              <a:buAutoNum type="arabicPeriod"/>
+            </a:pPr>
+            <a:r>
+              <a:rPr lang="en-US" sz="1600" dirty="0"/>
+              <a:t>Calculate the commonalities, which are the proportion of the item's variance explained by the factors. If any item is below the cutoff (&lt;0.2), then the item with the lowest value is dropped and then restart at Step 1.</a:t>
+            </a:r>
+          </a:p>
+          <a:p>
+            <a:pPr marL="857250" lvl="1" indent="-457200">
+              <a:buFont typeface="+mj-lt"/>
+              <a:buAutoNum type="arabicPeriod"/>
+            </a:pPr>
+            <a:r>
+              <a:rPr lang="en-US" sz="1600" dirty="0"/>
+              <a:t>Calculate the item loadings. If there are items that fail to load to any factor, then remove the item with the smallest max loading and then restart at Step 1.</a:t>
+            </a:r>
+          </a:p>
+          <a:p>
+            <a:pPr marL="857250" lvl="1" indent="-457200">
+              <a:buFont typeface="+mj-lt"/>
+              <a:buAutoNum type="arabicPeriod"/>
+            </a:pPr>
+            <a:r>
+              <a:rPr lang="en-US" sz="1600" dirty="0"/>
+              <a:t>Create a model for the CFA by placing each item onto the factor that contains the item's largest loading. If any items load equally onto more than one factor, then add to all factors where this is the case.</a:t>
+            </a:r>
+          </a:p>
+          <a:p>
+            <a:pPr marL="857250" lvl="1" indent="-457200">
+              <a:buFont typeface="+mj-lt"/>
+              <a:buAutoNum type="arabicPeriod"/>
+            </a:pPr>
+            <a:r>
+              <a:rPr lang="en-US" sz="1600" i="1" dirty="0"/>
+              <a:t>Fit this model using Confirmatory Factor Analysis and extract a fit statistic (Akaike information criterion, or similar) to be used as a comparison for the ideal number of factors.</a:t>
+            </a:r>
+          </a:p>
+          <a:p>
+            <a:pPr marL="857250" lvl="1" indent="-457200">
+              <a:buFont typeface="+mj-lt"/>
+              <a:buAutoNum type="arabicPeriod"/>
+            </a:pPr>
+            <a:r>
+              <a:rPr lang="en-US" sz="1600" dirty="0"/>
+              <a:t>Change the number of factors and repeat the above steps.</a:t>
+            </a:r>
+          </a:p>
+          <a:p>
+            <a:pPr marL="857250" lvl="1" indent="-457200">
+              <a:buFont typeface="+mj-lt"/>
+              <a:buAutoNum type="arabicPeriod"/>
+            </a:pPr>
+            <a:r>
+              <a:rPr lang="en-US" sz="1600" dirty="0"/>
+              <a:t>Plot the fit statistic vs the number of factors. The model with the local minimum index is the preferred model.</a:t>
+            </a:r>
+          </a:p>
+          <a:p>
+            <a:r>
+              <a:rPr lang="en-US" sz="2000" dirty="0"/>
+              <a:t>Outputs</a:t>
+            </a:r>
+            <a:endParaRPr lang="en-US" sz="1600" dirty="0"/>
           </a:p>
           <a:p>
             <a:pPr lvl="1"/>
             <a:r>
+              <a:rPr lang="en-US" sz="1600" dirty="0" err="1"/>
+              <a:t>SAGE_EFA_n</a:t>
+            </a:r>
+            <a:r>
               <a:rPr lang="en-US" sz="1600" dirty="0"/>
-              <a:t>Scree plot (SAGE_Scree.png)</a:t>
-            </a:r>
-          </a:p>
-          <a:p>
-            <a:r>
-              <a:rPr lang="en-US" sz="2000" dirty="0"/>
-              <a:t>Kaiser Criterion (ε&gt;1) to determine number of factors</a:t>
+              <a:t>=(2, 3,…).png</a:t>
             </a:r>
           </a:p>
           <a:p>
             <a:pPr lvl="1"/>
             <a:r>
               <a:rPr lang="en-US" sz="1600" dirty="0"/>
-              <a:t>6 or 7</a:t>
+              <a:t>SAGE_EFA_ 0.4_n=(2, 3,…).png to show significant factor correlations (&gt;0.4)</a:t>
             </a:r>
           </a:p>
           <a:p>
             <a:pPr lvl="1"/>
             <a:r>
               <a:rPr lang="en-US" sz="1600" dirty="0"/>
-              <a:t>(though Kouros and </a:t>
-            </a:r>
-            <a:r>
-              <a:rPr lang="en-US" sz="1600" dirty="0" err="1"/>
-              <a:t>Abrami</a:t>
-            </a:r>
+              <a:t>EFA_labels_n=(2,3,…).txt </a:t>
+            </a:r>
+          </a:p>
+          <a:p>
+            <a:pPr lvl="1"/>
             <a:r>
               <a:rPr lang="en-US" sz="1600" dirty="0"/>
-              <a:t> had ε&gt;2)</a:t>
-            </a:r>
-          </a:p>
-          <a:p>
-            <a:endParaRPr lang="en-US" sz="2000" dirty="0"/>
+              <a:t>fit_stats.png – plot of fit statistic vs number of factors</a:t>
+            </a:r>
+          </a:p>
+          <a:p>
+            <a:pPr lvl="1"/>
+            <a:endParaRPr lang="en-US" sz="1600" dirty="0"/>
           </a:p>
         </p:txBody>
       </p:sp>
-      <p:pic>
-        <p:nvPicPr>
-          <p:cNvPr id="4" name="Content Placeholder 3">
+      <p:sp>
+        <p:nvSpPr>
+          <p:cNvPr id="4" name="TextBox 3">
             <a:extLst>
               <a:ext uri="{FF2B5EF4-FFF2-40B4-BE49-F238E27FC236}">
-                <a16:creationId xmlns:a16="http://schemas.microsoft.com/office/drawing/2014/main" id="{04EBFFBC-7D22-4DD1-8BA1-382885C0FBAA}"/>
+                <a16:creationId xmlns:a16="http://schemas.microsoft.com/office/drawing/2014/main" id="{FAD2249D-D064-BC4E-AD43-150EA616652B}"/>
               </a:ext>
             </a:extLst>
           </p:cNvPr>
-          <p:cNvPicPr>
-            <a:picLocks noGrp="1" noChangeAspect="1"/>
-          </p:cNvPicPr>
-          <p:nvPr>
-            <p:ph sz="half" idx="2"/>
-          </p:nvPr>
-        </p:nvPicPr>
-        <p:blipFill>
-          <a:blip r:embed="rId3">
-            <a:extLst>
-              <a:ext uri="{28A0092B-C50C-407E-A947-70E740481C1C}">
-                <a14:useLocalDpi xmlns:a14="http://schemas.microsoft.com/office/drawing/2010/main" val="0"/>
-              </a:ext>
-            </a:extLst>
-          </a:blip>
-          <a:srcRect/>
-          <a:stretch/>
-        </p:blipFill>
+          <p:cNvSpPr txBox="1"/>
+          <p:nvPr/>
+        </p:nvSpPr>
         <p:spPr>
           <a:xfrm>
-            <a:off x="4648200" y="1562100"/>
-            <a:ext cx="4038600" cy="3028950"/>
+            <a:off x="6927" y="4804946"/>
+            <a:ext cx="8382000" cy="338554"/>
           </a:xfrm>
+          <a:prstGeom prst="rect">
+            <a:avLst/>
+          </a:prstGeom>
+          <a:noFill/>
         </p:spPr>
-      </p:pic>
+        <p:txBody>
+          <a:bodyPr wrap="square" rtlCol="0">
+            <a:spAutoFit/>
+          </a:bodyPr>
+          <a:lstStyle/>
+          <a:p>
+            <a:pPr algn="l"/>
+            <a:r>
+              <a:rPr lang="en-US" sz="800" b="0" i="0" dirty="0">
+                <a:effectLst/>
+                <a:latin typeface="Helvetica Neue"/>
+              </a:rPr>
+              <a:t>P. Eaton, K. Johnson, B. Frank, and S. Willoughby, </a:t>
+            </a:r>
+            <a:r>
+              <a:rPr lang="en-US" sz="800" b="0" i="1" dirty="0">
+                <a:effectLst/>
+                <a:latin typeface="Helvetica Neue"/>
+              </a:rPr>
+              <a:t>Classical test theory and item response theory comparison of the Brief Electricity and Magnetism Assessment and the Conceptual Survey of Electricity and Magnetism</a:t>
+            </a:r>
+            <a:r>
+              <a:rPr lang="en-US" sz="800" b="0" i="0" dirty="0">
+                <a:effectLst/>
+                <a:latin typeface="Helvetica Neue"/>
+              </a:rPr>
+              <a:t>, </a:t>
+            </a:r>
+            <a:r>
+              <a:rPr lang="en-US" sz="800" b="0" i="0" u="none" strike="noStrike" dirty="0">
+                <a:effectLst/>
+                <a:latin typeface="Helvetica Neue"/>
+              </a:rPr>
+              <a:t>Phys. Rev. Phys. Educ. Res. </a:t>
+            </a:r>
+            <a:r>
+              <a:rPr lang="en-US" sz="800" b="1" i="0" u="none" strike="noStrike" dirty="0">
+                <a:effectLst/>
+                <a:latin typeface="Helvetica Neue"/>
+              </a:rPr>
+              <a:t>15</a:t>
+            </a:r>
+            <a:r>
+              <a:rPr lang="en-US" sz="800" b="0" i="0" u="none" strike="noStrike" dirty="0">
+                <a:effectLst/>
+                <a:latin typeface="Helvetica Neue"/>
+              </a:rPr>
+              <a:t>, 010102 (2019)</a:t>
+            </a:r>
+            <a:r>
+              <a:rPr lang="en-US" sz="800" b="0" i="0" dirty="0">
+                <a:effectLst/>
+                <a:latin typeface="Helvetica Neue"/>
+              </a:rPr>
+              <a:t>.</a:t>
+            </a:r>
+          </a:p>
+        </p:txBody>
+      </p:sp>
     </p:spTree>
     <p:extLst>
       <p:ext uri="{BB962C8B-B14F-4D97-AF65-F5344CB8AC3E}">
-        <p14:creationId xmlns:p14="http://schemas.microsoft.com/office/powerpoint/2010/main" val="3497797232"/>
+        <p14:creationId xmlns:p14="http://schemas.microsoft.com/office/powerpoint/2010/main" val="3769119439"/>
       </p:ext>
     </p:extLst>
   </p:cSld>
@@ -6992,6 +7148,76 @@
           <a:chExt cx="0" cy="0"/>
         </a:xfrm>
       </p:grpSpPr>
+      <p:pic>
+        <p:nvPicPr>
+          <p:cNvPr id="4" name="Picture 3">
+            <a:extLst>
+              <a:ext uri="{FF2B5EF4-FFF2-40B4-BE49-F238E27FC236}">
+                <a16:creationId xmlns:a16="http://schemas.microsoft.com/office/drawing/2014/main" id="{6336777A-E0E3-B2C8-B898-7387E2AC4A98}"/>
+              </a:ext>
+            </a:extLst>
+          </p:cNvPr>
+          <p:cNvPicPr>
+            <a:picLocks noChangeAspect="1"/>
+          </p:cNvPicPr>
+          <p:nvPr/>
+        </p:nvPicPr>
+        <p:blipFill rotWithShape="1">
+          <a:blip r:embed="rId3">
+            <a:extLst>
+              <a:ext uri="{28A0092B-C50C-407E-A947-70E740481C1C}">
+                <a14:useLocalDpi xmlns:a14="http://schemas.microsoft.com/office/drawing/2010/main" val="0"/>
+              </a:ext>
+            </a:extLst>
+          </a:blip>
+          <a:srcRect l="53309" t="-444" r="18823" b="444"/>
+          <a:stretch/>
+        </p:blipFill>
+        <p:spPr>
+          <a:xfrm>
+            <a:off x="7236122" y="1295400"/>
+            <a:ext cx="1374478" cy="3840472"/>
+          </a:xfrm>
+          <a:prstGeom prst="rect">
+            <a:avLst/>
+          </a:prstGeom>
+        </p:spPr>
+      </p:pic>
+      <p:pic>
+        <p:nvPicPr>
+          <p:cNvPr id="3" name="Picture 2">
+            <a:extLst>
+              <a:ext uri="{FF2B5EF4-FFF2-40B4-BE49-F238E27FC236}">
+                <a16:creationId xmlns:a16="http://schemas.microsoft.com/office/drawing/2014/main" id="{33F393B7-618C-3457-C373-AB50ED9C7E00}"/>
+              </a:ext>
+            </a:extLst>
+          </p:cNvPr>
+          <p:cNvPicPr>
+            <a:picLocks noChangeAspect="1"/>
+          </p:cNvPicPr>
+          <p:nvPr/>
+        </p:nvPicPr>
+        <p:blipFill rotWithShape="1">
+          <a:blip r:embed="rId4">
+            <a:extLst>
+              <a:ext uri="{28A0092B-C50C-407E-A947-70E740481C1C}">
+                <a14:useLocalDpi xmlns:a14="http://schemas.microsoft.com/office/drawing/2010/main" val="0"/>
+              </a:ext>
+            </a:extLst>
+          </a:blip>
+          <a:srcRect l="56584" r="19606"/>
+          <a:stretch/>
+        </p:blipFill>
+        <p:spPr>
+          <a:xfrm>
+            <a:off x="5791200" y="1304702"/>
+            <a:ext cx="1219200" cy="3840472"/>
+          </a:xfrm>
+          <a:prstGeom prst="rect">
+            <a:avLst/>
+          </a:prstGeom>
+        </p:spPr>
+      </p:pic>
       <p:sp>
         <p:nvSpPr>
           <p:cNvPr id="6" name="Title 5">
@@ -7017,129 +7243,17 @@
           <a:p>
             <a:r>
               <a:rPr lang="en-US" sz="3200" dirty="0"/>
-              <a:t>Exploratory Factor Analysis</a:t>
-            </a:r>
-          </a:p>
-        </p:txBody>
-      </p:sp>
-      <p:sp>
-        <p:nvSpPr>
-          <p:cNvPr id="7" name="Content Placeholder 6">
-            <a:extLst>
-              <a:ext uri="{FF2B5EF4-FFF2-40B4-BE49-F238E27FC236}">
-                <a16:creationId xmlns:a16="http://schemas.microsoft.com/office/drawing/2014/main" id="{9114D3AD-6DF6-4C88-942E-9CAEC7F33550}"/>
-              </a:ext>
-            </a:extLst>
-          </p:cNvPr>
-          <p:cNvSpPr>
-            <a:spLocks noGrp="1"/>
-          </p:cNvSpPr>
-          <p:nvPr>
-            <p:ph sz="half" idx="1"/>
-          </p:nvPr>
-        </p:nvSpPr>
-        <p:spPr/>
-        <p:txBody>
-          <a:bodyPr>
-            <a:normAutofit/>
-          </a:bodyPr>
-          <a:lstStyle/>
-          <a:p>
-            <a:r>
-              <a:rPr lang="en-US" sz="2000" dirty="0"/>
-              <a:t>First produce eigenvalues for arbitrary number of factors</a:t>
-            </a:r>
-          </a:p>
-          <a:p>
-            <a:pPr lvl="1"/>
-            <a:r>
-              <a:rPr lang="en-US" sz="1600" dirty="0"/>
-              <a:t>Scree plot (SAGE_Scree.png)</a:t>
-            </a:r>
-          </a:p>
-          <a:p>
-            <a:r>
-              <a:rPr lang="en-US" sz="2000" dirty="0"/>
-              <a:t>Kaiser Criterion (ε&gt;1) to determine number of factors</a:t>
-            </a:r>
-          </a:p>
-          <a:p>
-            <a:pPr lvl="1"/>
-            <a:r>
-              <a:rPr lang="en-US" sz="1600" dirty="0"/>
-              <a:t>6 or 7</a:t>
-            </a:r>
-          </a:p>
-          <a:p>
-            <a:r>
-              <a:rPr lang="en-US" sz="2000" dirty="0"/>
-              <a:t>Factor analysis</a:t>
-            </a:r>
-          </a:p>
-          <a:p>
-            <a:pPr lvl="1"/>
-            <a:r>
-              <a:rPr lang="en-US" sz="1600" dirty="0"/>
-              <a:t>(SAGE_EFA.csv, .</a:t>
-            </a:r>
-            <a:r>
-              <a:rPr lang="en-US" sz="1600" dirty="0" err="1"/>
-              <a:t>png</a:t>
-            </a:r>
-            <a:r>
-              <a:rPr lang="en-US" sz="1600" dirty="0"/>
-              <a:t>)</a:t>
-            </a:r>
-          </a:p>
-          <a:p>
-            <a:pPr lvl="1"/>
-            <a:r>
-              <a:rPr lang="en-US" sz="1600" dirty="0"/>
-              <a:t>Significant factor correlations (&gt;0.4)</a:t>
+              <a:t>Factor Analysis (vs number of factors)</a:t>
             </a:r>
           </a:p>
         </p:txBody>
       </p:sp>
       <p:pic>
         <p:nvPicPr>
-          <p:cNvPr id="8" name="Content Placeholder 7">
+          <p:cNvPr id="5" name="Picture 4">
             <a:extLst>
               <a:ext uri="{FF2B5EF4-FFF2-40B4-BE49-F238E27FC236}">
-                <a16:creationId xmlns:a16="http://schemas.microsoft.com/office/drawing/2014/main" id="{56B00A2F-F2F3-43BD-A0DD-27A87C69E6A4}"/>
-              </a:ext>
-            </a:extLst>
-          </p:cNvPr>
-          <p:cNvPicPr>
-            <a:picLocks noGrp="1" noChangeAspect="1"/>
-          </p:cNvPicPr>
-          <p:nvPr>
-            <p:ph sz="half" idx="2"/>
-          </p:nvPr>
-        </p:nvPicPr>
-        <p:blipFill rotWithShape="1">
-          <a:blip r:embed="rId3">
-            <a:extLst>
-              <a:ext uri="{28A0092B-C50C-407E-A947-70E740481C1C}">
-                <a14:useLocalDpi xmlns:a14="http://schemas.microsoft.com/office/drawing/2010/main" val="0"/>
-              </a:ext>
-            </a:extLst>
-          </a:blip>
-          <a:srcRect l="53774" r="-944"/>
-          <a:stretch/>
-        </p:blipFill>
-        <p:spPr>
-          <a:xfrm>
-            <a:off x="4648202" y="1562100"/>
-            <a:ext cx="1905000" cy="3028950"/>
-          </a:xfrm>
-        </p:spPr>
-      </p:pic>
-      <p:pic>
-        <p:nvPicPr>
-          <p:cNvPr id="10" name="Picture 9">
-            <a:extLst>
-              <a:ext uri="{FF2B5EF4-FFF2-40B4-BE49-F238E27FC236}">
-                <a16:creationId xmlns:a16="http://schemas.microsoft.com/office/drawing/2014/main" id="{F4263E20-1A1B-4227-98C1-91A31453E5B0}"/>
+                <a16:creationId xmlns:a16="http://schemas.microsoft.com/office/drawing/2014/main" id="{37332131-6122-40F9-A591-AC243C077590}"/>
               </a:ext>
             </a:extLst>
           </p:cNvPr>
@@ -7149,30 +7263,693 @@
           <p:nvPr/>
         </p:nvPicPr>
         <p:blipFill rotWithShape="1">
-          <a:blip r:embed="rId4">
+          <a:blip r:embed="rId5">
             <a:extLst>
               <a:ext uri="{28A0092B-C50C-407E-A947-70E740481C1C}">
                 <a14:useLocalDpi xmlns:a14="http://schemas.microsoft.com/office/drawing/2010/main" val="0"/>
               </a:ext>
             </a:extLst>
           </a:blip>
-          <a:srcRect l="51887" r="-1887"/>
+          <a:srcRect l="68359" t="9" r="4799" b="-9"/>
           <a:stretch/>
         </p:blipFill>
         <p:spPr>
           <a:xfrm>
-            <a:off x="6743700" y="1562100"/>
-            <a:ext cx="2019300" cy="3028950"/>
+            <a:off x="-582" y="1304702"/>
+            <a:ext cx="1374478" cy="3840472"/>
           </a:xfrm>
           <a:prstGeom prst="rect">
             <a:avLst/>
           </a:prstGeom>
         </p:spPr>
       </p:pic>
+      <p:sp>
+        <p:nvSpPr>
+          <p:cNvPr id="22" name="TextBox 21">
+            <a:extLst>
+              <a:ext uri="{FF2B5EF4-FFF2-40B4-BE49-F238E27FC236}">
+                <a16:creationId xmlns:a16="http://schemas.microsoft.com/office/drawing/2014/main" id="{882FF5AA-4282-4188-9156-5FFEBE9E801C}"/>
+              </a:ext>
+            </a:extLst>
+          </p:cNvPr>
+          <p:cNvSpPr txBox="1"/>
+          <p:nvPr/>
+        </p:nvSpPr>
+        <p:spPr>
+          <a:xfrm>
+            <a:off x="137022" y="1532751"/>
+            <a:ext cx="243978" cy="276999"/>
+          </a:xfrm>
+          <a:prstGeom prst="rect">
+            <a:avLst/>
+          </a:prstGeom>
+          <a:noFill/>
+        </p:spPr>
+        <p:txBody>
+          <a:bodyPr wrap="none" rtlCol="0">
+            <a:spAutoFit/>
+          </a:bodyPr>
+          <a:lstStyle/>
+          <a:p>
+            <a:r>
+              <a:rPr lang="en-US" sz="1200" dirty="0"/>
+              <a:t>*</a:t>
+            </a:r>
+            <a:endParaRPr lang="en-US" sz="1600" dirty="0"/>
+          </a:p>
+        </p:txBody>
+      </p:sp>
+      <p:sp>
+        <p:nvSpPr>
+          <p:cNvPr id="23" name="TextBox 22">
+            <a:extLst>
+              <a:ext uri="{FF2B5EF4-FFF2-40B4-BE49-F238E27FC236}">
+                <a16:creationId xmlns:a16="http://schemas.microsoft.com/office/drawing/2014/main" id="{67A9A9FE-CA6B-4A54-83A2-9D6B871CA8CA}"/>
+              </a:ext>
+            </a:extLst>
+          </p:cNvPr>
+          <p:cNvSpPr txBox="1"/>
+          <p:nvPr/>
+        </p:nvSpPr>
+        <p:spPr>
+          <a:xfrm>
+            <a:off x="140512" y="3423897"/>
+            <a:ext cx="243978" cy="276999"/>
+          </a:xfrm>
+          <a:prstGeom prst="rect">
+            <a:avLst/>
+          </a:prstGeom>
+          <a:noFill/>
+        </p:spPr>
+        <p:txBody>
+          <a:bodyPr wrap="none" rtlCol="0">
+            <a:spAutoFit/>
+          </a:bodyPr>
+          <a:lstStyle/>
+          <a:p>
+            <a:r>
+              <a:rPr lang="en-US" sz="1200" dirty="0"/>
+              <a:t>*</a:t>
+            </a:r>
+            <a:endParaRPr lang="en-US" sz="1600" dirty="0"/>
+          </a:p>
+        </p:txBody>
+      </p:sp>
+      <p:sp>
+        <p:nvSpPr>
+          <p:cNvPr id="24" name="TextBox 23">
+            <a:extLst>
+              <a:ext uri="{FF2B5EF4-FFF2-40B4-BE49-F238E27FC236}">
+                <a16:creationId xmlns:a16="http://schemas.microsoft.com/office/drawing/2014/main" id="{FE6927A2-306C-4057-B585-4BA048EF7C81}"/>
+              </a:ext>
+            </a:extLst>
+          </p:cNvPr>
+          <p:cNvSpPr txBox="1"/>
+          <p:nvPr/>
+        </p:nvSpPr>
+        <p:spPr>
+          <a:xfrm>
+            <a:off x="137022" y="2786589"/>
+            <a:ext cx="243978" cy="276999"/>
+          </a:xfrm>
+          <a:prstGeom prst="rect">
+            <a:avLst/>
+          </a:prstGeom>
+          <a:noFill/>
+        </p:spPr>
+        <p:txBody>
+          <a:bodyPr wrap="none" rtlCol="0">
+            <a:spAutoFit/>
+          </a:bodyPr>
+          <a:lstStyle/>
+          <a:p>
+            <a:r>
+              <a:rPr lang="en-US" sz="1200" dirty="0"/>
+              <a:t>*</a:t>
+            </a:r>
+            <a:endParaRPr lang="en-US" sz="1600" dirty="0"/>
+          </a:p>
+        </p:txBody>
+      </p:sp>
+      <p:sp>
+        <p:nvSpPr>
+          <p:cNvPr id="25" name="TextBox 24">
+            <a:extLst>
+              <a:ext uri="{FF2B5EF4-FFF2-40B4-BE49-F238E27FC236}">
+                <a16:creationId xmlns:a16="http://schemas.microsoft.com/office/drawing/2014/main" id="{2E9E5051-0DF0-48BD-874A-928B64C1371B}"/>
+              </a:ext>
+            </a:extLst>
+          </p:cNvPr>
+          <p:cNvSpPr txBox="1"/>
+          <p:nvPr/>
+        </p:nvSpPr>
+        <p:spPr>
+          <a:xfrm>
+            <a:off x="178238" y="1143176"/>
+            <a:ext cx="973343" cy="338554"/>
+          </a:xfrm>
+          <a:prstGeom prst="rect">
+            <a:avLst/>
+          </a:prstGeom>
+          <a:noFill/>
+        </p:spPr>
+        <p:txBody>
+          <a:bodyPr wrap="none" rtlCol="0">
+            <a:spAutoFit/>
+          </a:bodyPr>
+          <a:lstStyle/>
+          <a:p>
+            <a:r>
+              <a:rPr lang="en-US" sz="1600" dirty="0"/>
+              <a:t>2 factors</a:t>
+            </a:r>
+          </a:p>
+        </p:txBody>
+      </p:sp>
+      <p:pic>
+        <p:nvPicPr>
+          <p:cNvPr id="18" name="Picture 17">
+            <a:extLst>
+              <a:ext uri="{FF2B5EF4-FFF2-40B4-BE49-F238E27FC236}">
+                <a16:creationId xmlns:a16="http://schemas.microsoft.com/office/drawing/2014/main" id="{A9A97CEE-F4D9-421E-8896-EF83F8FBC7A2}"/>
+              </a:ext>
+            </a:extLst>
+          </p:cNvPr>
+          <p:cNvPicPr>
+            <a:picLocks noChangeAspect="1"/>
+          </p:cNvPicPr>
+          <p:nvPr/>
+        </p:nvPicPr>
+        <p:blipFill rotWithShape="1">
+          <a:blip r:embed="rId6">
+            <a:extLst>
+              <a:ext uri="{28A0092B-C50C-407E-A947-70E740481C1C}">
+                <a14:useLocalDpi xmlns:a14="http://schemas.microsoft.com/office/drawing/2010/main" val="0"/>
+              </a:ext>
+            </a:extLst>
+          </a:blip>
+          <a:srcRect l="67413" t="53" r="19649" b="-53"/>
+          <a:stretch/>
+        </p:blipFill>
+        <p:spPr>
+          <a:xfrm>
+            <a:off x="1371600" y="1305065"/>
+            <a:ext cx="662497" cy="3840472"/>
+          </a:xfrm>
+          <a:prstGeom prst="rect">
+            <a:avLst/>
+          </a:prstGeom>
+        </p:spPr>
+      </p:pic>
+      <p:pic>
+        <p:nvPicPr>
+          <p:cNvPr id="29" name="Picture 28">
+            <a:extLst>
+              <a:ext uri="{FF2B5EF4-FFF2-40B4-BE49-F238E27FC236}">
+                <a16:creationId xmlns:a16="http://schemas.microsoft.com/office/drawing/2014/main" id="{055F92CA-552F-4192-B49E-1CF62B8917D0}"/>
+              </a:ext>
+            </a:extLst>
+          </p:cNvPr>
+          <p:cNvPicPr>
+            <a:picLocks noChangeAspect="1"/>
+          </p:cNvPicPr>
+          <p:nvPr/>
+        </p:nvPicPr>
+        <p:blipFill rotWithShape="1">
+          <a:blip r:embed="rId7">
+            <a:extLst>
+              <a:ext uri="{28A0092B-C50C-407E-A947-70E740481C1C}">
+                <a14:useLocalDpi xmlns:a14="http://schemas.microsoft.com/office/drawing/2010/main" val="0"/>
+              </a:ext>
+            </a:extLst>
+          </a:blip>
+          <a:srcRect l="64265" r="18897"/>
+          <a:stretch/>
+        </p:blipFill>
+        <p:spPr>
+          <a:xfrm>
+            <a:off x="2057400" y="1303028"/>
+            <a:ext cx="862171" cy="3840472"/>
+          </a:xfrm>
+          <a:prstGeom prst="rect">
+            <a:avLst/>
+          </a:prstGeom>
+        </p:spPr>
+      </p:pic>
+      <p:pic>
+        <p:nvPicPr>
+          <p:cNvPr id="30" name="Picture 29">
+            <a:extLst>
+              <a:ext uri="{FF2B5EF4-FFF2-40B4-BE49-F238E27FC236}">
+                <a16:creationId xmlns:a16="http://schemas.microsoft.com/office/drawing/2014/main" id="{9E099E65-6B6E-4B42-959C-8BB1B139103D}"/>
+              </a:ext>
+            </a:extLst>
+          </p:cNvPr>
+          <p:cNvPicPr>
+            <a:picLocks noChangeAspect="1"/>
+          </p:cNvPicPr>
+          <p:nvPr/>
+        </p:nvPicPr>
+        <p:blipFill rotWithShape="1">
+          <a:blip r:embed="rId8">
+            <a:extLst>
+              <a:ext uri="{28A0092B-C50C-407E-A947-70E740481C1C}">
+                <a14:useLocalDpi xmlns:a14="http://schemas.microsoft.com/office/drawing/2010/main" val="0"/>
+              </a:ext>
+            </a:extLst>
+          </a:blip>
+          <a:srcRect l="62518" r="19194"/>
+          <a:stretch/>
+        </p:blipFill>
+        <p:spPr>
+          <a:xfrm>
+            <a:off x="2819400" y="1303028"/>
+            <a:ext cx="936500" cy="3840472"/>
+          </a:xfrm>
+          <a:prstGeom prst="rect">
+            <a:avLst/>
+          </a:prstGeom>
+        </p:spPr>
+      </p:pic>
+      <p:pic>
+        <p:nvPicPr>
+          <p:cNvPr id="31" name="Picture 30">
+            <a:extLst>
+              <a:ext uri="{FF2B5EF4-FFF2-40B4-BE49-F238E27FC236}">
+                <a16:creationId xmlns:a16="http://schemas.microsoft.com/office/drawing/2014/main" id="{3273B1B8-68BF-474A-AAB7-9EC6A0D5B674}"/>
+              </a:ext>
+            </a:extLst>
+          </p:cNvPr>
+          <p:cNvPicPr>
+            <a:picLocks noChangeAspect="1"/>
+          </p:cNvPicPr>
+          <p:nvPr/>
+        </p:nvPicPr>
+        <p:blipFill rotWithShape="1">
+          <a:blip r:embed="rId9">
+            <a:extLst>
+              <a:ext uri="{28A0092B-C50C-407E-A947-70E740481C1C}">
+                <a14:useLocalDpi xmlns:a14="http://schemas.microsoft.com/office/drawing/2010/main" val="0"/>
+              </a:ext>
+            </a:extLst>
+          </a:blip>
+          <a:srcRect l="61644" r="20068"/>
+          <a:stretch/>
+        </p:blipFill>
+        <p:spPr>
+          <a:xfrm>
+            <a:off x="3711700" y="1303028"/>
+            <a:ext cx="936500" cy="3840472"/>
+          </a:xfrm>
+          <a:prstGeom prst="rect">
+            <a:avLst/>
+          </a:prstGeom>
+        </p:spPr>
+      </p:pic>
+      <p:pic>
+        <p:nvPicPr>
+          <p:cNvPr id="32" name="Picture 31">
+            <a:extLst>
+              <a:ext uri="{FF2B5EF4-FFF2-40B4-BE49-F238E27FC236}">
+                <a16:creationId xmlns:a16="http://schemas.microsoft.com/office/drawing/2014/main" id="{6B550BBB-7FA1-4EC8-BF10-F46FDA5CBC6A}"/>
+              </a:ext>
+            </a:extLst>
+          </p:cNvPr>
+          <p:cNvPicPr>
+            <a:picLocks noChangeAspect="1"/>
+          </p:cNvPicPr>
+          <p:nvPr/>
+        </p:nvPicPr>
+        <p:blipFill rotWithShape="1">
+          <a:blip r:embed="rId10">
+            <a:extLst>
+              <a:ext uri="{28A0092B-C50C-407E-A947-70E740481C1C}">
+                <a14:useLocalDpi xmlns:a14="http://schemas.microsoft.com/office/drawing/2010/main" val="0"/>
+              </a:ext>
+            </a:extLst>
+          </a:blip>
+          <a:srcRect l="58037" r="18153"/>
+          <a:stretch/>
+        </p:blipFill>
+        <p:spPr>
+          <a:xfrm>
+            <a:off x="4648200" y="1303028"/>
+            <a:ext cx="1219200" cy="3840472"/>
+          </a:xfrm>
+          <a:prstGeom prst="rect">
+            <a:avLst/>
+          </a:prstGeom>
+        </p:spPr>
+      </p:pic>
+      <p:sp>
+        <p:nvSpPr>
+          <p:cNvPr id="33" name="TextBox 32">
+            <a:extLst>
+              <a:ext uri="{FF2B5EF4-FFF2-40B4-BE49-F238E27FC236}">
+                <a16:creationId xmlns:a16="http://schemas.microsoft.com/office/drawing/2014/main" id="{F536A5AE-62A1-4A05-BEBC-F6E4A8026998}"/>
+              </a:ext>
+            </a:extLst>
+          </p:cNvPr>
+          <p:cNvSpPr txBox="1"/>
+          <p:nvPr/>
+        </p:nvSpPr>
+        <p:spPr>
+          <a:xfrm>
+            <a:off x="7535778" y="1116821"/>
+            <a:ext cx="973343" cy="338554"/>
+          </a:xfrm>
+          <a:prstGeom prst="rect">
+            <a:avLst/>
+          </a:prstGeom>
+          <a:noFill/>
+        </p:spPr>
+        <p:txBody>
+          <a:bodyPr wrap="none" rtlCol="0">
+            <a:spAutoFit/>
+          </a:bodyPr>
+          <a:lstStyle/>
+          <a:p>
+            <a:r>
+              <a:rPr lang="en-US" sz="1600" dirty="0"/>
+              <a:t>9 factors</a:t>
+            </a:r>
+          </a:p>
+        </p:txBody>
+      </p:sp>
+      <p:cxnSp>
+        <p:nvCxnSpPr>
+          <p:cNvPr id="17" name="Straight Connector 16">
+            <a:extLst>
+              <a:ext uri="{FF2B5EF4-FFF2-40B4-BE49-F238E27FC236}">
+                <a16:creationId xmlns:a16="http://schemas.microsoft.com/office/drawing/2014/main" id="{A514DB52-7133-4879-BA5E-2A79DE1507B9}"/>
+              </a:ext>
+            </a:extLst>
+          </p:cNvPr>
+          <p:cNvCxnSpPr>
+            <a:cxnSpLocks/>
+          </p:cNvCxnSpPr>
+          <p:nvPr/>
+        </p:nvCxnSpPr>
+        <p:spPr>
+          <a:xfrm>
+            <a:off x="381000" y="2578294"/>
+            <a:ext cx="8077200" cy="0"/>
+          </a:xfrm>
+          <a:prstGeom prst="line">
+            <a:avLst/>
+          </a:prstGeom>
+          <a:effectLst/>
+        </p:spPr>
+        <p:style>
+          <a:lnRef idx="2">
+            <a:schemeClr val="accent1"/>
+          </a:lnRef>
+          <a:fillRef idx="0">
+            <a:schemeClr val="accent1"/>
+          </a:fillRef>
+          <a:effectRef idx="1">
+            <a:schemeClr val="accent1"/>
+          </a:effectRef>
+          <a:fontRef idx="minor">
+            <a:schemeClr val="tx1"/>
+          </a:fontRef>
+        </p:style>
+      </p:cxnSp>
+      <p:cxnSp>
+        <p:nvCxnSpPr>
+          <p:cNvPr id="34" name="Straight Connector 33">
+            <a:extLst>
+              <a:ext uri="{FF2B5EF4-FFF2-40B4-BE49-F238E27FC236}">
+                <a16:creationId xmlns:a16="http://schemas.microsoft.com/office/drawing/2014/main" id="{6910C4C2-F933-4744-9EFC-7633C5510B71}"/>
+              </a:ext>
+            </a:extLst>
+          </p:cNvPr>
+          <p:cNvCxnSpPr>
+            <a:cxnSpLocks/>
+          </p:cNvCxnSpPr>
+          <p:nvPr/>
+        </p:nvCxnSpPr>
+        <p:spPr>
+          <a:xfrm>
+            <a:off x="381000" y="3638550"/>
+            <a:ext cx="8077200" cy="0"/>
+          </a:xfrm>
+          <a:prstGeom prst="line">
+            <a:avLst/>
+          </a:prstGeom>
+          <a:effectLst/>
+        </p:spPr>
+        <p:style>
+          <a:lnRef idx="2">
+            <a:schemeClr val="accent1"/>
+          </a:lnRef>
+          <a:fillRef idx="0">
+            <a:schemeClr val="accent1"/>
+          </a:fillRef>
+          <a:effectRef idx="1">
+            <a:schemeClr val="accent1"/>
+          </a:effectRef>
+          <a:fontRef idx="minor">
+            <a:schemeClr val="tx1"/>
+          </a:fontRef>
+        </p:style>
+      </p:cxnSp>
+      <p:cxnSp>
+        <p:nvCxnSpPr>
+          <p:cNvPr id="35" name="Straight Connector 34">
+            <a:extLst>
+              <a:ext uri="{FF2B5EF4-FFF2-40B4-BE49-F238E27FC236}">
+                <a16:creationId xmlns:a16="http://schemas.microsoft.com/office/drawing/2014/main" id="{7EF40FD0-0EC1-4420-9B01-39BDA40CB292}"/>
+              </a:ext>
+            </a:extLst>
+          </p:cNvPr>
+          <p:cNvCxnSpPr>
+            <a:cxnSpLocks/>
+          </p:cNvCxnSpPr>
+          <p:nvPr/>
+        </p:nvCxnSpPr>
+        <p:spPr>
+          <a:xfrm>
+            <a:off x="381000" y="3714750"/>
+            <a:ext cx="8077200" cy="0"/>
+          </a:xfrm>
+          <a:prstGeom prst="line">
+            <a:avLst/>
+          </a:prstGeom>
+          <a:effectLst/>
+        </p:spPr>
+        <p:style>
+          <a:lnRef idx="2">
+            <a:schemeClr val="accent1"/>
+          </a:lnRef>
+          <a:fillRef idx="0">
+            <a:schemeClr val="accent1"/>
+          </a:fillRef>
+          <a:effectRef idx="1">
+            <a:schemeClr val="accent1"/>
+          </a:effectRef>
+          <a:fontRef idx="minor">
+            <a:schemeClr val="tx1"/>
+          </a:fontRef>
+        </p:style>
+      </p:cxnSp>
+      <p:cxnSp>
+        <p:nvCxnSpPr>
+          <p:cNvPr id="36" name="Straight Connector 35">
+            <a:extLst>
+              <a:ext uri="{FF2B5EF4-FFF2-40B4-BE49-F238E27FC236}">
+                <a16:creationId xmlns:a16="http://schemas.microsoft.com/office/drawing/2014/main" id="{171B47D1-3FC8-443A-B641-45934CB6BD7E}"/>
+              </a:ext>
+            </a:extLst>
+          </p:cNvPr>
+          <p:cNvCxnSpPr>
+            <a:cxnSpLocks/>
+          </p:cNvCxnSpPr>
+          <p:nvPr/>
+        </p:nvCxnSpPr>
+        <p:spPr>
+          <a:xfrm>
+            <a:off x="381000" y="4248150"/>
+            <a:ext cx="8077200" cy="0"/>
+          </a:xfrm>
+          <a:prstGeom prst="line">
+            <a:avLst/>
+          </a:prstGeom>
+          <a:effectLst/>
+        </p:spPr>
+        <p:style>
+          <a:lnRef idx="2">
+            <a:schemeClr val="accent1"/>
+          </a:lnRef>
+          <a:fillRef idx="0">
+            <a:schemeClr val="accent1"/>
+          </a:fillRef>
+          <a:effectRef idx="1">
+            <a:schemeClr val="accent1"/>
+          </a:effectRef>
+          <a:fontRef idx="minor">
+            <a:schemeClr val="tx1"/>
+          </a:fontRef>
+        </p:style>
+      </p:cxnSp>
+      <p:cxnSp>
+        <p:nvCxnSpPr>
+          <p:cNvPr id="37" name="Straight Connector 36">
+            <a:extLst>
+              <a:ext uri="{FF2B5EF4-FFF2-40B4-BE49-F238E27FC236}">
+                <a16:creationId xmlns:a16="http://schemas.microsoft.com/office/drawing/2014/main" id="{49831381-7F3C-48C4-80EE-7690D87B3E11}"/>
+              </a:ext>
+            </a:extLst>
+          </p:cNvPr>
+          <p:cNvCxnSpPr>
+            <a:cxnSpLocks/>
+          </p:cNvCxnSpPr>
+          <p:nvPr/>
+        </p:nvCxnSpPr>
+        <p:spPr>
+          <a:xfrm>
+            <a:off x="381000" y="4462790"/>
+            <a:ext cx="8077200" cy="0"/>
+          </a:xfrm>
+          <a:prstGeom prst="line">
+            <a:avLst/>
+          </a:prstGeom>
+          <a:effectLst/>
+        </p:spPr>
+        <p:style>
+          <a:lnRef idx="2">
+            <a:schemeClr val="accent1"/>
+          </a:lnRef>
+          <a:fillRef idx="0">
+            <a:schemeClr val="accent1"/>
+          </a:fillRef>
+          <a:effectRef idx="1">
+            <a:schemeClr val="accent1"/>
+          </a:effectRef>
+          <a:fontRef idx="minor">
+            <a:schemeClr val="tx1"/>
+          </a:fontRef>
+        </p:style>
+      </p:cxnSp>
+      <p:cxnSp>
+        <p:nvCxnSpPr>
+          <p:cNvPr id="2" name="Straight Connector 1">
+            <a:extLst>
+              <a:ext uri="{FF2B5EF4-FFF2-40B4-BE49-F238E27FC236}">
+                <a16:creationId xmlns:a16="http://schemas.microsoft.com/office/drawing/2014/main" id="{D9DCACC1-5F0D-1653-2CB5-D90D51063CE4}"/>
+              </a:ext>
+            </a:extLst>
+          </p:cNvPr>
+          <p:cNvCxnSpPr>
+            <a:cxnSpLocks/>
+          </p:cNvCxnSpPr>
+          <p:nvPr/>
+        </p:nvCxnSpPr>
+        <p:spPr>
+          <a:xfrm>
+            <a:off x="381000" y="3195526"/>
+            <a:ext cx="8077200" cy="0"/>
+          </a:xfrm>
+          <a:prstGeom prst="line">
+            <a:avLst/>
+          </a:prstGeom>
+          <a:effectLst/>
+        </p:spPr>
+        <p:style>
+          <a:lnRef idx="2">
+            <a:schemeClr val="accent1"/>
+          </a:lnRef>
+          <a:fillRef idx="0">
+            <a:schemeClr val="accent1"/>
+          </a:fillRef>
+          <a:effectRef idx="1">
+            <a:schemeClr val="accent1"/>
+          </a:effectRef>
+          <a:fontRef idx="minor">
+            <a:schemeClr val="tx1"/>
+          </a:fontRef>
+        </p:style>
+      </p:cxnSp>
+      <p:sp>
+        <p:nvSpPr>
+          <p:cNvPr id="16" name="TextBox 15">
+            <a:extLst>
+              <a:ext uri="{FF2B5EF4-FFF2-40B4-BE49-F238E27FC236}">
+                <a16:creationId xmlns:a16="http://schemas.microsoft.com/office/drawing/2014/main" id="{E5E64B08-CF06-DF65-7F24-5BEAB06674A6}"/>
+              </a:ext>
+            </a:extLst>
+          </p:cNvPr>
+          <p:cNvSpPr txBox="1"/>
+          <p:nvPr/>
+        </p:nvSpPr>
+        <p:spPr>
+          <a:xfrm>
+            <a:off x="-39454" y="4931239"/>
+            <a:ext cx="2727029" cy="261610"/>
+          </a:xfrm>
+          <a:prstGeom prst="rect">
+            <a:avLst/>
+          </a:prstGeom>
+          <a:noFill/>
+        </p:spPr>
+        <p:txBody>
+          <a:bodyPr wrap="none" rtlCol="0">
+            <a:spAutoFit/>
+          </a:bodyPr>
+          <a:lstStyle/>
+          <a:p>
+            <a:r>
+              <a:rPr lang="en-US" sz="1050" dirty="0"/>
+              <a:t>* </a:t>
+            </a:r>
+            <a:r>
+              <a:rPr kumimoji="0" lang="en-US" sz="1000" b="0" i="0" u="none" strike="noStrike" kern="1200" cap="none" spc="0" normalizeH="0" baseline="0" noProof="0" dirty="0">
+                <a:ln>
+                  <a:noFill/>
+                </a:ln>
+                <a:solidFill>
+                  <a:prstClr val="black">
+                    <a:lumMod val="75000"/>
+                    <a:lumOff val="25000"/>
+                  </a:prstClr>
+                </a:solidFill>
+                <a:effectLst/>
+                <a:uLnTx/>
+                <a:uFillTx/>
+                <a:latin typeface="Calibri"/>
+                <a:ea typeface="+mn-ea"/>
+                <a:cs typeface="+mn-cs"/>
+              </a:rPr>
+              <a:t>Items that failed to load for Kouros and </a:t>
+            </a:r>
+            <a:r>
+              <a:rPr kumimoji="0" lang="en-US" sz="1000" b="0" i="0" u="none" strike="noStrike" kern="1200" cap="none" spc="0" normalizeH="0" baseline="0" noProof="0" dirty="0" err="1">
+                <a:ln>
+                  <a:noFill/>
+                </a:ln>
+                <a:solidFill>
+                  <a:prstClr val="black">
+                    <a:lumMod val="75000"/>
+                    <a:lumOff val="25000"/>
+                  </a:prstClr>
+                </a:solidFill>
+                <a:effectLst/>
+                <a:uLnTx/>
+                <a:uFillTx/>
+                <a:latin typeface="Calibri"/>
+                <a:ea typeface="+mn-ea"/>
+                <a:cs typeface="+mn-cs"/>
+              </a:rPr>
+              <a:t>Abrami</a:t>
+            </a:r>
+            <a:endParaRPr lang="en-US" sz="1600" dirty="0"/>
+          </a:p>
+        </p:txBody>
+      </p:sp>
     </p:spTree>
     <p:extLst>
       <p:ext uri="{BB962C8B-B14F-4D97-AF65-F5344CB8AC3E}">
-        <p14:creationId xmlns:p14="http://schemas.microsoft.com/office/powerpoint/2010/main" val="3769119439"/>
+        <p14:creationId xmlns:p14="http://schemas.microsoft.com/office/powerpoint/2010/main" val="523345727"/>
       </p:ext>
     </p:extLst>
   </p:cSld>
@@ -7224,598 +8001,647 @@
           <a:p>
             <a:r>
               <a:rPr lang="en-US" sz="3200" dirty="0"/>
-              <a:t>Factor Analysis (vs number of factors)</a:t>
-            </a:r>
-          </a:p>
-        </p:txBody>
-      </p:sp>
-      <p:pic>
-        <p:nvPicPr>
-          <p:cNvPr id="5" name="Picture 4">
-            <a:extLst>
-              <a:ext uri="{FF2B5EF4-FFF2-40B4-BE49-F238E27FC236}">
-                <a16:creationId xmlns:a16="http://schemas.microsoft.com/office/drawing/2014/main" id="{37332131-6122-40F9-A591-AC243C077590}"/>
-              </a:ext>
-            </a:extLst>
-          </p:cNvPr>
-          <p:cNvPicPr>
-            <a:picLocks noChangeAspect="1"/>
-          </p:cNvPicPr>
-          <p:nvPr/>
-        </p:nvPicPr>
-        <p:blipFill rotWithShape="1">
-          <a:blip r:embed="rId3">
-            <a:extLst>
-              <a:ext uri="{28A0092B-C50C-407E-A947-70E740481C1C}">
-                <a14:useLocalDpi xmlns:a14="http://schemas.microsoft.com/office/drawing/2010/main" val="0"/>
-              </a:ext>
-            </a:extLst>
-          </a:blip>
-          <a:srcRect l="68371" t="170" r="4787" b="-170"/>
-          <a:stretch/>
-        </p:blipFill>
-        <p:spPr>
-          <a:xfrm>
-            <a:off x="-582" y="1305065"/>
-            <a:ext cx="1374478" cy="3840472"/>
-          </a:xfrm>
-          <a:prstGeom prst="rect">
-            <a:avLst/>
-          </a:prstGeom>
-        </p:spPr>
-      </p:pic>
-      <p:sp>
-        <p:nvSpPr>
-          <p:cNvPr id="22" name="TextBox 21">
-            <a:extLst>
-              <a:ext uri="{FF2B5EF4-FFF2-40B4-BE49-F238E27FC236}">
-                <a16:creationId xmlns:a16="http://schemas.microsoft.com/office/drawing/2014/main" id="{882FF5AA-4282-4188-9156-5FFEBE9E801C}"/>
-              </a:ext>
-            </a:extLst>
-          </p:cNvPr>
-          <p:cNvSpPr txBox="1"/>
-          <p:nvPr/>
-        </p:nvSpPr>
-        <p:spPr>
-          <a:xfrm>
-            <a:off x="137022" y="1591184"/>
-            <a:ext cx="243978" cy="276999"/>
-          </a:xfrm>
-          <a:prstGeom prst="rect">
-            <a:avLst/>
-          </a:prstGeom>
-          <a:noFill/>
-        </p:spPr>
-        <p:txBody>
-          <a:bodyPr wrap="none" rtlCol="0">
-            <a:spAutoFit/>
-          </a:bodyPr>
-          <a:lstStyle/>
-          <a:p>
-            <a:r>
-              <a:rPr lang="en-US" sz="1200" dirty="0"/>
-              <a:t>*</a:t>
-            </a:r>
-            <a:endParaRPr lang="en-US" sz="1600" dirty="0"/>
+              <a:t>Factor Analysis</a:t>
+            </a:r>
           </a:p>
         </p:txBody>
       </p:sp>
       <p:sp>
         <p:nvSpPr>
-          <p:cNvPr id="23" name="TextBox 22">
+          <p:cNvPr id="2" name="Content Placeholder 1">
             <a:extLst>
               <a:ext uri="{FF2B5EF4-FFF2-40B4-BE49-F238E27FC236}">
-                <a16:creationId xmlns:a16="http://schemas.microsoft.com/office/drawing/2014/main" id="{67A9A9FE-CA6B-4A54-83A2-9D6B871CA8CA}"/>
+                <a16:creationId xmlns:a16="http://schemas.microsoft.com/office/drawing/2014/main" id="{E02161B2-404B-40D4-8C83-D577FC1BE1A1}"/>
               </a:ext>
             </a:extLst>
           </p:cNvPr>
-          <p:cNvSpPr txBox="1"/>
-          <p:nvPr/>
+          <p:cNvSpPr>
+            <a:spLocks noGrp="1"/>
+          </p:cNvSpPr>
+          <p:nvPr>
+            <p:ph sz="half" idx="1"/>
+          </p:nvPr>
         </p:nvSpPr>
-        <p:spPr>
-          <a:xfrm>
-            <a:off x="140512" y="2991339"/>
-            <a:ext cx="243978" cy="276999"/>
-          </a:xfrm>
-          <a:prstGeom prst="rect">
-            <a:avLst/>
-          </a:prstGeom>
-          <a:noFill/>
-        </p:spPr>
+        <p:spPr/>
         <p:txBody>
-          <a:bodyPr wrap="none" rtlCol="0">
-            <a:spAutoFit/>
+          <a:bodyPr>
+            <a:normAutofit fontScale="92500" lnSpcReduction="10000"/>
           </a:bodyPr>
           <a:lstStyle/>
           <a:p>
-            <a:r>
-              <a:rPr lang="en-US" sz="1200" dirty="0"/>
-              <a:t>*</a:t>
-            </a:r>
-            <a:endParaRPr lang="en-US" sz="1600" dirty="0"/>
+            <a:pPr marL="0" indent="0">
+              <a:buNone/>
+            </a:pPr>
+            <a:r>
+              <a:rPr lang="en-US" sz="1600" dirty="0"/>
+              <a:t>Items that failed to load on any number of factors</a:t>
+            </a:r>
+          </a:p>
+          <a:p>
+            <a:r>
+              <a:rPr lang="en-US" sz="1600" dirty="0"/>
+              <a:t>10: I prefer when one student regularly takes on a leadership role.</a:t>
+            </a:r>
+          </a:p>
+          <a:p>
+            <a:r>
+              <a:rPr lang="en-US" sz="1600" dirty="0"/>
+              <a:t>16 I let the other students do most of the work.</a:t>
+            </a:r>
+          </a:p>
+          <a:p>
+            <a:r>
+              <a:rPr lang="en-US" sz="1600" dirty="0"/>
+              <a:t>20: We cannot complete the assignment unless everyone contributes.</a:t>
+            </a:r>
+          </a:p>
+          <a:p>
+            <a:r>
+              <a:rPr lang="en-US" sz="1600" dirty="0"/>
+              <a:t>21: I prefer to take on tasks that I’m already good at.</a:t>
+            </a:r>
+          </a:p>
+          <a:p>
+            <a:r>
+              <a:rPr lang="en-US" sz="1600" dirty="0"/>
+              <a:t>26: When I work with other students, we spend too much time talking about other things.</a:t>
+            </a:r>
+          </a:p>
+          <a:p>
+            <a:r>
+              <a:rPr lang="en-US" sz="1600" dirty="0"/>
+              <a:t>28: My group did higher quality work when group members worked on different tasks at the same time.</a:t>
+            </a:r>
           </a:p>
         </p:txBody>
       </p:sp>
       <p:sp>
         <p:nvSpPr>
-          <p:cNvPr id="24" name="TextBox 23">
+          <p:cNvPr id="4" name="Content Placeholder 3">
             <a:extLst>
               <a:ext uri="{FF2B5EF4-FFF2-40B4-BE49-F238E27FC236}">
-                <a16:creationId xmlns:a16="http://schemas.microsoft.com/office/drawing/2014/main" id="{FE6927A2-306C-4057-B585-4BA048EF7C81}"/>
+                <a16:creationId xmlns:a16="http://schemas.microsoft.com/office/drawing/2014/main" id="{A041E303-5AC9-4A46-A51C-2077DBF7BA3A}"/>
               </a:ext>
             </a:extLst>
           </p:cNvPr>
-          <p:cNvSpPr txBox="1"/>
-          <p:nvPr/>
+          <p:cNvSpPr>
+            <a:spLocks noGrp="1"/>
+          </p:cNvSpPr>
+          <p:nvPr>
+            <p:ph sz="half" idx="2"/>
+          </p:nvPr>
         </p:nvSpPr>
         <p:spPr>
           <a:xfrm>
-            <a:off x="137022" y="3880991"/>
-            <a:ext cx="243978" cy="276999"/>
+            <a:off x="4648202" y="1295400"/>
+            <a:ext cx="4038600" cy="3562350"/>
           </a:xfrm>
-          <a:prstGeom prst="rect">
-            <a:avLst/>
-          </a:prstGeom>
-          <a:noFill/>
         </p:spPr>
         <p:txBody>
-          <a:bodyPr wrap="none" rtlCol="0">
-            <a:spAutoFit/>
+          <a:bodyPr>
+            <a:normAutofit fontScale="92500" lnSpcReduction="10000"/>
           </a:bodyPr>
           <a:lstStyle/>
           <a:p>
-            <a:r>
-              <a:rPr lang="en-US" sz="1200" dirty="0"/>
-              <a:t>*</a:t>
-            </a:r>
-            <a:endParaRPr lang="en-US" sz="1600" dirty="0"/>
+            <a:pPr marL="0" marR="0" lvl="0" indent="0" algn="l" defTabSz="457200" rtl="0" eaLnBrk="1" fontAlgn="auto" latinLnBrk="0" hangingPunct="1">
+              <a:lnSpc>
+                <a:spcPct val="100000"/>
+              </a:lnSpc>
+              <a:spcBef>
+                <a:spcPct val="20000"/>
+              </a:spcBef>
+              <a:spcAft>
+                <a:spcPts val="0"/>
+              </a:spcAft>
+              <a:buClrTx/>
+              <a:buSzTx/>
+              <a:buFont typeface="Arial"/>
+              <a:buNone/>
+              <a:tabLst/>
+              <a:defRPr/>
+            </a:pPr>
+            <a:r>
+              <a:rPr kumimoji="0" lang="en-US" sz="1000" b="0" i="0" u="none" strike="noStrike" kern="1200" cap="none" spc="0" normalizeH="0" baseline="0" noProof="0" dirty="0">
+                <a:ln>
+                  <a:noFill/>
+                </a:ln>
+                <a:solidFill>
+                  <a:prstClr val="black">
+                    <a:lumMod val="75000"/>
+                    <a:lumOff val="25000"/>
+                  </a:prstClr>
+                </a:solidFill>
+                <a:effectLst/>
+                <a:uLnTx/>
+                <a:uFillTx/>
+                <a:latin typeface="Calibri"/>
+                <a:ea typeface="+mn-ea"/>
+                <a:cs typeface="+mn-cs"/>
+              </a:rPr>
+              <a:t>Items that failed to load .40 or higher were deleted as well as, items that loaded on more than one factor. Ultimately, 11 items were eliminated from the SAGE questionnaire</a:t>
+            </a:r>
+          </a:p>
+          <a:p>
+            <a:pPr marL="342900" marR="0" lvl="0" indent="-342900" algn="l" defTabSz="457200" rtl="0" eaLnBrk="1" fontAlgn="auto" latinLnBrk="0" hangingPunct="1">
+              <a:lnSpc>
+                <a:spcPct val="100000"/>
+              </a:lnSpc>
+              <a:spcBef>
+                <a:spcPct val="20000"/>
+              </a:spcBef>
+              <a:spcAft>
+                <a:spcPts val="0"/>
+              </a:spcAft>
+              <a:buClrTx/>
+              <a:buSzTx/>
+              <a:buFont typeface="Arial"/>
+              <a:buChar char="•"/>
+              <a:tabLst/>
+              <a:defRPr/>
+            </a:pPr>
+            <a:r>
+              <a:rPr kumimoji="0" lang="en-US" sz="1000" b="0" i="0" u="none" strike="noStrike" kern="1200" cap="none" spc="0" normalizeH="0" baseline="0" noProof="0" dirty="0">
+                <a:ln>
+                  <a:noFill/>
+                </a:ln>
+                <a:solidFill>
+                  <a:prstClr val="black">
+                    <a:lumMod val="75000"/>
+                    <a:lumOff val="25000"/>
+                  </a:prstClr>
+                </a:solidFill>
+                <a:effectLst/>
+                <a:uLnTx/>
+                <a:uFillTx/>
+                <a:latin typeface="Calibri"/>
+                <a:ea typeface="+mn-ea"/>
+                <a:cs typeface="+mn-cs"/>
+              </a:rPr>
+              <a:t>*2: When I work in a group, I end up doing most of the work.</a:t>
+            </a:r>
+          </a:p>
+          <a:p>
+            <a:pPr marL="342900" marR="0" lvl="0" indent="-342900" algn="l" defTabSz="457200" rtl="0" eaLnBrk="1" fontAlgn="auto" latinLnBrk="0" hangingPunct="1">
+              <a:lnSpc>
+                <a:spcPct val="100000"/>
+              </a:lnSpc>
+              <a:spcBef>
+                <a:spcPct val="20000"/>
+              </a:spcBef>
+              <a:spcAft>
+                <a:spcPts val="0"/>
+              </a:spcAft>
+              <a:buClrTx/>
+              <a:buSzTx/>
+              <a:buFont typeface="Arial"/>
+              <a:buChar char="•"/>
+              <a:tabLst/>
+              <a:defRPr/>
+            </a:pPr>
+            <a:r>
+              <a:rPr kumimoji="0" lang="en-US" sz="1000" b="0" i="0" u="none" strike="noStrike" kern="1200" cap="none" spc="0" normalizeH="0" baseline="0" noProof="0" dirty="0">
+                <a:ln>
+                  <a:noFill/>
+                </a:ln>
+                <a:solidFill>
+                  <a:prstClr val="black">
+                    <a:lumMod val="75000"/>
+                    <a:lumOff val="25000"/>
+                  </a:prstClr>
+                </a:solidFill>
+                <a:effectLst/>
+                <a:uLnTx/>
+                <a:uFillTx/>
+                <a:latin typeface="Calibri"/>
+                <a:ea typeface="+mn-ea"/>
+                <a:cs typeface="+mn-cs"/>
+              </a:rPr>
+              <a:t>3: When I work with other students, I am able to work at my own pace</a:t>
+            </a:r>
+          </a:p>
+          <a:p>
+            <a:pPr marL="342900" marR="0" lvl="0" indent="-342900" algn="l" defTabSz="457200" rtl="0" eaLnBrk="1" fontAlgn="auto" latinLnBrk="0" hangingPunct="1">
+              <a:lnSpc>
+                <a:spcPct val="100000"/>
+              </a:lnSpc>
+              <a:spcBef>
+                <a:spcPct val="20000"/>
+              </a:spcBef>
+              <a:spcAft>
+                <a:spcPts val="0"/>
+              </a:spcAft>
+              <a:buClrTx/>
+              <a:buSzTx/>
+              <a:buFont typeface="Arial"/>
+              <a:buChar char="•"/>
+              <a:tabLst/>
+              <a:defRPr/>
+            </a:pPr>
+            <a:r>
+              <a:rPr kumimoji="0" lang="en-US" sz="1000" b="0" i="0" u="none" strike="noStrike" kern="1200" cap="none" spc="0" normalizeH="0" baseline="0" noProof="0" dirty="0">
+                <a:ln>
+                  <a:noFill/>
+                </a:ln>
+                <a:solidFill>
+                  <a:prstClr val="black">
+                    <a:lumMod val="75000"/>
+                    <a:lumOff val="25000"/>
+                  </a:prstClr>
+                </a:solidFill>
+                <a:effectLst/>
+                <a:uLnTx/>
+                <a:uFillTx/>
+                <a:latin typeface="Calibri"/>
+                <a:ea typeface="+mn-ea"/>
+                <a:cs typeface="+mn-cs"/>
+              </a:rPr>
+              <a:t>15: My group members get a good grade even if they do not do much work.</a:t>
+            </a:r>
+          </a:p>
+          <a:p>
+            <a:pPr marL="342900" marR="0" lvl="0" indent="-342900" algn="l" defTabSz="457200" rtl="0" eaLnBrk="1" fontAlgn="auto" latinLnBrk="0" hangingPunct="1">
+              <a:lnSpc>
+                <a:spcPct val="100000"/>
+              </a:lnSpc>
+              <a:spcBef>
+                <a:spcPct val="20000"/>
+              </a:spcBef>
+              <a:spcAft>
+                <a:spcPts val="0"/>
+              </a:spcAft>
+              <a:buClrTx/>
+              <a:buSzTx/>
+              <a:buFont typeface="Arial"/>
+              <a:buChar char="•"/>
+              <a:tabLst/>
+              <a:defRPr/>
+            </a:pPr>
+            <a:r>
+              <a:rPr kumimoji="0" lang="en-US" sz="1000" b="0" i="0" u="none" strike="noStrike" kern="1200" cap="none" spc="0" normalizeH="0" baseline="0" noProof="0" dirty="0">
+                <a:ln>
+                  <a:noFill/>
+                </a:ln>
+                <a:solidFill>
+                  <a:prstClr val="black">
+                    <a:lumMod val="75000"/>
+                    <a:lumOff val="25000"/>
+                  </a:prstClr>
+                </a:solidFill>
+                <a:effectLst/>
+                <a:uLnTx/>
+                <a:uFillTx/>
+                <a:latin typeface="Calibri"/>
+                <a:ea typeface="+mn-ea"/>
+                <a:cs typeface="+mn-cs"/>
+              </a:rPr>
+              <a:t>18: One student usually makes the decisions in the group</a:t>
+            </a:r>
+          </a:p>
+          <a:p>
+            <a:pPr marL="342900" marR="0" lvl="0" indent="-342900" algn="l" defTabSz="457200" rtl="0" eaLnBrk="1" fontAlgn="auto" latinLnBrk="0" hangingPunct="1">
+              <a:lnSpc>
+                <a:spcPct val="100000"/>
+              </a:lnSpc>
+              <a:spcBef>
+                <a:spcPct val="20000"/>
+              </a:spcBef>
+              <a:spcAft>
+                <a:spcPts val="0"/>
+              </a:spcAft>
+              <a:buClrTx/>
+              <a:buSzTx/>
+              <a:buFont typeface="Arial"/>
+              <a:buChar char="•"/>
+              <a:tabLst/>
+              <a:defRPr/>
+            </a:pPr>
+            <a:r>
+              <a:rPr kumimoji="0" lang="en-US" sz="1000" b="0" i="0" u="none" strike="noStrike" kern="1200" cap="none" spc="0" normalizeH="0" baseline="0" noProof="0" dirty="0">
+                <a:ln>
+                  <a:noFill/>
+                </a:ln>
+                <a:solidFill>
+                  <a:prstClr val="black">
+                    <a:lumMod val="75000"/>
+                    <a:lumOff val="25000"/>
+                  </a:prstClr>
+                </a:solidFill>
+                <a:effectLst/>
+                <a:uLnTx/>
+                <a:uFillTx/>
+                <a:latin typeface="Calibri"/>
+                <a:ea typeface="+mn-ea"/>
+                <a:cs typeface="+mn-cs"/>
+              </a:rPr>
+              <a:t>21: I do not think a group grade is fair</a:t>
+            </a:r>
+          </a:p>
+          <a:p>
+            <a:pPr marL="342900" marR="0" lvl="0" indent="-342900" algn="l" defTabSz="457200" rtl="0" eaLnBrk="1" fontAlgn="auto" latinLnBrk="0" hangingPunct="1">
+              <a:lnSpc>
+                <a:spcPct val="100000"/>
+              </a:lnSpc>
+              <a:spcBef>
+                <a:spcPct val="20000"/>
+              </a:spcBef>
+              <a:spcAft>
+                <a:spcPts val="0"/>
+              </a:spcAft>
+              <a:buClrTx/>
+              <a:buSzTx/>
+              <a:buFont typeface="Arial"/>
+              <a:buChar char="•"/>
+              <a:tabLst/>
+              <a:defRPr/>
+            </a:pPr>
+            <a:r>
+              <a:rPr kumimoji="0" lang="en-US" sz="1000" b="0" i="0" u="none" strike="noStrike" kern="1200" cap="none" spc="0" normalizeH="0" baseline="0" noProof="0" dirty="0">
+                <a:ln>
+                  <a:noFill/>
+                </a:ln>
+                <a:solidFill>
+                  <a:prstClr val="black">
+                    <a:lumMod val="75000"/>
+                    <a:lumOff val="25000"/>
+                  </a:prstClr>
+                </a:solidFill>
+                <a:effectLst/>
+                <a:uLnTx/>
+                <a:uFillTx/>
+                <a:latin typeface="Calibri"/>
+                <a:ea typeface="+mn-ea"/>
+                <a:cs typeface="+mn-cs"/>
+              </a:rPr>
+              <a:t>*22: I try to make sure my group members learn the material.</a:t>
+            </a:r>
+          </a:p>
+          <a:p>
+            <a:pPr marL="342900" marR="0" lvl="0" indent="-342900" algn="l" defTabSz="457200" rtl="0" eaLnBrk="1" fontAlgn="auto" latinLnBrk="0" hangingPunct="1">
+              <a:lnSpc>
+                <a:spcPct val="100000"/>
+              </a:lnSpc>
+              <a:spcBef>
+                <a:spcPct val="20000"/>
+              </a:spcBef>
+              <a:spcAft>
+                <a:spcPts val="0"/>
+              </a:spcAft>
+              <a:buClrTx/>
+              <a:buSzTx/>
+              <a:buFont typeface="Arial"/>
+              <a:buChar char="•"/>
+              <a:tabLst/>
+              <a:defRPr/>
+            </a:pPr>
+            <a:r>
+              <a:rPr kumimoji="0" lang="en-US" sz="1000" b="0" i="0" u="none" strike="noStrike" kern="1200" cap="none" spc="0" normalizeH="0" baseline="0" noProof="0" dirty="0">
+                <a:ln>
+                  <a:noFill/>
+                </a:ln>
+                <a:solidFill>
+                  <a:prstClr val="black">
+                    <a:lumMod val="75000"/>
+                    <a:lumOff val="25000"/>
+                  </a:prstClr>
+                </a:solidFill>
+                <a:effectLst/>
+                <a:uLnTx/>
+                <a:uFillTx/>
+                <a:latin typeface="Calibri"/>
+                <a:ea typeface="+mn-ea"/>
+                <a:cs typeface="+mn-cs"/>
+              </a:rPr>
+              <a:t>24: It is difficult to get together outside of class</a:t>
+            </a:r>
+          </a:p>
+          <a:p>
+            <a:pPr marL="342900" marR="0" lvl="0" indent="-342900" algn="l" defTabSz="457200" rtl="0" eaLnBrk="1" fontAlgn="auto" latinLnBrk="0" hangingPunct="1">
+              <a:lnSpc>
+                <a:spcPct val="100000"/>
+              </a:lnSpc>
+              <a:spcBef>
+                <a:spcPct val="20000"/>
+              </a:spcBef>
+              <a:spcAft>
+                <a:spcPts val="0"/>
+              </a:spcAft>
+              <a:buClrTx/>
+              <a:buSzTx/>
+              <a:buFont typeface="Arial"/>
+              <a:buChar char="•"/>
+              <a:tabLst/>
+              <a:defRPr/>
+            </a:pPr>
+            <a:r>
+              <a:rPr kumimoji="0" lang="en-US" sz="1000" b="0" i="0" u="none" strike="noStrike" kern="1200" cap="none" spc="0" normalizeH="0" baseline="0" noProof="0" dirty="0">
+                <a:ln>
+                  <a:noFill/>
+                </a:ln>
+                <a:solidFill>
+                  <a:prstClr val="black">
+                    <a:lumMod val="75000"/>
+                    <a:lumOff val="25000"/>
+                  </a:prstClr>
+                </a:solidFill>
+                <a:effectLst/>
+                <a:uLnTx/>
+                <a:uFillTx/>
+                <a:latin typeface="Calibri"/>
+                <a:ea typeface="+mn-ea"/>
+                <a:cs typeface="+mn-cs"/>
+              </a:rPr>
+              <a:t>*35: When I work with other students the work is divided equally.</a:t>
+            </a:r>
+          </a:p>
+          <a:p>
+            <a:pPr marL="342900" marR="0" lvl="0" indent="-342900" algn="l" defTabSz="457200" rtl="0" eaLnBrk="1" fontAlgn="auto" latinLnBrk="0" hangingPunct="1">
+              <a:lnSpc>
+                <a:spcPct val="100000"/>
+              </a:lnSpc>
+              <a:spcBef>
+                <a:spcPct val="20000"/>
+              </a:spcBef>
+              <a:spcAft>
+                <a:spcPts val="0"/>
+              </a:spcAft>
+              <a:buClrTx/>
+              <a:buSzTx/>
+              <a:buFont typeface="Arial"/>
+              <a:buChar char="•"/>
+              <a:tabLst/>
+              <a:defRPr/>
+            </a:pPr>
+            <a:r>
+              <a:rPr kumimoji="0" lang="en-US" sz="1000" b="0" i="0" u="none" strike="noStrike" kern="1200" cap="none" spc="0" normalizeH="0" baseline="0" noProof="0" dirty="0">
+                <a:ln>
+                  <a:noFill/>
+                </a:ln>
+                <a:solidFill>
+                  <a:prstClr val="black">
+                    <a:lumMod val="75000"/>
+                    <a:lumOff val="25000"/>
+                  </a:prstClr>
+                </a:solidFill>
+                <a:effectLst/>
+                <a:uLnTx/>
+                <a:uFillTx/>
+                <a:latin typeface="Calibri"/>
+                <a:ea typeface="+mn-ea"/>
+                <a:cs typeface="+mn-cs"/>
+              </a:rPr>
+              <a:t>39: My group members compete to see who does better work</a:t>
+            </a:r>
+          </a:p>
+          <a:p>
+            <a:pPr marL="342900" marR="0" lvl="0" indent="-342900" algn="l" defTabSz="457200" rtl="0" eaLnBrk="1" fontAlgn="auto" latinLnBrk="0" hangingPunct="1">
+              <a:lnSpc>
+                <a:spcPct val="100000"/>
+              </a:lnSpc>
+              <a:spcBef>
+                <a:spcPct val="20000"/>
+              </a:spcBef>
+              <a:spcAft>
+                <a:spcPts val="0"/>
+              </a:spcAft>
+              <a:buClrTx/>
+              <a:buSzTx/>
+              <a:buFont typeface="Arial"/>
+              <a:buChar char="•"/>
+              <a:tabLst/>
+              <a:defRPr/>
+            </a:pPr>
+            <a:r>
+              <a:rPr kumimoji="0" lang="en-US" sz="1000" b="0" i="0" u="none" strike="noStrike" kern="1200" cap="none" spc="0" normalizeH="0" baseline="0" noProof="0" dirty="0">
+                <a:ln>
+                  <a:noFill/>
+                </a:ln>
+                <a:solidFill>
+                  <a:prstClr val="black">
+                    <a:lumMod val="75000"/>
+                    <a:lumOff val="25000"/>
+                  </a:prstClr>
+                </a:solidFill>
+                <a:effectLst/>
+                <a:uLnTx/>
+                <a:uFillTx/>
+                <a:latin typeface="Calibri"/>
+                <a:ea typeface="+mn-ea"/>
+                <a:cs typeface="+mn-cs"/>
+              </a:rPr>
+              <a:t>42: I like to help my group members learn the material</a:t>
+            </a:r>
+          </a:p>
+          <a:p>
+            <a:pPr marL="342900" marR="0" lvl="0" indent="-342900" algn="l" defTabSz="457200" rtl="0" eaLnBrk="1" fontAlgn="auto" latinLnBrk="0" hangingPunct="1">
+              <a:lnSpc>
+                <a:spcPct val="100000"/>
+              </a:lnSpc>
+              <a:spcBef>
+                <a:spcPct val="20000"/>
+              </a:spcBef>
+              <a:spcAft>
+                <a:spcPts val="0"/>
+              </a:spcAft>
+              <a:buClrTx/>
+              <a:buSzTx/>
+              <a:buFont typeface="Arial"/>
+              <a:buChar char="•"/>
+              <a:tabLst/>
+              <a:defRPr/>
+            </a:pPr>
+            <a:r>
+              <a:rPr kumimoji="0" lang="en-US" sz="1000" b="0" i="0" u="none" strike="noStrike" kern="1200" cap="none" spc="0" normalizeH="0" baseline="0" noProof="0" dirty="0">
+                <a:ln>
+                  <a:noFill/>
+                </a:ln>
+                <a:solidFill>
+                  <a:prstClr val="black">
+                    <a:lumMod val="75000"/>
+                    <a:lumOff val="25000"/>
+                  </a:prstClr>
+                </a:solidFill>
+                <a:effectLst/>
+                <a:uLnTx/>
+                <a:uFillTx/>
+                <a:latin typeface="Calibri"/>
+                <a:ea typeface="+mn-ea"/>
+                <a:cs typeface="+mn-cs"/>
+              </a:rPr>
+              <a:t>51: Same as 31 (repeat for reliability)</a:t>
+            </a:r>
+          </a:p>
+          <a:p>
+            <a:pPr marL="342900" marR="0" lvl="0" indent="-342900" algn="l" defTabSz="457200" rtl="0" eaLnBrk="1" fontAlgn="auto" latinLnBrk="0" hangingPunct="1">
+              <a:lnSpc>
+                <a:spcPct val="100000"/>
+              </a:lnSpc>
+              <a:spcBef>
+                <a:spcPct val="20000"/>
+              </a:spcBef>
+              <a:spcAft>
+                <a:spcPts val="0"/>
+              </a:spcAft>
+              <a:buClrTx/>
+              <a:buSzTx/>
+              <a:buFont typeface="Arial"/>
+              <a:buChar char="•"/>
+              <a:tabLst/>
+              <a:defRPr/>
+            </a:pPr>
+            <a:endParaRPr lang="en-US" sz="1000" dirty="0">
+              <a:solidFill>
+                <a:prstClr val="black">
+                  <a:lumMod val="75000"/>
+                  <a:lumOff val="25000"/>
+                </a:prstClr>
+              </a:solidFill>
+              <a:latin typeface="Calibri"/>
+            </a:endParaRPr>
+          </a:p>
+          <a:p>
+            <a:pPr marL="0" marR="0" lvl="0" indent="0" algn="l" defTabSz="457200" rtl="0" eaLnBrk="1" fontAlgn="auto" latinLnBrk="0" hangingPunct="1">
+              <a:lnSpc>
+                <a:spcPct val="100000"/>
+              </a:lnSpc>
+              <a:spcBef>
+                <a:spcPct val="20000"/>
+              </a:spcBef>
+              <a:spcAft>
+                <a:spcPts val="0"/>
+              </a:spcAft>
+              <a:buClrTx/>
+              <a:buSzTx/>
+              <a:buNone/>
+              <a:tabLst/>
+              <a:defRPr/>
+            </a:pPr>
+            <a:r>
+              <a:rPr kumimoji="0" lang="en-US" sz="1000" b="0" i="0" u="none" strike="noStrike" kern="1200" cap="none" spc="0" normalizeH="0" baseline="0" noProof="0" dirty="0">
+                <a:ln>
+                  <a:noFill/>
+                </a:ln>
+                <a:solidFill>
+                  <a:prstClr val="black">
+                    <a:lumMod val="75000"/>
+                    <a:lumOff val="25000"/>
+                  </a:prstClr>
+                </a:solidFill>
+                <a:effectLst/>
+                <a:uLnTx/>
+                <a:uFillTx/>
+                <a:latin typeface="Calibri"/>
+                <a:ea typeface="+mn-ea"/>
+                <a:cs typeface="+mn-cs"/>
+              </a:rPr>
+              <a:t>*questions used</a:t>
+            </a:r>
           </a:p>
         </p:txBody>
       </p:sp>
-      <p:sp>
-        <p:nvSpPr>
-          <p:cNvPr id="25" name="TextBox 24">
-            <a:extLst>
-              <a:ext uri="{FF2B5EF4-FFF2-40B4-BE49-F238E27FC236}">
-                <a16:creationId xmlns:a16="http://schemas.microsoft.com/office/drawing/2014/main" id="{2E9E5051-0DF0-48BD-874A-928B64C1371B}"/>
-              </a:ext>
-            </a:extLst>
-          </p:cNvPr>
-          <p:cNvSpPr txBox="1"/>
-          <p:nvPr/>
-        </p:nvSpPr>
-        <p:spPr>
-          <a:xfrm>
-            <a:off x="178238" y="1143176"/>
-            <a:ext cx="973343" cy="338554"/>
-          </a:xfrm>
-          <a:prstGeom prst="rect">
-            <a:avLst/>
-          </a:prstGeom>
-          <a:noFill/>
-        </p:spPr>
-        <p:txBody>
-          <a:bodyPr wrap="none" rtlCol="0">
-            <a:spAutoFit/>
-          </a:bodyPr>
-          <a:lstStyle/>
-          <a:p>
-            <a:r>
-              <a:rPr lang="en-US" sz="1600" dirty="0"/>
-              <a:t>2 factors</a:t>
-            </a:r>
-          </a:p>
-        </p:txBody>
-      </p:sp>
-      <p:pic>
-        <p:nvPicPr>
-          <p:cNvPr id="18" name="Picture 17">
-            <a:extLst>
-              <a:ext uri="{FF2B5EF4-FFF2-40B4-BE49-F238E27FC236}">
-                <a16:creationId xmlns:a16="http://schemas.microsoft.com/office/drawing/2014/main" id="{A9A97CEE-F4D9-421E-8896-EF83F8FBC7A2}"/>
-              </a:ext>
-            </a:extLst>
-          </p:cNvPr>
-          <p:cNvPicPr>
-            <a:picLocks noChangeAspect="1"/>
-          </p:cNvPicPr>
-          <p:nvPr/>
-        </p:nvPicPr>
-        <p:blipFill rotWithShape="1">
-          <a:blip r:embed="rId4">
-            <a:extLst>
-              <a:ext uri="{28A0092B-C50C-407E-A947-70E740481C1C}">
-                <a14:useLocalDpi xmlns:a14="http://schemas.microsoft.com/office/drawing/2010/main" val="0"/>
-              </a:ext>
-            </a:extLst>
-          </a:blip>
-          <a:srcRect l="67888" t="252" r="19174" b="-252"/>
-          <a:stretch/>
-        </p:blipFill>
-        <p:spPr>
-          <a:xfrm>
-            <a:off x="1775903" y="1305065"/>
-            <a:ext cx="662497" cy="3840472"/>
-          </a:xfrm>
-          <a:prstGeom prst="rect">
-            <a:avLst/>
-          </a:prstGeom>
-        </p:spPr>
-      </p:pic>
-      <p:pic>
-        <p:nvPicPr>
-          <p:cNvPr id="29" name="Picture 28">
-            <a:extLst>
-              <a:ext uri="{FF2B5EF4-FFF2-40B4-BE49-F238E27FC236}">
-                <a16:creationId xmlns:a16="http://schemas.microsoft.com/office/drawing/2014/main" id="{055F92CA-552F-4192-B49E-1CF62B8917D0}"/>
-              </a:ext>
-            </a:extLst>
-          </p:cNvPr>
-          <p:cNvPicPr>
-            <a:picLocks noChangeAspect="1"/>
-          </p:cNvPicPr>
-          <p:nvPr/>
-        </p:nvPicPr>
-        <p:blipFill rotWithShape="1">
-          <a:blip r:embed="rId5">
-            <a:extLst>
-              <a:ext uri="{28A0092B-C50C-407E-A947-70E740481C1C}">
-                <a14:useLocalDpi xmlns:a14="http://schemas.microsoft.com/office/drawing/2010/main" val="0"/>
-              </a:ext>
-            </a:extLst>
-          </a:blip>
-          <a:srcRect l="64374" r="18789"/>
-          <a:stretch/>
-        </p:blipFill>
-        <p:spPr>
-          <a:xfrm>
-            <a:off x="2947829" y="1303028"/>
-            <a:ext cx="862171" cy="3840472"/>
-          </a:xfrm>
-          <a:prstGeom prst="rect">
-            <a:avLst/>
-          </a:prstGeom>
-        </p:spPr>
-      </p:pic>
-      <p:pic>
-        <p:nvPicPr>
-          <p:cNvPr id="30" name="Picture 29">
-            <a:extLst>
-              <a:ext uri="{FF2B5EF4-FFF2-40B4-BE49-F238E27FC236}">
-                <a16:creationId xmlns:a16="http://schemas.microsoft.com/office/drawing/2014/main" id="{9E099E65-6B6E-4B42-959C-8BB1B139103D}"/>
-              </a:ext>
-            </a:extLst>
-          </p:cNvPr>
-          <p:cNvPicPr>
-            <a:picLocks noChangeAspect="1"/>
-          </p:cNvPicPr>
-          <p:nvPr/>
-        </p:nvPicPr>
-        <p:blipFill rotWithShape="1">
-          <a:blip r:embed="rId6">
-            <a:extLst>
-              <a:ext uri="{28A0092B-C50C-407E-A947-70E740481C1C}">
-                <a14:useLocalDpi xmlns:a14="http://schemas.microsoft.com/office/drawing/2010/main" val="0"/>
-              </a:ext>
-            </a:extLst>
-          </a:blip>
-          <a:srcRect l="63241" t="-199" r="18470" b="199"/>
-          <a:stretch/>
-        </p:blipFill>
-        <p:spPr>
-          <a:xfrm>
-            <a:off x="4321300" y="1303028"/>
-            <a:ext cx="936500" cy="3840472"/>
-          </a:xfrm>
-          <a:prstGeom prst="rect">
-            <a:avLst/>
-          </a:prstGeom>
-        </p:spPr>
-      </p:pic>
-      <p:pic>
-        <p:nvPicPr>
-          <p:cNvPr id="31" name="Picture 30">
-            <a:extLst>
-              <a:ext uri="{FF2B5EF4-FFF2-40B4-BE49-F238E27FC236}">
-                <a16:creationId xmlns:a16="http://schemas.microsoft.com/office/drawing/2014/main" id="{3273B1B8-68BF-474A-AAB7-9EC6A0D5B674}"/>
-              </a:ext>
-            </a:extLst>
-          </p:cNvPr>
-          <p:cNvPicPr>
-            <a:picLocks noChangeAspect="1"/>
-          </p:cNvPicPr>
-          <p:nvPr/>
-        </p:nvPicPr>
-        <p:blipFill rotWithShape="1">
-          <a:blip r:embed="rId7">
-            <a:extLst>
-              <a:ext uri="{28A0092B-C50C-407E-A947-70E740481C1C}">
-                <a14:useLocalDpi xmlns:a14="http://schemas.microsoft.com/office/drawing/2010/main" val="0"/>
-              </a:ext>
-            </a:extLst>
-          </a:blip>
-          <a:srcRect l="61820" r="19892"/>
-          <a:stretch/>
-        </p:blipFill>
-        <p:spPr>
-          <a:xfrm>
-            <a:off x="5921500" y="1303028"/>
-            <a:ext cx="936500" cy="3840472"/>
-          </a:xfrm>
-          <a:prstGeom prst="rect">
-            <a:avLst/>
-          </a:prstGeom>
-        </p:spPr>
-      </p:pic>
-      <p:pic>
-        <p:nvPicPr>
-          <p:cNvPr id="32" name="Picture 31">
-            <a:extLst>
-              <a:ext uri="{FF2B5EF4-FFF2-40B4-BE49-F238E27FC236}">
-                <a16:creationId xmlns:a16="http://schemas.microsoft.com/office/drawing/2014/main" id="{6B550BBB-7FA1-4EC8-BF10-F46FDA5CBC6A}"/>
-              </a:ext>
-            </a:extLst>
-          </p:cNvPr>
-          <p:cNvPicPr>
-            <a:picLocks noChangeAspect="1"/>
-          </p:cNvPicPr>
-          <p:nvPr/>
-        </p:nvPicPr>
-        <p:blipFill rotWithShape="1">
-          <a:blip r:embed="rId8">
-            <a:extLst>
-              <a:ext uri="{28A0092B-C50C-407E-A947-70E740481C1C}">
-                <a14:useLocalDpi xmlns:a14="http://schemas.microsoft.com/office/drawing/2010/main" val="0"/>
-              </a:ext>
-            </a:extLst>
-          </a:blip>
-          <a:srcRect l="58036" r="18155"/>
-          <a:stretch/>
-        </p:blipFill>
-        <p:spPr>
-          <a:xfrm>
-            <a:off x="7696200" y="1303028"/>
-            <a:ext cx="1219200" cy="3840472"/>
-          </a:xfrm>
-          <a:prstGeom prst="rect">
-            <a:avLst/>
-          </a:prstGeom>
-        </p:spPr>
-      </p:pic>
-      <p:sp>
-        <p:nvSpPr>
-          <p:cNvPr id="33" name="TextBox 32">
-            <a:extLst>
-              <a:ext uri="{FF2B5EF4-FFF2-40B4-BE49-F238E27FC236}">
-                <a16:creationId xmlns:a16="http://schemas.microsoft.com/office/drawing/2014/main" id="{F536A5AE-62A1-4A05-BEBC-F6E4A8026998}"/>
-              </a:ext>
-            </a:extLst>
-          </p:cNvPr>
-          <p:cNvSpPr txBox="1"/>
-          <p:nvPr/>
-        </p:nvSpPr>
-        <p:spPr>
-          <a:xfrm>
-            <a:off x="7937163" y="1140915"/>
-            <a:ext cx="973343" cy="338554"/>
-          </a:xfrm>
-          <a:prstGeom prst="rect">
-            <a:avLst/>
-          </a:prstGeom>
-          <a:noFill/>
-        </p:spPr>
-        <p:txBody>
-          <a:bodyPr wrap="none" rtlCol="0">
-            <a:spAutoFit/>
-          </a:bodyPr>
-          <a:lstStyle/>
-          <a:p>
-            <a:r>
-              <a:rPr lang="en-US" sz="1600" dirty="0"/>
-              <a:t>7 factors</a:t>
-            </a:r>
-          </a:p>
-        </p:txBody>
-      </p:sp>
-      <p:cxnSp>
-        <p:nvCxnSpPr>
-          <p:cNvPr id="17" name="Straight Connector 16">
-            <a:extLst>
-              <a:ext uri="{FF2B5EF4-FFF2-40B4-BE49-F238E27FC236}">
-                <a16:creationId xmlns:a16="http://schemas.microsoft.com/office/drawing/2014/main" id="{A514DB52-7133-4879-BA5E-2A79DE1507B9}"/>
-              </a:ext>
-            </a:extLst>
-          </p:cNvPr>
-          <p:cNvCxnSpPr>
-            <a:cxnSpLocks/>
-          </p:cNvCxnSpPr>
-          <p:nvPr/>
-        </p:nvCxnSpPr>
-        <p:spPr>
-          <a:xfrm>
-            <a:off x="381000" y="2578294"/>
-            <a:ext cx="8305800" cy="0"/>
-          </a:xfrm>
-          <a:prstGeom prst="line">
-            <a:avLst/>
-          </a:prstGeom>
-          <a:effectLst/>
-        </p:spPr>
-        <p:style>
-          <a:lnRef idx="2">
-            <a:schemeClr val="accent1"/>
-          </a:lnRef>
-          <a:fillRef idx="0">
-            <a:schemeClr val="accent1"/>
-          </a:fillRef>
-          <a:effectRef idx="1">
-            <a:schemeClr val="accent1"/>
-          </a:effectRef>
-          <a:fontRef idx="minor">
-            <a:schemeClr val="tx1"/>
-          </a:fontRef>
-        </p:style>
-      </p:cxnSp>
-      <p:cxnSp>
-        <p:nvCxnSpPr>
-          <p:cNvPr id="34" name="Straight Connector 33">
-            <a:extLst>
-              <a:ext uri="{FF2B5EF4-FFF2-40B4-BE49-F238E27FC236}">
-                <a16:creationId xmlns:a16="http://schemas.microsoft.com/office/drawing/2014/main" id="{6910C4C2-F933-4744-9EFC-7633C5510B71}"/>
-              </a:ext>
-            </a:extLst>
-          </p:cNvPr>
-          <p:cNvCxnSpPr>
-            <a:cxnSpLocks/>
-          </p:cNvCxnSpPr>
-          <p:nvPr/>
-        </p:nvCxnSpPr>
-        <p:spPr>
-          <a:xfrm>
-            <a:off x="381000" y="3638550"/>
-            <a:ext cx="8305800" cy="0"/>
-          </a:xfrm>
-          <a:prstGeom prst="line">
-            <a:avLst/>
-          </a:prstGeom>
-          <a:effectLst/>
-        </p:spPr>
-        <p:style>
-          <a:lnRef idx="2">
-            <a:schemeClr val="accent1"/>
-          </a:lnRef>
-          <a:fillRef idx="0">
-            <a:schemeClr val="accent1"/>
-          </a:fillRef>
-          <a:effectRef idx="1">
-            <a:schemeClr val="accent1"/>
-          </a:effectRef>
-          <a:fontRef idx="minor">
-            <a:schemeClr val="tx1"/>
-          </a:fontRef>
-        </p:style>
-      </p:cxnSp>
-      <p:cxnSp>
-        <p:nvCxnSpPr>
-          <p:cNvPr id="35" name="Straight Connector 34">
-            <a:extLst>
-              <a:ext uri="{FF2B5EF4-FFF2-40B4-BE49-F238E27FC236}">
-                <a16:creationId xmlns:a16="http://schemas.microsoft.com/office/drawing/2014/main" id="{7EF40FD0-0EC1-4420-9B01-39BDA40CB292}"/>
-              </a:ext>
-            </a:extLst>
-          </p:cNvPr>
-          <p:cNvCxnSpPr>
-            <a:cxnSpLocks/>
-          </p:cNvCxnSpPr>
-          <p:nvPr/>
-        </p:nvCxnSpPr>
-        <p:spPr>
-          <a:xfrm>
-            <a:off x="381000" y="3714750"/>
-            <a:ext cx="8305800" cy="0"/>
-          </a:xfrm>
-          <a:prstGeom prst="line">
-            <a:avLst/>
-          </a:prstGeom>
-          <a:effectLst/>
-        </p:spPr>
-        <p:style>
-          <a:lnRef idx="2">
-            <a:schemeClr val="accent1"/>
-          </a:lnRef>
-          <a:fillRef idx="0">
-            <a:schemeClr val="accent1"/>
-          </a:fillRef>
-          <a:effectRef idx="1">
-            <a:schemeClr val="accent1"/>
-          </a:effectRef>
-          <a:fontRef idx="minor">
-            <a:schemeClr val="tx1"/>
-          </a:fontRef>
-        </p:style>
-      </p:cxnSp>
-      <p:cxnSp>
-        <p:nvCxnSpPr>
-          <p:cNvPr id="36" name="Straight Connector 35">
-            <a:extLst>
-              <a:ext uri="{FF2B5EF4-FFF2-40B4-BE49-F238E27FC236}">
-                <a16:creationId xmlns:a16="http://schemas.microsoft.com/office/drawing/2014/main" id="{171B47D1-3FC8-443A-B641-45934CB6BD7E}"/>
-              </a:ext>
-            </a:extLst>
-          </p:cNvPr>
-          <p:cNvCxnSpPr>
-            <a:cxnSpLocks/>
-          </p:cNvCxnSpPr>
-          <p:nvPr/>
-        </p:nvCxnSpPr>
-        <p:spPr>
-          <a:xfrm>
-            <a:off x="381000" y="4248150"/>
-            <a:ext cx="8305800" cy="0"/>
-          </a:xfrm>
-          <a:prstGeom prst="line">
-            <a:avLst/>
-          </a:prstGeom>
-          <a:effectLst/>
-        </p:spPr>
-        <p:style>
-          <a:lnRef idx="2">
-            <a:schemeClr val="accent1"/>
-          </a:lnRef>
-          <a:fillRef idx="0">
-            <a:schemeClr val="accent1"/>
-          </a:fillRef>
-          <a:effectRef idx="1">
-            <a:schemeClr val="accent1"/>
-          </a:effectRef>
-          <a:fontRef idx="minor">
-            <a:schemeClr val="tx1"/>
-          </a:fontRef>
-        </p:style>
-      </p:cxnSp>
-      <p:cxnSp>
-        <p:nvCxnSpPr>
-          <p:cNvPr id="37" name="Straight Connector 36">
-            <a:extLst>
-              <a:ext uri="{FF2B5EF4-FFF2-40B4-BE49-F238E27FC236}">
-                <a16:creationId xmlns:a16="http://schemas.microsoft.com/office/drawing/2014/main" id="{49831381-7F3C-48C4-80EE-7690D87B3E11}"/>
-              </a:ext>
-            </a:extLst>
-          </p:cNvPr>
-          <p:cNvCxnSpPr>
-            <a:cxnSpLocks/>
-          </p:cNvCxnSpPr>
-          <p:nvPr/>
-        </p:nvCxnSpPr>
-        <p:spPr>
-          <a:xfrm>
-            <a:off x="381000" y="4462790"/>
-            <a:ext cx="8305800" cy="0"/>
-          </a:xfrm>
-          <a:prstGeom prst="line">
-            <a:avLst/>
-          </a:prstGeom>
-          <a:effectLst/>
-        </p:spPr>
-        <p:style>
-          <a:lnRef idx="2">
-            <a:schemeClr val="accent1"/>
-          </a:lnRef>
-          <a:fillRef idx="0">
-            <a:schemeClr val="accent1"/>
-          </a:fillRef>
-          <a:effectRef idx="1">
-            <a:schemeClr val="accent1"/>
-          </a:effectRef>
-          <a:fontRef idx="minor">
-            <a:schemeClr val="tx1"/>
-          </a:fontRef>
-        </p:style>
-      </p:cxnSp>
     </p:spTree>
     <p:extLst>
       <p:ext uri="{BB962C8B-B14F-4D97-AF65-F5344CB8AC3E}">
-        <p14:creationId xmlns:p14="http://schemas.microsoft.com/office/powerpoint/2010/main" val="523345727"/>
+        <p14:creationId xmlns:p14="http://schemas.microsoft.com/office/powerpoint/2010/main" val="514231159"/>
       </p:ext>
     </p:extLst>
   </p:cSld>
@@ -7867,203 +8693,17 @@
           <a:p>
             <a:r>
               <a:rPr lang="en-US" sz="3200" dirty="0"/>
-              <a:t>Items</a:t>
+              <a:t>So… how many factors?</a:t>
             </a:r>
           </a:p>
         </p:txBody>
       </p:sp>
       <p:sp>
         <p:nvSpPr>
-          <p:cNvPr id="2" name="Content Placeholder 1">
+          <p:cNvPr id="8" name="Content Placeholder 7">
             <a:extLst>
               <a:ext uri="{FF2B5EF4-FFF2-40B4-BE49-F238E27FC236}">
-                <a16:creationId xmlns:a16="http://schemas.microsoft.com/office/drawing/2014/main" id="{E02161B2-404B-40D4-8C83-D577FC1BE1A1}"/>
-              </a:ext>
-            </a:extLst>
-          </p:cNvPr>
-          <p:cNvSpPr>
-            <a:spLocks noGrp="1"/>
-          </p:cNvSpPr>
-          <p:nvPr>
-            <p:ph sz="half" idx="1"/>
-          </p:nvPr>
-        </p:nvSpPr>
-        <p:spPr/>
-        <p:txBody>
-          <a:bodyPr>
-            <a:normAutofit/>
-          </a:bodyPr>
-          <a:lstStyle/>
-          <a:p>
-            <a:pPr marL="0" indent="0">
-              <a:buNone/>
-            </a:pPr>
-            <a:r>
-              <a:rPr lang="en-US" sz="1000" dirty="0"/>
-              <a:t>0 When I work in a group, I do higher quality work.</a:t>
-            </a:r>
-          </a:p>
-          <a:p>
-            <a:pPr marL="0" indent="0">
-              <a:buNone/>
-            </a:pPr>
-            <a:r>
-              <a:rPr lang="en-US" sz="1000" dirty="0"/>
-              <a:t>1 When I work in a group, I end up doing most of the work.</a:t>
-            </a:r>
-          </a:p>
-          <a:p>
-            <a:pPr marL="0" indent="0">
-              <a:buNone/>
-            </a:pPr>
-            <a:r>
-              <a:rPr lang="en-US" sz="1000" dirty="0"/>
-              <a:t>2 The work takes more time to complete when I work with other students.</a:t>
-            </a:r>
-          </a:p>
-          <a:p>
-            <a:pPr marL="0" indent="0">
-              <a:buNone/>
-            </a:pPr>
-            <a:r>
-              <a:rPr lang="en-US" sz="1000" dirty="0"/>
-              <a:t>3 My group members help explain things that I do not understand.</a:t>
-            </a:r>
-          </a:p>
-          <a:p>
-            <a:pPr marL="0" indent="0">
-              <a:buNone/>
-            </a:pPr>
-            <a:r>
-              <a:rPr lang="en-US" sz="1000" dirty="0"/>
-              <a:t>4 When I work in a group, I am able to share my ideas.</a:t>
-            </a:r>
-          </a:p>
-          <a:p>
-            <a:pPr marL="0" indent="0">
-              <a:buNone/>
-            </a:pPr>
-            <a:r>
-              <a:rPr lang="en-US" sz="1000" dirty="0"/>
-              <a:t>5 My group members make me feel that I am not as smart as they are.</a:t>
-            </a:r>
-          </a:p>
-          <a:p>
-            <a:pPr marL="0" indent="0">
-              <a:buNone/>
-            </a:pPr>
-            <a:r>
-              <a:rPr lang="en-US" sz="1000" dirty="0"/>
-              <a:t>6 The material is easier to understand when I work with other students.</a:t>
-            </a:r>
-          </a:p>
-          <a:p>
-            <a:pPr marL="0" indent="0">
-              <a:buNone/>
-            </a:pPr>
-            <a:r>
-              <a:rPr lang="en-US" sz="1000" dirty="0"/>
-              <a:t>7 The workload is usually less when I work with other students.</a:t>
-            </a:r>
-          </a:p>
-          <a:p>
-            <a:pPr marL="0" indent="0">
-              <a:buNone/>
-            </a:pPr>
-            <a:r>
-              <a:rPr lang="en-US" sz="1000" dirty="0"/>
-              <a:t>8 My group members respect my opinions.</a:t>
-            </a:r>
-          </a:p>
-          <a:p>
-            <a:pPr marL="0" indent="0">
-              <a:buNone/>
-            </a:pPr>
-            <a:r>
-              <a:rPr lang="en-US" sz="1000" dirty="0"/>
-              <a:t>9 I feel I am part of what is going on in the group.</a:t>
-            </a:r>
-          </a:p>
-          <a:p>
-            <a:pPr marL="0" indent="0">
-              <a:buNone/>
-            </a:pPr>
-            <a:r>
-              <a:rPr lang="en-US" sz="1000" dirty="0"/>
-              <a:t>10 I prefer when one student regularly takes on a leadership role.</a:t>
-            </a:r>
-          </a:p>
-          <a:p>
-            <a:pPr marL="0" indent="0">
-              <a:buNone/>
-            </a:pPr>
-            <a:r>
-              <a:rPr lang="en-US" sz="1000" dirty="0"/>
-              <a:t>11 I prefer when the leadership role rotates between students.</a:t>
-            </a:r>
-          </a:p>
-          <a:p>
-            <a:pPr marL="0" indent="0">
-              <a:buNone/>
-            </a:pPr>
-            <a:r>
-              <a:rPr lang="en-US" sz="1000" dirty="0"/>
-              <a:t>12 I do not think a group grade is fair.</a:t>
-            </a:r>
-          </a:p>
-          <a:p>
-            <a:pPr marL="0" indent="0">
-              <a:buNone/>
-            </a:pPr>
-            <a:r>
-              <a:rPr lang="en-US" sz="1000" dirty="0"/>
-              <a:t>13 I try to make sure my group members learn the material.</a:t>
-            </a:r>
-          </a:p>
-          <a:p>
-            <a:pPr marL="0" indent="0">
-              <a:buNone/>
-            </a:pPr>
-            <a:r>
-              <a:rPr lang="en-US" sz="1000" dirty="0"/>
-              <a:t>14 I learn to work with students who are different from me.</a:t>
-            </a:r>
-          </a:p>
-          <a:p>
-            <a:pPr marL="0" indent="0">
-              <a:buNone/>
-            </a:pPr>
-            <a:r>
-              <a:rPr lang="en-US" sz="1000" dirty="0"/>
-              <a:t>15 My group members do not care about my feelings.</a:t>
-            </a:r>
-          </a:p>
-          <a:p>
-            <a:pPr marL="0" indent="0">
-              <a:buNone/>
-            </a:pPr>
-            <a:r>
-              <a:rPr lang="en-US" sz="1000" dirty="0"/>
-              <a:t>16 I let the other students do most of the work.</a:t>
-            </a:r>
-          </a:p>
-          <a:p>
-            <a:pPr marL="0" indent="0">
-              <a:buNone/>
-            </a:pPr>
-            <a:r>
-              <a:rPr lang="en-US" sz="1000" dirty="0"/>
-              <a:t>17 I feel working in groups is a waste of time.</a:t>
-            </a:r>
-          </a:p>
-        </p:txBody>
-      </p:sp>
-      <p:sp>
-        <p:nvSpPr>
-          <p:cNvPr id="3" name="Content Placeholder 2">
-            <a:extLst>
-              <a:ext uri="{FF2B5EF4-FFF2-40B4-BE49-F238E27FC236}">
-                <a16:creationId xmlns:a16="http://schemas.microsoft.com/office/drawing/2014/main" id="{A63928E7-F26A-45E0-85C8-A3A2FA91D639}"/>
+                <a16:creationId xmlns:a16="http://schemas.microsoft.com/office/drawing/2014/main" id="{689D1293-3A52-D213-4DED-4814EE028890}"/>
               </a:ext>
             </a:extLst>
           </p:cNvPr>
@@ -8074,7 +8714,12 @@
             <p:ph sz="half" idx="2"/>
           </p:nvPr>
         </p:nvSpPr>
-        <p:spPr/>
+        <p:spPr>
+          <a:xfrm>
+            <a:off x="3200400" y="1295400"/>
+            <a:ext cx="5867400" cy="3562350"/>
+          </a:xfrm>
+        </p:spPr>
         <p:txBody>
           <a:bodyPr>
             <a:normAutofit/>
@@ -8085,139 +8730,305 @@
               <a:buNone/>
             </a:pPr>
             <a:r>
-              <a:rPr lang="en-US" sz="1000" dirty="0"/>
-              <a:t>18 I have to work with students who are not as smart as I am.</a:t>
-            </a:r>
-          </a:p>
-          <a:p>
-            <a:pPr marL="0" indent="0">
-              <a:buNone/>
+              <a:rPr lang="en-US" sz="1800" dirty="0"/>
+              <a:t>Factor loadings in common:</a:t>
+            </a:r>
+          </a:p>
+          <a:p>
+            <a:pPr marL="457200" indent="-457200">
+              <a:buFont typeface="+mj-lt"/>
+              <a:buAutoNum type="arabicPeriod"/>
             </a:pPr>
             <a:r>
-              <a:rPr lang="en-US" sz="1000" dirty="0"/>
-              <a:t>19 When I work with other students the work is divided equally.</a:t>
-            </a:r>
-          </a:p>
-          <a:p>
-            <a:pPr marL="0" indent="0">
-              <a:buNone/>
+              <a:rPr lang="en-US" sz="1400" dirty="0"/>
+              <a:t>'When I work in a group, I end up doing most of the work.', 'The work takes more time to complete when I work with other students.', 'The workload is usually less when I work with other students.', 'I do not think a group grade is fair.', 'I feel working in groups is a waste of time.', 'When I work with other students the work is divided equally.’</a:t>
+            </a:r>
+          </a:p>
+          <a:p>
+            <a:pPr marL="457200" indent="-457200">
+              <a:buFont typeface="+mj-lt"/>
+              <a:buAutoNum type="arabicPeriod"/>
             </a:pPr>
             <a:r>
-              <a:rPr lang="en-US" sz="1000" dirty="0"/>
-              <a:t>20 We cannot complete the assignment unless everyone contributes.</a:t>
-            </a:r>
-          </a:p>
-          <a:p>
-            <a:pPr marL="0" indent="0">
-              <a:buNone/>
+              <a:rPr lang="en-US" sz="1400" dirty="0"/>
+              <a:t>'You have a certain amount of physics intelligence, and you can’t really do much to change it.', 'Your physics intelligence is something about you that you can change.', 'You can learn new things, but you can’t really change your basic physics intelligence.’</a:t>
+            </a:r>
+          </a:p>
+          <a:p>
+            <a:pPr marL="457200" indent="-457200">
+              <a:buFont typeface="+mj-lt"/>
+              <a:buAutoNum type="arabicPeriod"/>
             </a:pPr>
             <a:r>
-              <a:rPr lang="en-US" sz="1000" dirty="0"/>
-              <a:t>21 I prefer to take on tasks that I’m already good at.</a:t>
-            </a:r>
-          </a:p>
-          <a:p>
-            <a:pPr marL="0" indent="0">
-              <a:buNone/>
+              <a:rPr lang="en-US" sz="1400" dirty="0"/>
+              <a:t>'I feel I am part of what is going on in the group.’, 'I learn to work with students who are different from me.’, 'I also learn when I teach the material to my group members.’</a:t>
+            </a:r>
+          </a:p>
+          <a:p>
+            <a:pPr marL="457200" indent="-457200">
+              <a:buFont typeface="+mj-lt"/>
+              <a:buAutoNum type="arabicPeriod"/>
             </a:pPr>
             <a:r>
-              <a:rPr lang="en-US" sz="1000" dirty="0"/>
-              <a:t>22 I prefer to take on tasks that will help me better learn the material.</a:t>
-            </a:r>
-          </a:p>
-          <a:p>
-            <a:pPr marL="0" indent="0">
-              <a:buNone/>
-            </a:pPr>
-            <a:r>
-              <a:rPr lang="en-US" sz="1000" dirty="0"/>
-              <a:t>23 I also learn when I teach the material to my group members.</a:t>
-            </a:r>
-          </a:p>
-          <a:p>
-            <a:pPr marL="0" indent="0">
-              <a:buNone/>
-            </a:pPr>
-            <a:r>
-              <a:rPr lang="en-US" sz="1000" dirty="0"/>
-              <a:t>24 I become frustrated when my group members do not understand the material.</a:t>
-            </a:r>
-          </a:p>
-          <a:p>
-            <a:pPr marL="0" indent="0">
-              <a:buNone/>
-            </a:pPr>
-            <a:r>
-              <a:rPr lang="en-US" sz="1000" dirty="0"/>
-              <a:t>25 Everyone’s ideas are needed if we are going to be successful.</a:t>
-            </a:r>
-          </a:p>
-          <a:p>
-            <a:pPr marL="0" indent="0">
-              <a:buNone/>
-            </a:pPr>
-            <a:r>
-              <a:rPr lang="en-US" sz="1000" dirty="0"/>
-              <a:t>26 When I work with other students, we spend too much time talking about other things.</a:t>
-            </a:r>
-          </a:p>
-          <a:p>
-            <a:pPr marL="0" indent="0">
-              <a:buNone/>
-            </a:pPr>
-            <a:r>
-              <a:rPr lang="en-US" sz="1000" dirty="0"/>
-              <a:t>27 My group did higher quality work when my group members worked on tasks together.</a:t>
-            </a:r>
-          </a:p>
-          <a:p>
-            <a:pPr marL="0" indent="0">
-              <a:buNone/>
-            </a:pPr>
-            <a:r>
-              <a:rPr lang="en-US" sz="1000" dirty="0"/>
-              <a:t>28 My group did higher quality work when group members worked on different tasks at the same time.</a:t>
-            </a:r>
-          </a:p>
-          <a:p>
-            <a:pPr marL="0" indent="0">
-              <a:buNone/>
-            </a:pPr>
-            <a:r>
-              <a:rPr lang="en-US" sz="1000" dirty="0"/>
-              <a:t>29 You have a certain amount of physics intelligence, and you can’t really do much to change it.</a:t>
-            </a:r>
-          </a:p>
-          <a:p>
-            <a:pPr marL="0" indent="0">
-              <a:buNone/>
-            </a:pPr>
-            <a:r>
-              <a:rPr lang="en-US" sz="1000" dirty="0"/>
-              <a:t>30 Your physics intelligence is something about you that you can change.</a:t>
-            </a:r>
-          </a:p>
-          <a:p>
-            <a:pPr marL="0" indent="0">
-              <a:buNone/>
-            </a:pPr>
-            <a:r>
-              <a:rPr lang="en-US" sz="1000" dirty="0"/>
-              <a:t>31 You can learn new things, but you can’t really change your basic physics intelligence.</a:t>
-            </a:r>
-          </a:p>
-          <a:p>
-            <a:pPr marL="0" indent="0">
-              <a:buNone/>
-            </a:pPr>
-            <a:endParaRPr lang="en-US" sz="1000" dirty="0"/>
+              <a:rPr lang="en-US" sz="1400" dirty="0"/>
+              <a:t>'I have to work with students who are not as smart as I am.', 'I become frustrated when my group members do not understand the material.'</a:t>
+            </a:r>
           </a:p>
         </p:txBody>
       </p:sp>
+      <p:pic>
+        <p:nvPicPr>
+          <p:cNvPr id="9" name="Picture 8">
+            <a:extLst>
+              <a:ext uri="{FF2B5EF4-FFF2-40B4-BE49-F238E27FC236}">
+                <a16:creationId xmlns:a16="http://schemas.microsoft.com/office/drawing/2014/main" id="{A61B7F3A-3B05-2D50-DBC0-66EEE5C5528D}"/>
+              </a:ext>
+            </a:extLst>
+          </p:cNvPr>
+          <p:cNvPicPr>
+            <a:picLocks noChangeAspect="1"/>
+          </p:cNvPicPr>
+          <p:nvPr/>
+        </p:nvPicPr>
+        <p:blipFill rotWithShape="1">
+          <a:blip r:embed="rId3">
+            <a:extLst>
+              <a:ext uri="{28A0092B-C50C-407E-A947-70E740481C1C}">
+                <a14:useLocalDpi xmlns:a14="http://schemas.microsoft.com/office/drawing/2010/main" val="0"/>
+              </a:ext>
+            </a:extLst>
+          </a:blip>
+          <a:srcRect l="62518" r="19194"/>
+          <a:stretch/>
+        </p:blipFill>
+        <p:spPr>
+          <a:xfrm>
+            <a:off x="0" y="1303028"/>
+            <a:ext cx="936500" cy="3840472"/>
+          </a:xfrm>
+          <a:prstGeom prst="rect">
+            <a:avLst/>
+          </a:prstGeom>
+        </p:spPr>
+      </p:pic>
+      <p:pic>
+        <p:nvPicPr>
+          <p:cNvPr id="10" name="Picture 9">
+            <a:extLst>
+              <a:ext uri="{FF2B5EF4-FFF2-40B4-BE49-F238E27FC236}">
+                <a16:creationId xmlns:a16="http://schemas.microsoft.com/office/drawing/2014/main" id="{F878461D-5AF0-63F0-434E-794940D7D412}"/>
+              </a:ext>
+            </a:extLst>
+          </p:cNvPr>
+          <p:cNvPicPr>
+            <a:picLocks noChangeAspect="1"/>
+          </p:cNvPicPr>
+          <p:nvPr/>
+        </p:nvPicPr>
+        <p:blipFill rotWithShape="1">
+          <a:blip r:embed="rId4">
+            <a:extLst>
+              <a:ext uri="{28A0092B-C50C-407E-A947-70E740481C1C}">
+                <a14:useLocalDpi xmlns:a14="http://schemas.microsoft.com/office/drawing/2010/main" val="0"/>
+              </a:ext>
+            </a:extLst>
+          </a:blip>
+          <a:srcRect l="61644" r="20068"/>
+          <a:stretch/>
+        </p:blipFill>
+        <p:spPr>
+          <a:xfrm>
+            <a:off x="892300" y="1303028"/>
+            <a:ext cx="936500" cy="3840472"/>
+          </a:xfrm>
+          <a:prstGeom prst="rect">
+            <a:avLst/>
+          </a:prstGeom>
+        </p:spPr>
+      </p:pic>
+      <p:pic>
+        <p:nvPicPr>
+          <p:cNvPr id="11" name="Picture 10">
+            <a:extLst>
+              <a:ext uri="{FF2B5EF4-FFF2-40B4-BE49-F238E27FC236}">
+                <a16:creationId xmlns:a16="http://schemas.microsoft.com/office/drawing/2014/main" id="{2601E58B-34B5-FD9A-2080-FB84A482E9B9}"/>
+              </a:ext>
+            </a:extLst>
+          </p:cNvPr>
+          <p:cNvPicPr>
+            <a:picLocks noChangeAspect="1"/>
+          </p:cNvPicPr>
+          <p:nvPr/>
+        </p:nvPicPr>
+        <p:blipFill rotWithShape="1">
+          <a:blip r:embed="rId5">
+            <a:extLst>
+              <a:ext uri="{28A0092B-C50C-407E-A947-70E740481C1C}">
+                <a14:useLocalDpi xmlns:a14="http://schemas.microsoft.com/office/drawing/2010/main" val="0"/>
+              </a:ext>
+            </a:extLst>
+          </a:blip>
+          <a:srcRect l="58037" r="18153"/>
+          <a:stretch/>
+        </p:blipFill>
+        <p:spPr>
+          <a:xfrm>
+            <a:off x="1828800" y="1303028"/>
+            <a:ext cx="1219200" cy="3840472"/>
+          </a:xfrm>
+          <a:prstGeom prst="rect">
+            <a:avLst/>
+          </a:prstGeom>
+        </p:spPr>
+      </p:pic>
+      <p:sp>
+        <p:nvSpPr>
+          <p:cNvPr id="12" name="TextBox 11">
+            <a:extLst>
+              <a:ext uri="{FF2B5EF4-FFF2-40B4-BE49-F238E27FC236}">
+                <a16:creationId xmlns:a16="http://schemas.microsoft.com/office/drawing/2014/main" id="{32B1BF08-6808-F66F-4F6D-27DADB6A11F4}"/>
+              </a:ext>
+            </a:extLst>
+          </p:cNvPr>
+          <p:cNvSpPr txBox="1"/>
+          <p:nvPr/>
+        </p:nvSpPr>
+        <p:spPr>
+          <a:xfrm>
+            <a:off x="395682" y="1166305"/>
+            <a:ext cx="298480" cy="338554"/>
+          </a:xfrm>
+          <a:prstGeom prst="rect">
+            <a:avLst/>
+          </a:prstGeom>
+          <a:noFill/>
+        </p:spPr>
+        <p:txBody>
+          <a:bodyPr wrap="none" rtlCol="0">
+            <a:spAutoFit/>
+          </a:bodyPr>
+          <a:lstStyle/>
+          <a:p>
+            <a:r>
+              <a:rPr lang="en-US" sz="1600" dirty="0"/>
+              <a:t>5</a:t>
+            </a:r>
+          </a:p>
+        </p:txBody>
+      </p:sp>
+      <p:sp>
+        <p:nvSpPr>
+          <p:cNvPr id="13" name="TextBox 12">
+            <a:extLst>
+              <a:ext uri="{FF2B5EF4-FFF2-40B4-BE49-F238E27FC236}">
+                <a16:creationId xmlns:a16="http://schemas.microsoft.com/office/drawing/2014/main" id="{BEDC58A3-FD20-2CC1-CAAA-E07BF825980E}"/>
+              </a:ext>
+            </a:extLst>
+          </p:cNvPr>
+          <p:cNvSpPr txBox="1"/>
+          <p:nvPr/>
+        </p:nvSpPr>
+        <p:spPr>
+          <a:xfrm>
+            <a:off x="1244460" y="1166305"/>
+            <a:ext cx="298480" cy="338554"/>
+          </a:xfrm>
+          <a:prstGeom prst="rect">
+            <a:avLst/>
+          </a:prstGeom>
+          <a:noFill/>
+        </p:spPr>
+        <p:txBody>
+          <a:bodyPr wrap="none" rtlCol="0">
+            <a:spAutoFit/>
+          </a:bodyPr>
+          <a:lstStyle/>
+          <a:p>
+            <a:r>
+              <a:rPr lang="en-US" sz="1600" dirty="0"/>
+              <a:t>6</a:t>
+            </a:r>
+          </a:p>
+        </p:txBody>
+      </p:sp>
+      <p:sp>
+        <p:nvSpPr>
+          <p:cNvPr id="14" name="TextBox 13">
+            <a:extLst>
+              <a:ext uri="{FF2B5EF4-FFF2-40B4-BE49-F238E27FC236}">
+                <a16:creationId xmlns:a16="http://schemas.microsoft.com/office/drawing/2014/main" id="{306CCF9F-4281-6178-874A-B7B61D3058A3}"/>
+              </a:ext>
+            </a:extLst>
+          </p:cNvPr>
+          <p:cNvSpPr txBox="1"/>
+          <p:nvPr/>
+        </p:nvSpPr>
+        <p:spPr>
+          <a:xfrm>
+            <a:off x="1890318" y="1161901"/>
+            <a:ext cx="1374094" cy="338554"/>
+          </a:xfrm>
+          <a:prstGeom prst="rect">
+            <a:avLst/>
+          </a:prstGeom>
+          <a:noFill/>
+        </p:spPr>
+        <p:txBody>
+          <a:bodyPr wrap="none" rtlCol="0">
+            <a:spAutoFit/>
+          </a:bodyPr>
+          <a:lstStyle/>
+          <a:p>
+            <a:r>
+              <a:rPr lang="en-US" sz="1600" dirty="0"/>
+              <a:t>or 7 factors?</a:t>
+            </a:r>
+          </a:p>
+        </p:txBody>
+      </p:sp>
+      <p:cxnSp>
+        <p:nvCxnSpPr>
+          <p:cNvPr id="15" name="Straight Connector 14">
+            <a:extLst>
+              <a:ext uri="{FF2B5EF4-FFF2-40B4-BE49-F238E27FC236}">
+                <a16:creationId xmlns:a16="http://schemas.microsoft.com/office/drawing/2014/main" id="{8E2D0645-80AA-9219-D2B3-A55B8EA97857}"/>
+              </a:ext>
+            </a:extLst>
+          </p:cNvPr>
+          <p:cNvCxnSpPr>
+            <a:cxnSpLocks/>
+          </p:cNvCxnSpPr>
+          <p:nvPr/>
+        </p:nvCxnSpPr>
+        <p:spPr>
+          <a:xfrm>
+            <a:off x="2826327" y="1500455"/>
+            <a:ext cx="0" cy="3281095"/>
+          </a:xfrm>
+          <a:prstGeom prst="line">
+            <a:avLst/>
+          </a:prstGeom>
+          <a:effectLst/>
+        </p:spPr>
+        <p:style>
+          <a:lnRef idx="2">
+            <a:schemeClr val="accent1"/>
+          </a:lnRef>
+          <a:fillRef idx="0">
+            <a:schemeClr val="accent1"/>
+          </a:fillRef>
+          <a:effectRef idx="1">
+            <a:schemeClr val="accent1"/>
+          </a:effectRef>
+          <a:fontRef idx="minor">
+            <a:schemeClr val="tx1"/>
+          </a:fontRef>
+        </p:style>
+      </p:cxnSp>
     </p:spTree>
     <p:extLst>
       <p:ext uri="{BB962C8B-B14F-4D97-AF65-F5344CB8AC3E}">
-        <p14:creationId xmlns:p14="http://schemas.microsoft.com/office/powerpoint/2010/main" val="4089012535"/>
+        <p14:creationId xmlns:p14="http://schemas.microsoft.com/office/powerpoint/2010/main" val="2602901292"/>
       </p:ext>
     </p:extLst>
   </p:cSld>
@@ -8269,7 +9080,7 @@
           <a:p>
             <a:r>
               <a:rPr lang="en-US" sz="3200" dirty="0"/>
-              <a:t>Factor Analysis</a:t>
+              <a:t>Items</a:t>
             </a:r>
           </a:p>
         </p:txBody>
@@ -8293,7 +9104,7 @@
         <p:spPr/>
         <p:txBody>
           <a:bodyPr>
-            <a:normAutofit lnSpcReduction="10000"/>
+            <a:normAutofit/>
           </a:bodyPr>
           <a:lstStyle/>
           <a:p>
@@ -8301,48 +9112,171 @@
               <a:buNone/>
             </a:pPr>
             <a:r>
-              <a:rPr lang="en-US" sz="1600" dirty="0"/>
-              <a:t>Items that failed to load on any number of factors</a:t>
-            </a:r>
-          </a:p>
-          <a:p>
-            <a:r>
-              <a:rPr lang="en-US" sz="1600" dirty="0"/>
-              <a:t>10: I prefer when one student regularly takes on a leadership role.</a:t>
-            </a:r>
-          </a:p>
-          <a:p>
-            <a:r>
-              <a:rPr lang="en-US" sz="1600" dirty="0"/>
-              <a:t>20: We cannot complete the assignment unless everyone contributes.</a:t>
-            </a:r>
-          </a:p>
-          <a:p>
-            <a:r>
-              <a:rPr lang="en-US" sz="1600" dirty="0"/>
-              <a:t>21: I prefer to take on tasks that I’m already good at.</a:t>
-            </a:r>
-          </a:p>
-          <a:p>
-            <a:r>
-              <a:rPr lang="en-US" sz="1600" dirty="0"/>
-              <a:t>26: When I work with other students, we spend too much time talking about other things.</a:t>
-            </a:r>
-          </a:p>
-          <a:p>
-            <a:r>
-              <a:rPr lang="en-US" sz="1600" dirty="0"/>
-              <a:t>28: My group did higher quality work when group members worked on different tasks at the same time.</a:t>
+              <a:rPr lang="en-US" sz="1000" dirty="0"/>
+              <a:t>0 When I work in a group, I do higher quality work.</a:t>
+            </a:r>
+          </a:p>
+          <a:p>
+            <a:pPr marL="0" indent="0">
+              <a:buNone/>
+            </a:pPr>
+            <a:r>
+              <a:rPr lang="en-US" sz="1000" dirty="0"/>
+              <a:t>1 When I work in a group, I end up doing most of the work.</a:t>
+            </a:r>
+          </a:p>
+          <a:p>
+            <a:pPr marL="0" indent="0">
+              <a:buNone/>
+            </a:pPr>
+            <a:r>
+              <a:rPr lang="en-US" sz="1000" dirty="0"/>
+              <a:t>2 The work takes more time to complete when I work with other students.</a:t>
+            </a:r>
+          </a:p>
+          <a:p>
+            <a:pPr marL="0" indent="0">
+              <a:buNone/>
+            </a:pPr>
+            <a:r>
+              <a:rPr lang="en-US" sz="1000" dirty="0"/>
+              <a:t>3 My group members help explain things that I do not understand.</a:t>
+            </a:r>
+          </a:p>
+          <a:p>
+            <a:pPr marL="0" indent="0">
+              <a:buNone/>
+            </a:pPr>
+            <a:r>
+              <a:rPr lang="en-US" sz="1000" dirty="0"/>
+              <a:t>4 When I work in a group, I am able to share my ideas.</a:t>
+            </a:r>
+          </a:p>
+          <a:p>
+            <a:pPr marL="0" indent="0">
+              <a:buNone/>
+            </a:pPr>
+            <a:r>
+              <a:rPr lang="en-US" sz="1000" dirty="0"/>
+              <a:t>5 My group members make me feel that I am not as smart as they are.</a:t>
+            </a:r>
+          </a:p>
+          <a:p>
+            <a:pPr marL="0" indent="0">
+              <a:buNone/>
+            </a:pPr>
+            <a:r>
+              <a:rPr lang="en-US" sz="1000" dirty="0"/>
+              <a:t>6 The material is easier to understand when I work with other students.</a:t>
+            </a:r>
+          </a:p>
+          <a:p>
+            <a:pPr marL="0" indent="0">
+              <a:buNone/>
+            </a:pPr>
+            <a:r>
+              <a:rPr lang="en-US" sz="1000" dirty="0"/>
+              <a:t>7 The workload is usually less when I work with other students.</a:t>
+            </a:r>
+          </a:p>
+          <a:p>
+            <a:pPr marL="0" indent="0">
+              <a:buNone/>
+            </a:pPr>
+            <a:r>
+              <a:rPr lang="en-US" sz="1000" dirty="0"/>
+              <a:t>8 My group members respect my opinions.</a:t>
+            </a:r>
+          </a:p>
+          <a:p>
+            <a:pPr marL="0" indent="0">
+              <a:buNone/>
+            </a:pPr>
+            <a:r>
+              <a:rPr lang="en-US" sz="1000" dirty="0"/>
+              <a:t>9 I feel I am part of what is going on in the group.</a:t>
+            </a:r>
+          </a:p>
+          <a:p>
+            <a:pPr marL="0" indent="0">
+              <a:buNone/>
+            </a:pPr>
+            <a:r>
+              <a:rPr lang="en-US" sz="1000" dirty="0"/>
+              <a:t>10 I prefer when one student regularly takes on a leadership role.</a:t>
+            </a:r>
+          </a:p>
+          <a:p>
+            <a:pPr marL="0" indent="0">
+              <a:buNone/>
+            </a:pPr>
+            <a:r>
+              <a:rPr lang="en-US" sz="1000" dirty="0"/>
+              <a:t>11 I prefer when the leadership role rotates between students.</a:t>
+            </a:r>
+          </a:p>
+          <a:p>
+            <a:pPr marL="0" indent="0">
+              <a:buNone/>
+            </a:pPr>
+            <a:r>
+              <a:rPr lang="en-US" sz="1000" dirty="0"/>
+              <a:t>12 I do not think a group grade is fair.</a:t>
+            </a:r>
+          </a:p>
+          <a:p>
+            <a:pPr marL="0" indent="0">
+              <a:buNone/>
+            </a:pPr>
+            <a:r>
+              <a:rPr lang="en-US" sz="1000" dirty="0"/>
+              <a:t>13 I try to make sure my group members learn the material.</a:t>
+            </a:r>
+          </a:p>
+          <a:p>
+            <a:pPr marL="0" indent="0">
+              <a:buNone/>
+            </a:pPr>
+            <a:r>
+              <a:rPr lang="en-US" sz="1000" dirty="0"/>
+              <a:t>14 I learn to work with students who are different from me.</a:t>
+            </a:r>
+          </a:p>
+          <a:p>
+            <a:pPr marL="0" indent="0">
+              <a:buNone/>
+            </a:pPr>
+            <a:r>
+              <a:rPr lang="en-US" sz="1000" dirty="0"/>
+              <a:t>15 My group members do not care about my feelings.</a:t>
+            </a:r>
+          </a:p>
+          <a:p>
+            <a:pPr marL="0" indent="0">
+              <a:buNone/>
+            </a:pPr>
+            <a:r>
+              <a:rPr lang="en-US" sz="1000" dirty="0"/>
+              <a:t>16 I let the other students do most of the work.</a:t>
+            </a:r>
+          </a:p>
+          <a:p>
+            <a:pPr marL="0" indent="0">
+              <a:buNone/>
+            </a:pPr>
+            <a:r>
+              <a:rPr lang="en-US" sz="1000" dirty="0"/>
+              <a:t>17 I feel working in groups is a waste of time.</a:t>
             </a:r>
           </a:p>
         </p:txBody>
       </p:sp>
       <p:sp>
         <p:nvSpPr>
-          <p:cNvPr id="4" name="Content Placeholder 3">
+          <p:cNvPr id="3" name="Content Placeholder 2">
             <a:extLst>
               <a:ext uri="{FF2B5EF4-FFF2-40B4-BE49-F238E27FC236}">
-                <a16:creationId xmlns:a16="http://schemas.microsoft.com/office/drawing/2014/main" id="{A041E303-5AC9-4A46-A51C-2077DBF7BA3A}"/>
+                <a16:creationId xmlns:a16="http://schemas.microsoft.com/office/drawing/2014/main" id="{A63928E7-F26A-45E0-85C8-A3A2FA91D639}"/>
               </a:ext>
             </a:extLst>
           </p:cNvPr>
@@ -8353,557 +9287,150 @@
             <p:ph sz="half" idx="2"/>
           </p:nvPr>
         </p:nvSpPr>
-        <p:spPr>
-          <a:xfrm>
-            <a:off x="4648202" y="1295400"/>
-            <a:ext cx="4038600" cy="3562350"/>
-          </a:xfrm>
-        </p:spPr>
+        <p:spPr/>
         <p:txBody>
           <a:bodyPr>
-            <a:normAutofit lnSpcReduction="10000"/>
+            <a:normAutofit/>
           </a:bodyPr>
           <a:lstStyle/>
           <a:p>
-            <a:pPr marL="0" marR="0" lvl="0" indent="0" algn="l" defTabSz="457200" rtl="0" eaLnBrk="1" fontAlgn="auto" latinLnBrk="0" hangingPunct="1">
-              <a:lnSpc>
-                <a:spcPct val="100000"/>
-              </a:lnSpc>
-              <a:spcBef>
-                <a:spcPct val="20000"/>
-              </a:spcBef>
-              <a:spcAft>
-                <a:spcPts val="0"/>
-              </a:spcAft>
-              <a:buClrTx/>
-              <a:buSzTx/>
-              <a:buFont typeface="Arial"/>
+            <a:pPr marL="0" indent="0">
               <a:buNone/>
-              <a:tabLst/>
-              <a:defRPr/>
             </a:pPr>
             <a:r>
-              <a:rPr kumimoji="0" lang="en-US" sz="1000" b="0" i="0" u="none" strike="noStrike" kern="1200" cap="none" spc="0" normalizeH="0" baseline="0" noProof="0" dirty="0">
-                <a:ln>
-                  <a:noFill/>
-                </a:ln>
-                <a:solidFill>
-                  <a:prstClr val="black">
-                    <a:lumMod val="75000"/>
-                    <a:lumOff val="25000"/>
-                  </a:prstClr>
-                </a:solidFill>
-                <a:effectLst/>
-                <a:uLnTx/>
-                <a:uFillTx/>
-                <a:latin typeface="Calibri"/>
-                <a:ea typeface="+mn-ea"/>
-                <a:cs typeface="+mn-cs"/>
-              </a:rPr>
-              <a:t>Items that failed to load .40 or higher were deleted as well as, items that loaded on more than one factor. Ultimately, 11 items were eliminated from the SAGE questionnaire</a:t>
-            </a:r>
-          </a:p>
-          <a:p>
-            <a:pPr marL="342900" marR="0" lvl="0" indent="-342900" algn="l" defTabSz="457200" rtl="0" eaLnBrk="1" fontAlgn="auto" latinLnBrk="0" hangingPunct="1">
-              <a:lnSpc>
-                <a:spcPct val="100000"/>
-              </a:lnSpc>
-              <a:spcBef>
-                <a:spcPct val="20000"/>
-              </a:spcBef>
-              <a:spcAft>
-                <a:spcPts val="0"/>
-              </a:spcAft>
-              <a:buClrTx/>
-              <a:buSzTx/>
-              <a:buFont typeface="Arial"/>
-              <a:buChar char="•"/>
-              <a:tabLst/>
-              <a:defRPr/>
+              <a:rPr lang="en-US" sz="1000" dirty="0"/>
+              <a:t>18 I have to work with students who are not as smart as I am.</a:t>
+            </a:r>
+          </a:p>
+          <a:p>
+            <a:pPr marL="0" indent="0">
+              <a:buNone/>
             </a:pPr>
             <a:r>
-              <a:rPr kumimoji="0" lang="en-US" sz="1000" b="0" i="0" u="none" strike="noStrike" kern="1200" cap="none" spc="0" normalizeH="0" baseline="0" noProof="0" dirty="0">
-                <a:ln>
-                  <a:noFill/>
-                </a:ln>
-                <a:solidFill>
-                  <a:prstClr val="black">
-                    <a:lumMod val="75000"/>
-                    <a:lumOff val="25000"/>
-                  </a:prstClr>
-                </a:solidFill>
-                <a:effectLst/>
-                <a:uLnTx/>
-                <a:uFillTx/>
-                <a:latin typeface="Calibri"/>
-                <a:ea typeface="+mn-ea"/>
-                <a:cs typeface="+mn-cs"/>
-              </a:rPr>
-              <a:t>*2: When I work in a group, I end up doing most of the work.</a:t>
-            </a:r>
-          </a:p>
-          <a:p>
-            <a:pPr marL="342900" marR="0" lvl="0" indent="-342900" algn="l" defTabSz="457200" rtl="0" eaLnBrk="1" fontAlgn="auto" latinLnBrk="0" hangingPunct="1">
-              <a:lnSpc>
-                <a:spcPct val="100000"/>
-              </a:lnSpc>
-              <a:spcBef>
-                <a:spcPct val="20000"/>
-              </a:spcBef>
-              <a:spcAft>
-                <a:spcPts val="0"/>
-              </a:spcAft>
-              <a:buClrTx/>
-              <a:buSzTx/>
-              <a:buFont typeface="Arial"/>
-              <a:buChar char="•"/>
-              <a:tabLst/>
-              <a:defRPr/>
+              <a:rPr lang="en-US" sz="1000" dirty="0"/>
+              <a:t>19 When I work with other students the work is divided equally.</a:t>
+            </a:r>
+          </a:p>
+          <a:p>
+            <a:pPr marL="0" indent="0">
+              <a:buNone/>
             </a:pPr>
             <a:r>
-              <a:rPr kumimoji="0" lang="en-US" sz="1000" b="0" i="0" u="none" strike="noStrike" kern="1200" cap="none" spc="0" normalizeH="0" baseline="0" noProof="0" dirty="0">
-                <a:ln>
-                  <a:noFill/>
-                </a:ln>
-                <a:solidFill>
-                  <a:prstClr val="black">
-                    <a:lumMod val="75000"/>
-                    <a:lumOff val="25000"/>
-                  </a:prstClr>
-                </a:solidFill>
-                <a:effectLst/>
-                <a:uLnTx/>
-                <a:uFillTx/>
-                <a:latin typeface="Calibri"/>
-                <a:ea typeface="+mn-ea"/>
-                <a:cs typeface="+mn-cs"/>
-              </a:rPr>
-              <a:t>3: When I work with other students, I am able to work at my own pace</a:t>
-            </a:r>
-          </a:p>
-          <a:p>
-            <a:pPr marL="342900" marR="0" lvl="0" indent="-342900" algn="l" defTabSz="457200" rtl="0" eaLnBrk="1" fontAlgn="auto" latinLnBrk="0" hangingPunct="1">
-              <a:lnSpc>
-                <a:spcPct val="100000"/>
-              </a:lnSpc>
-              <a:spcBef>
-                <a:spcPct val="20000"/>
-              </a:spcBef>
-              <a:spcAft>
-                <a:spcPts val="0"/>
-              </a:spcAft>
-              <a:buClrTx/>
-              <a:buSzTx/>
-              <a:buFont typeface="Arial"/>
-              <a:buChar char="•"/>
-              <a:tabLst/>
-              <a:defRPr/>
+              <a:rPr lang="en-US" sz="1000" dirty="0"/>
+              <a:t>20 We cannot complete the assignment unless everyone contributes.</a:t>
+            </a:r>
+          </a:p>
+          <a:p>
+            <a:pPr marL="0" indent="0">
+              <a:buNone/>
             </a:pPr>
             <a:r>
-              <a:rPr kumimoji="0" lang="en-US" sz="1000" b="0" i="0" u="none" strike="noStrike" kern="1200" cap="none" spc="0" normalizeH="0" baseline="0" noProof="0" dirty="0">
-                <a:ln>
-                  <a:noFill/>
-                </a:ln>
-                <a:solidFill>
-                  <a:prstClr val="black">
-                    <a:lumMod val="75000"/>
-                    <a:lumOff val="25000"/>
-                  </a:prstClr>
-                </a:solidFill>
-                <a:effectLst/>
-                <a:uLnTx/>
-                <a:uFillTx/>
-                <a:latin typeface="Calibri"/>
-                <a:ea typeface="+mn-ea"/>
-                <a:cs typeface="+mn-cs"/>
-              </a:rPr>
-              <a:t>15: My group members get a good grade even if they do not do much work.</a:t>
-            </a:r>
-          </a:p>
-          <a:p>
-            <a:pPr marL="342900" marR="0" lvl="0" indent="-342900" algn="l" defTabSz="457200" rtl="0" eaLnBrk="1" fontAlgn="auto" latinLnBrk="0" hangingPunct="1">
-              <a:lnSpc>
-                <a:spcPct val="100000"/>
-              </a:lnSpc>
-              <a:spcBef>
-                <a:spcPct val="20000"/>
-              </a:spcBef>
-              <a:spcAft>
-                <a:spcPts val="0"/>
-              </a:spcAft>
-              <a:buClrTx/>
-              <a:buSzTx/>
-              <a:buFont typeface="Arial"/>
-              <a:buChar char="•"/>
-              <a:tabLst/>
-              <a:defRPr/>
+              <a:rPr lang="en-US" sz="1000" dirty="0"/>
+              <a:t>21 I prefer to take on tasks that I’m already good at.</a:t>
+            </a:r>
+          </a:p>
+          <a:p>
+            <a:pPr marL="0" indent="0">
+              <a:buNone/>
             </a:pPr>
             <a:r>
-              <a:rPr kumimoji="0" lang="en-US" sz="1000" b="0" i="0" u="none" strike="noStrike" kern="1200" cap="none" spc="0" normalizeH="0" baseline="0" noProof="0" dirty="0">
-                <a:ln>
-                  <a:noFill/>
-                </a:ln>
-                <a:solidFill>
-                  <a:prstClr val="black">
-                    <a:lumMod val="75000"/>
-                    <a:lumOff val="25000"/>
-                  </a:prstClr>
-                </a:solidFill>
-                <a:effectLst/>
-                <a:uLnTx/>
-                <a:uFillTx/>
-                <a:latin typeface="Calibri"/>
-                <a:ea typeface="+mn-ea"/>
-                <a:cs typeface="+mn-cs"/>
-              </a:rPr>
-              <a:t>18: One student usually makes the decisions in the group</a:t>
-            </a:r>
-          </a:p>
-          <a:p>
-            <a:pPr marL="342900" marR="0" lvl="0" indent="-342900" algn="l" defTabSz="457200" rtl="0" eaLnBrk="1" fontAlgn="auto" latinLnBrk="0" hangingPunct="1">
-              <a:lnSpc>
-                <a:spcPct val="100000"/>
-              </a:lnSpc>
-              <a:spcBef>
-                <a:spcPct val="20000"/>
-              </a:spcBef>
-              <a:spcAft>
-                <a:spcPts val="0"/>
-              </a:spcAft>
-              <a:buClrTx/>
-              <a:buSzTx/>
-              <a:buFont typeface="Arial"/>
-              <a:buChar char="•"/>
-              <a:tabLst/>
-              <a:defRPr/>
+              <a:rPr lang="en-US" sz="1000" dirty="0"/>
+              <a:t>22 I prefer to take on tasks that will help me better learn the material.</a:t>
+            </a:r>
+          </a:p>
+          <a:p>
+            <a:pPr marL="0" indent="0">
+              <a:buNone/>
             </a:pPr>
             <a:r>
-              <a:rPr kumimoji="0" lang="en-US" sz="1000" b="0" i="0" u="none" strike="noStrike" kern="1200" cap="none" spc="0" normalizeH="0" baseline="0" noProof="0" dirty="0">
-                <a:ln>
-                  <a:noFill/>
-                </a:ln>
-                <a:solidFill>
-                  <a:prstClr val="black">
-                    <a:lumMod val="75000"/>
-                    <a:lumOff val="25000"/>
-                  </a:prstClr>
-                </a:solidFill>
-                <a:effectLst/>
-                <a:uLnTx/>
-                <a:uFillTx/>
-                <a:latin typeface="Calibri"/>
-                <a:ea typeface="+mn-ea"/>
-                <a:cs typeface="+mn-cs"/>
-              </a:rPr>
-              <a:t>21: I do not think a group grade is fair</a:t>
-            </a:r>
-          </a:p>
-          <a:p>
-            <a:pPr marL="342900" marR="0" lvl="0" indent="-342900" algn="l" defTabSz="457200" rtl="0" eaLnBrk="1" fontAlgn="auto" latinLnBrk="0" hangingPunct="1">
-              <a:lnSpc>
-                <a:spcPct val="100000"/>
-              </a:lnSpc>
-              <a:spcBef>
-                <a:spcPct val="20000"/>
-              </a:spcBef>
-              <a:spcAft>
-                <a:spcPts val="0"/>
-              </a:spcAft>
-              <a:buClrTx/>
-              <a:buSzTx/>
-              <a:buFont typeface="Arial"/>
-              <a:buChar char="•"/>
-              <a:tabLst/>
-              <a:defRPr/>
+              <a:rPr lang="en-US" sz="1000" dirty="0"/>
+              <a:t>23 I also learn when I teach the material to my group members.</a:t>
+            </a:r>
+          </a:p>
+          <a:p>
+            <a:pPr marL="0" indent="0">
+              <a:buNone/>
             </a:pPr>
             <a:r>
-              <a:rPr kumimoji="0" lang="en-US" sz="1000" b="0" i="0" u="none" strike="noStrike" kern="1200" cap="none" spc="0" normalizeH="0" baseline="0" noProof="0" dirty="0">
-                <a:ln>
-                  <a:noFill/>
-                </a:ln>
-                <a:solidFill>
-                  <a:prstClr val="black">
-                    <a:lumMod val="75000"/>
-                    <a:lumOff val="25000"/>
-                  </a:prstClr>
-                </a:solidFill>
-                <a:effectLst/>
-                <a:uLnTx/>
-                <a:uFillTx/>
-                <a:latin typeface="Calibri"/>
-                <a:ea typeface="+mn-ea"/>
-                <a:cs typeface="+mn-cs"/>
-              </a:rPr>
-              <a:t>*22: I try to make sure my group members learn the material.</a:t>
-            </a:r>
-          </a:p>
-          <a:p>
-            <a:pPr marL="342900" marR="0" lvl="0" indent="-342900" algn="l" defTabSz="457200" rtl="0" eaLnBrk="1" fontAlgn="auto" latinLnBrk="0" hangingPunct="1">
-              <a:lnSpc>
-                <a:spcPct val="100000"/>
-              </a:lnSpc>
-              <a:spcBef>
-                <a:spcPct val="20000"/>
-              </a:spcBef>
-              <a:spcAft>
-                <a:spcPts val="0"/>
-              </a:spcAft>
-              <a:buClrTx/>
-              <a:buSzTx/>
-              <a:buFont typeface="Arial"/>
-              <a:buChar char="•"/>
-              <a:tabLst/>
-              <a:defRPr/>
+              <a:rPr lang="en-US" sz="1000" dirty="0"/>
+              <a:t>24 I become frustrated when my group members do not understand the material.</a:t>
+            </a:r>
+          </a:p>
+          <a:p>
+            <a:pPr marL="0" indent="0">
+              <a:buNone/>
             </a:pPr>
             <a:r>
-              <a:rPr kumimoji="0" lang="en-US" sz="1000" b="0" i="0" u="none" strike="noStrike" kern="1200" cap="none" spc="0" normalizeH="0" baseline="0" noProof="0" dirty="0">
-                <a:ln>
-                  <a:noFill/>
-                </a:ln>
-                <a:solidFill>
-                  <a:prstClr val="black">
-                    <a:lumMod val="75000"/>
-                    <a:lumOff val="25000"/>
-                  </a:prstClr>
-                </a:solidFill>
-                <a:effectLst/>
-                <a:uLnTx/>
-                <a:uFillTx/>
-                <a:latin typeface="Calibri"/>
-                <a:ea typeface="+mn-ea"/>
-                <a:cs typeface="+mn-cs"/>
-              </a:rPr>
-              <a:t>24: It is difficult to get together outside of class</a:t>
-            </a:r>
-          </a:p>
-          <a:p>
-            <a:pPr marL="342900" marR="0" lvl="0" indent="-342900" algn="l" defTabSz="457200" rtl="0" eaLnBrk="1" fontAlgn="auto" latinLnBrk="0" hangingPunct="1">
-              <a:lnSpc>
-                <a:spcPct val="100000"/>
-              </a:lnSpc>
-              <a:spcBef>
-                <a:spcPct val="20000"/>
-              </a:spcBef>
-              <a:spcAft>
-                <a:spcPts val="0"/>
-              </a:spcAft>
-              <a:buClrTx/>
-              <a:buSzTx/>
-              <a:buFont typeface="Arial"/>
-              <a:buChar char="•"/>
-              <a:tabLst/>
-              <a:defRPr/>
+              <a:rPr lang="en-US" sz="1000" dirty="0"/>
+              <a:t>25 Everyone’s ideas are needed if we are going to be successful.</a:t>
+            </a:r>
+          </a:p>
+          <a:p>
+            <a:pPr marL="0" indent="0">
+              <a:buNone/>
             </a:pPr>
             <a:r>
-              <a:rPr kumimoji="0" lang="en-US" sz="1000" b="0" i="0" u="none" strike="noStrike" kern="1200" cap="none" spc="0" normalizeH="0" baseline="0" noProof="0" dirty="0">
-                <a:ln>
-                  <a:noFill/>
-                </a:ln>
-                <a:solidFill>
-                  <a:prstClr val="black">
-                    <a:lumMod val="75000"/>
-                    <a:lumOff val="25000"/>
-                  </a:prstClr>
-                </a:solidFill>
-                <a:effectLst/>
-                <a:uLnTx/>
-                <a:uFillTx/>
-                <a:latin typeface="Calibri"/>
-                <a:ea typeface="+mn-ea"/>
-                <a:cs typeface="+mn-cs"/>
-              </a:rPr>
-              <a:t>*35: When I work with other students the work is divided equally.</a:t>
-            </a:r>
-          </a:p>
-          <a:p>
-            <a:pPr marL="342900" marR="0" lvl="0" indent="-342900" algn="l" defTabSz="457200" rtl="0" eaLnBrk="1" fontAlgn="auto" latinLnBrk="0" hangingPunct="1">
-              <a:lnSpc>
-                <a:spcPct val="100000"/>
-              </a:lnSpc>
-              <a:spcBef>
-                <a:spcPct val="20000"/>
-              </a:spcBef>
-              <a:spcAft>
-                <a:spcPts val="0"/>
-              </a:spcAft>
-              <a:buClrTx/>
-              <a:buSzTx/>
-              <a:buFont typeface="Arial"/>
-              <a:buChar char="•"/>
-              <a:tabLst/>
-              <a:defRPr/>
+              <a:rPr lang="en-US" sz="1000" dirty="0"/>
+              <a:t>26 When I work with other students, we spend too much time talking about other things.</a:t>
+            </a:r>
+          </a:p>
+          <a:p>
+            <a:pPr marL="0" indent="0">
+              <a:buNone/>
             </a:pPr>
             <a:r>
-              <a:rPr kumimoji="0" lang="en-US" sz="1000" b="0" i="0" u="none" strike="noStrike" kern="1200" cap="none" spc="0" normalizeH="0" baseline="0" noProof="0" dirty="0">
-                <a:ln>
-                  <a:noFill/>
-                </a:ln>
-                <a:solidFill>
-                  <a:prstClr val="black">
-                    <a:lumMod val="75000"/>
-                    <a:lumOff val="25000"/>
-                  </a:prstClr>
-                </a:solidFill>
-                <a:effectLst/>
-                <a:uLnTx/>
-                <a:uFillTx/>
-                <a:latin typeface="Calibri"/>
-                <a:ea typeface="+mn-ea"/>
-                <a:cs typeface="+mn-cs"/>
-              </a:rPr>
-              <a:t>39: My group members compete to see who does better work</a:t>
-            </a:r>
-          </a:p>
-          <a:p>
-            <a:pPr marL="342900" marR="0" lvl="0" indent="-342900" algn="l" defTabSz="457200" rtl="0" eaLnBrk="1" fontAlgn="auto" latinLnBrk="0" hangingPunct="1">
-              <a:lnSpc>
-                <a:spcPct val="100000"/>
-              </a:lnSpc>
-              <a:spcBef>
-                <a:spcPct val="20000"/>
-              </a:spcBef>
-              <a:spcAft>
-                <a:spcPts val="0"/>
-              </a:spcAft>
-              <a:buClrTx/>
-              <a:buSzTx/>
-              <a:buFont typeface="Arial"/>
-              <a:buChar char="•"/>
-              <a:tabLst/>
-              <a:defRPr/>
+              <a:rPr lang="en-US" sz="1000" dirty="0"/>
+              <a:t>27 My group did higher quality work when my group members worked on tasks together.</a:t>
+            </a:r>
+          </a:p>
+          <a:p>
+            <a:pPr marL="0" indent="0">
+              <a:buNone/>
             </a:pPr>
             <a:r>
-              <a:rPr kumimoji="0" lang="en-US" sz="1000" b="0" i="0" u="none" strike="noStrike" kern="1200" cap="none" spc="0" normalizeH="0" baseline="0" noProof="0" dirty="0">
-                <a:ln>
-                  <a:noFill/>
-                </a:ln>
-                <a:solidFill>
-                  <a:prstClr val="black">
-                    <a:lumMod val="75000"/>
-                    <a:lumOff val="25000"/>
-                  </a:prstClr>
-                </a:solidFill>
-                <a:effectLst/>
-                <a:uLnTx/>
-                <a:uFillTx/>
-                <a:latin typeface="Calibri"/>
-                <a:ea typeface="+mn-ea"/>
-                <a:cs typeface="+mn-cs"/>
-              </a:rPr>
-              <a:t>42: I like to help my group members learn the material</a:t>
-            </a:r>
-          </a:p>
-          <a:p>
-            <a:pPr marL="342900" marR="0" lvl="0" indent="-342900" algn="l" defTabSz="457200" rtl="0" eaLnBrk="1" fontAlgn="auto" latinLnBrk="0" hangingPunct="1">
-              <a:lnSpc>
-                <a:spcPct val="100000"/>
-              </a:lnSpc>
-              <a:spcBef>
-                <a:spcPct val="20000"/>
-              </a:spcBef>
-              <a:spcAft>
-                <a:spcPts val="0"/>
-              </a:spcAft>
-              <a:buClrTx/>
-              <a:buSzTx/>
-              <a:buFont typeface="Arial"/>
-              <a:buChar char="•"/>
-              <a:tabLst/>
-              <a:defRPr/>
+              <a:rPr lang="en-US" sz="1000" dirty="0"/>
+              <a:t>28 My group did higher quality work when group members worked on different tasks at the same time.</a:t>
+            </a:r>
+          </a:p>
+          <a:p>
+            <a:pPr marL="0" indent="0">
+              <a:buNone/>
             </a:pPr>
             <a:r>
-              <a:rPr kumimoji="0" lang="en-US" sz="1000" b="0" i="0" u="none" strike="noStrike" kern="1200" cap="none" spc="0" normalizeH="0" baseline="0" noProof="0" dirty="0">
-                <a:ln>
-                  <a:noFill/>
-                </a:ln>
-                <a:solidFill>
-                  <a:prstClr val="black">
-                    <a:lumMod val="75000"/>
-                    <a:lumOff val="25000"/>
-                  </a:prstClr>
-                </a:solidFill>
-                <a:effectLst/>
-                <a:uLnTx/>
-                <a:uFillTx/>
-                <a:latin typeface="Calibri"/>
-                <a:ea typeface="+mn-ea"/>
-                <a:cs typeface="+mn-cs"/>
-              </a:rPr>
-              <a:t>51: Same as 31 (repeat for reliability)</a:t>
-            </a:r>
-          </a:p>
-          <a:p>
-            <a:pPr marL="342900" marR="0" lvl="0" indent="-342900" algn="l" defTabSz="457200" rtl="0" eaLnBrk="1" fontAlgn="auto" latinLnBrk="0" hangingPunct="1">
-              <a:lnSpc>
-                <a:spcPct val="100000"/>
-              </a:lnSpc>
-              <a:spcBef>
-                <a:spcPct val="20000"/>
-              </a:spcBef>
-              <a:spcAft>
-                <a:spcPts val="0"/>
-              </a:spcAft>
-              <a:buClrTx/>
-              <a:buSzTx/>
-              <a:buFont typeface="Arial"/>
-              <a:buChar char="•"/>
-              <a:tabLst/>
-              <a:defRPr/>
+              <a:rPr lang="en-US" sz="1000" dirty="0"/>
+              <a:t>29 You have a certain amount of physics intelligence, and you can’t really do much to change it.</a:t>
+            </a:r>
+          </a:p>
+          <a:p>
+            <a:pPr marL="0" indent="0">
+              <a:buNone/>
             </a:pPr>
-            <a:endParaRPr lang="en-US" sz="1000" dirty="0">
-              <a:solidFill>
-                <a:prstClr val="black">
-                  <a:lumMod val="75000"/>
-                  <a:lumOff val="25000"/>
-                </a:prstClr>
-              </a:solidFill>
-              <a:latin typeface="Calibri"/>
-            </a:endParaRPr>
-          </a:p>
-          <a:p>
-            <a:pPr marL="0" marR="0" lvl="0" indent="0" algn="l" defTabSz="457200" rtl="0" eaLnBrk="1" fontAlgn="auto" latinLnBrk="0" hangingPunct="1">
-              <a:lnSpc>
-                <a:spcPct val="100000"/>
-              </a:lnSpc>
-              <a:spcBef>
-                <a:spcPct val="20000"/>
-              </a:spcBef>
-              <a:spcAft>
-                <a:spcPts val="0"/>
-              </a:spcAft>
-              <a:buClrTx/>
-              <a:buSzTx/>
+            <a:r>
+              <a:rPr lang="en-US" sz="1000" dirty="0"/>
+              <a:t>30 Your physics intelligence is something about you that you can change.</a:t>
+            </a:r>
+          </a:p>
+          <a:p>
+            <a:pPr marL="0" indent="0">
               <a:buNone/>
-              <a:tabLst/>
-              <a:defRPr/>
             </a:pPr>
             <a:r>
-              <a:rPr kumimoji="0" lang="en-US" sz="1000" b="0" i="0" u="none" strike="noStrike" kern="1200" cap="none" spc="0" normalizeH="0" baseline="0" noProof="0" dirty="0">
-                <a:ln>
-                  <a:noFill/>
-                </a:ln>
-                <a:solidFill>
-                  <a:prstClr val="black">
-                    <a:lumMod val="75000"/>
-                    <a:lumOff val="25000"/>
-                  </a:prstClr>
-                </a:solidFill>
-                <a:effectLst/>
-                <a:uLnTx/>
-                <a:uFillTx/>
-                <a:latin typeface="Calibri"/>
-                <a:ea typeface="+mn-ea"/>
-                <a:cs typeface="+mn-cs"/>
-              </a:rPr>
-              <a:t>*questions used</a:t>
-            </a:r>
+              <a:rPr lang="en-US" sz="1000" dirty="0"/>
+              <a:t>31 You can learn new things, but you can’t really change your basic physics intelligence.</a:t>
+            </a:r>
+          </a:p>
+          <a:p>
+            <a:pPr marL="0" indent="0">
+              <a:buNone/>
+            </a:pPr>
+            <a:endParaRPr lang="en-US" sz="1000" dirty="0"/>
           </a:p>
         </p:txBody>
       </p:sp>
     </p:spTree>
     <p:extLst>
       <p:ext uri="{BB962C8B-B14F-4D97-AF65-F5344CB8AC3E}">
-        <p14:creationId xmlns:p14="http://schemas.microsoft.com/office/powerpoint/2010/main" val="514231159"/>
+        <p14:creationId xmlns:p14="http://schemas.microsoft.com/office/powerpoint/2010/main" val="4089012535"/>
       </p:ext>
     </p:extLst>
   </p:cSld>
@@ -12573,7 +13100,7 @@
         <p:spPr/>
         <p:txBody>
           <a:bodyPr>
-            <a:normAutofit fontScale="62500" lnSpcReduction="20000"/>
+            <a:normAutofit fontScale="55000" lnSpcReduction="20000"/>
           </a:bodyPr>
           <a:lstStyle/>
           <a:p>
@@ -12680,7 +13207,15 @@
               <a:rPr lang="en-US" sz="2200" b="0" i="0" u="none" strike="noStrike" baseline="0" dirty="0"/>
               <a:t>“The four factors extracted with principal components analysis (with varimax rotation) accounted for 46.10% of the total variance in the data (eigenvalues ranged from 13.90 to 2.04). Items that failed to load .40 or higher were deleted, as well as, items that loaded on more than one factor. Ultimately, 11 items were eliminated from the SAGE questionnaire (items 2, 3, 15, 18, 21, 22, 24, 35, 39, 42, and 51).”</a:t>
             </a:r>
-            <a:endParaRPr lang="en-US" sz="1900" dirty="0"/>
+          </a:p>
+          <a:p>
+            <a:endParaRPr lang="en-US" sz="2200" dirty="0"/>
+          </a:p>
+          <a:p>
+            <a:r>
+              <a:rPr lang="en-US" sz="2200" dirty="0"/>
+              <a:t>*The python package fails to converge in the fit</a:t>
+            </a:r>
           </a:p>
         </p:txBody>
       </p:sp>
@@ -16781,6 +17316,41 @@
           </a:p>
         </p:txBody>
       </p:sp>
+      <p:sp>
+        <p:nvSpPr>
+          <p:cNvPr id="3" name="TextBox 2">
+            <a:extLst>
+              <a:ext uri="{FF2B5EF4-FFF2-40B4-BE49-F238E27FC236}">
+                <a16:creationId xmlns:a16="http://schemas.microsoft.com/office/drawing/2014/main" id="{7F739156-F6AC-ED4D-4EA0-177658E4B93E}"/>
+              </a:ext>
+            </a:extLst>
+          </p:cNvPr>
+          <p:cNvSpPr txBox="1"/>
+          <p:nvPr/>
+        </p:nvSpPr>
+        <p:spPr>
+          <a:xfrm>
+            <a:off x="-1" y="426280"/>
+            <a:ext cx="5049441" cy="276999"/>
+          </a:xfrm>
+          <a:prstGeom prst="rect">
+            <a:avLst/>
+          </a:prstGeom>
+          <a:noFill/>
+        </p:spPr>
+        <p:txBody>
+          <a:bodyPr wrap="square">
+            <a:spAutoFit/>
+          </a:bodyPr>
+          <a:lstStyle/>
+          <a:p>
+            <a:r>
+              <a:rPr lang="en-US" sz="1200" dirty="0"/>
+              <a:t>*The python package fails to converge in the fit so results not optimized</a:t>
+            </a:r>
+          </a:p>
+        </p:txBody>
+      </p:sp>
     </p:spTree>
     <p:extLst>
       <p:ext uri="{BB962C8B-B14F-4D97-AF65-F5344CB8AC3E}">
@@ -17175,7 +17745,7 @@
           <a:p>
             <a:r>
               <a:rPr lang="en-US" sz="3200" dirty="0"/>
-              <a:t>Adequacy Tests</a:t>
+              <a:t>Exploratory Factor Analysis</a:t>
             </a:r>
           </a:p>
         </p:txBody>
@@ -17193,7 +17763,7 @@
             <a:spLocks noGrp="1"/>
           </p:cNvSpPr>
           <p:nvPr>
-            <p:ph idx="1"/>
+            <p:ph sz="half" idx="1"/>
           </p:nvPr>
         </p:nvSpPr>
         <p:spPr/>
@@ -17205,62 +17775,80 @@
           <a:p>
             <a:r>
               <a:rPr lang="en-US" sz="2000" dirty="0"/>
-              <a:t>Bartlett’s Test of Sphericity</a:t>
+              <a:t>First produce eigenvalues for arbitrary number of factors</a:t>
             </a:r>
           </a:p>
           <a:p>
             <a:pPr lvl="1"/>
             <a:r>
               <a:rPr lang="en-US" sz="1600" dirty="0"/>
-              <a:t>Compares an observed correlation matrix to the identity matrix (checks whether there are correlations)</a:t>
+              <a:t>Scree plot (SAGE_Scree.png)</a:t>
+            </a:r>
+          </a:p>
+          <a:p>
+            <a:r>
+              <a:rPr lang="en-US" sz="2000" dirty="0"/>
+              <a:t>Kaiser Criterion (ε&gt;1) to determine number of factors</a:t>
             </a:r>
           </a:p>
           <a:p>
             <a:pPr lvl="1"/>
             <a:r>
               <a:rPr lang="en-US" sz="1600" dirty="0"/>
-              <a:t>χ</a:t>
-            </a:r>
-            <a:r>
-              <a:rPr lang="en-US" sz="1600" baseline="30000" dirty="0"/>
-              <a:t>2 </a:t>
+              <a:t>(though Kouros and </a:t>
+            </a:r>
+            <a:r>
+              <a:rPr lang="en-US" sz="1600" dirty="0" err="1"/>
+              <a:t>Abrami</a:t>
             </a:r>
             <a:r>
               <a:rPr lang="en-US" sz="1600" dirty="0"/>
-              <a:t>: 11502, p-value = 0.0</a:t>
-            </a:r>
-            <a:endParaRPr lang="en-US" sz="1600" baseline="30000" dirty="0"/>
-          </a:p>
-          <a:p>
-            <a:r>
-              <a:rPr lang="en-US" sz="2000" dirty="0" err="1"/>
-              <a:t>Kalser</a:t>
-            </a:r>
-            <a:r>
-              <a:rPr lang="en-US" sz="2000" dirty="0"/>
-              <a:t>-Meyer-Olkin (KMO) test</a:t>
-            </a:r>
-          </a:p>
-          <a:p>
-            <a:pPr lvl="1"/>
-            <a:r>
-              <a:rPr lang="en-US" sz="1600" dirty="0"/>
-              <a:t>Measures the suitability for factor analysis by estimating the proportion of variance among all observed variables</a:t>
-            </a:r>
-          </a:p>
-          <a:p>
-            <a:pPr lvl="1"/>
-            <a:r>
-              <a:rPr lang="en-US" sz="1600" dirty="0"/>
-              <a:t>0.906 </a:t>
-            </a:r>
+              <a:t> had ε&gt;2)</a:t>
+            </a:r>
+          </a:p>
+          <a:p>
+            <a:endParaRPr lang="en-US" sz="2000" dirty="0"/>
           </a:p>
         </p:txBody>
       </p:sp>
+      <p:pic>
+        <p:nvPicPr>
+          <p:cNvPr id="4" name="Content Placeholder 3">
+            <a:extLst>
+              <a:ext uri="{FF2B5EF4-FFF2-40B4-BE49-F238E27FC236}">
+                <a16:creationId xmlns:a16="http://schemas.microsoft.com/office/drawing/2014/main" id="{04EBFFBC-7D22-4DD1-8BA1-382885C0FBAA}"/>
+              </a:ext>
+            </a:extLst>
+          </p:cNvPr>
+          <p:cNvPicPr>
+            <a:picLocks noGrp="1" noChangeAspect="1"/>
+          </p:cNvPicPr>
+          <p:nvPr>
+            <p:ph sz="half" idx="2"/>
+          </p:nvPr>
+        </p:nvPicPr>
+        <p:blipFill>
+          <a:blip r:embed="rId3">
+            <a:extLst>
+              <a:ext uri="{28A0092B-C50C-407E-A947-70E740481C1C}">
+                <a14:useLocalDpi xmlns:a14="http://schemas.microsoft.com/office/drawing/2010/main" val="0"/>
+              </a:ext>
+            </a:extLst>
+          </a:blip>
+          <a:srcRect/>
+          <a:stretch/>
+        </p:blipFill>
+        <p:spPr>
+          <a:xfrm>
+            <a:off x="4648200" y="1562100"/>
+            <a:ext cx="4038600" cy="3028950"/>
+          </a:xfrm>
+        </p:spPr>
+      </p:pic>
     </p:spTree>
     <p:extLst>
       <p:ext uri="{BB962C8B-B14F-4D97-AF65-F5344CB8AC3E}">
-        <p14:creationId xmlns:p14="http://schemas.microsoft.com/office/powerpoint/2010/main" val="131391481"/>
+        <p14:creationId xmlns:p14="http://schemas.microsoft.com/office/powerpoint/2010/main" val="3497797232"/>
       </p:ext>
     </p:extLst>
   </p:cSld>

</xml_diff>

<commit_message>
Fixes factor ratings and distribution plots
</commit_message>
<xml_diff>
--- a/Analysis_explanation.pptx
+++ b/Analysis_explanation.pptx
@@ -7,7 +7,7 @@
     <p:sldMasterId id="2147483669" r:id="rId3"/>
   </p:sldMasterIdLst>
   <p:notesMasterIdLst>
-    <p:notesMasterId r:id="rId31"/>
+    <p:notesMasterId r:id="rId32"/>
   </p:notesMasterIdLst>
   <p:sldIdLst>
     <p:sldId id="710" r:id="rId4"/>
@@ -27,16 +27,17 @@
     <p:sldId id="732" r:id="rId18"/>
     <p:sldId id="735" r:id="rId19"/>
     <p:sldId id="738" r:id="rId20"/>
-    <p:sldId id="739" r:id="rId21"/>
-    <p:sldId id="724" r:id="rId22"/>
-    <p:sldId id="725" r:id="rId23"/>
-    <p:sldId id="726" r:id="rId24"/>
-    <p:sldId id="727" r:id="rId25"/>
-    <p:sldId id="728" r:id="rId26"/>
-    <p:sldId id="729" r:id="rId27"/>
-    <p:sldId id="714" r:id="rId28"/>
-    <p:sldId id="721" r:id="rId29"/>
-    <p:sldId id="722" r:id="rId30"/>
+    <p:sldId id="740" r:id="rId21"/>
+    <p:sldId id="739" r:id="rId22"/>
+    <p:sldId id="724" r:id="rId23"/>
+    <p:sldId id="725" r:id="rId24"/>
+    <p:sldId id="726" r:id="rId25"/>
+    <p:sldId id="727" r:id="rId26"/>
+    <p:sldId id="728" r:id="rId27"/>
+    <p:sldId id="729" r:id="rId28"/>
+    <p:sldId id="714" r:id="rId29"/>
+    <p:sldId id="721" r:id="rId30"/>
+    <p:sldId id="722" r:id="rId31"/>
   </p:sldIdLst>
   <p:sldSz cx="9144000" cy="5143500" type="screen16x9"/>
   <p:notesSz cx="6858000" cy="9313863"/>
@@ -187,6 +188,7 @@
             <p14:sldId id="732"/>
             <p14:sldId id="735"/>
             <p14:sldId id="738"/>
+            <p14:sldId id="740"/>
             <p14:sldId id="739"/>
           </p14:sldIdLst>
         </p14:section>
@@ -398,7 +400,7 @@
               <a:pPr>
                 <a:defRPr/>
               </a:pPr>
-              <a:t>2/14/2023</a:t>
+              <a:t>2/24/2023</a:t>
             </a:fld>
             <a:endParaRPr lang="en-US" dirty="0"/>
           </a:p>
@@ -1450,7 +1452,7 @@
     </p:spTree>
     <p:extLst>
       <p:ext uri="{BB962C8B-B14F-4D97-AF65-F5344CB8AC3E}">
-        <p14:creationId xmlns:p14="http://schemas.microsoft.com/office/powerpoint/2010/main" val="1893212278"/>
+        <p14:creationId xmlns:p14="http://schemas.microsoft.com/office/powerpoint/2010/main" val="93267389"/>
       </p:ext>
     </p:extLst>
   </p:cSld>
@@ -1533,14 +1535,14 @@
               </a:pPr>
               <a:t>19</a:t>
             </a:fld>
-            <a:endParaRPr lang="en-US" dirty="0"/>
+            <a:endParaRPr lang="en-US"/>
           </a:p>
         </p:txBody>
       </p:sp>
     </p:spTree>
     <p:extLst>
       <p:ext uri="{BB962C8B-B14F-4D97-AF65-F5344CB8AC3E}">
-        <p14:creationId xmlns:p14="http://schemas.microsoft.com/office/powerpoint/2010/main" val="2033376885"/>
+        <p14:creationId xmlns:p14="http://schemas.microsoft.com/office/powerpoint/2010/main" val="1893212278"/>
       </p:ext>
     </p:extLst>
   </p:cSld>
@@ -1630,7 +1632,7 @@
     </p:spTree>
     <p:extLst>
       <p:ext uri="{BB962C8B-B14F-4D97-AF65-F5344CB8AC3E}">
-        <p14:creationId xmlns:p14="http://schemas.microsoft.com/office/powerpoint/2010/main" val="3739200774"/>
+        <p14:creationId xmlns:p14="http://schemas.microsoft.com/office/powerpoint/2010/main" val="2033376885"/>
       </p:ext>
     </p:extLst>
   </p:cSld>
@@ -1720,7 +1722,7 @@
     </p:spTree>
     <p:extLst>
       <p:ext uri="{BB962C8B-B14F-4D97-AF65-F5344CB8AC3E}">
-        <p14:creationId xmlns:p14="http://schemas.microsoft.com/office/powerpoint/2010/main" val="4121783378"/>
+        <p14:creationId xmlns:p14="http://schemas.microsoft.com/office/powerpoint/2010/main" val="3739200774"/>
       </p:ext>
     </p:extLst>
   </p:cSld>
@@ -1900,7 +1902,7 @@
     </p:spTree>
     <p:extLst>
       <p:ext uri="{BB962C8B-B14F-4D97-AF65-F5344CB8AC3E}">
-        <p14:creationId xmlns:p14="http://schemas.microsoft.com/office/powerpoint/2010/main" val="822069775"/>
+        <p14:creationId xmlns:p14="http://schemas.microsoft.com/office/powerpoint/2010/main" val="4121783378"/>
       </p:ext>
     </p:extLst>
   </p:cSld>
@@ -1990,7 +1992,7 @@
     </p:spTree>
     <p:extLst>
       <p:ext uri="{BB962C8B-B14F-4D97-AF65-F5344CB8AC3E}">
-        <p14:creationId xmlns:p14="http://schemas.microsoft.com/office/powerpoint/2010/main" val="2063437235"/>
+        <p14:creationId xmlns:p14="http://schemas.microsoft.com/office/powerpoint/2010/main" val="822069775"/>
       </p:ext>
     </p:extLst>
   </p:cSld>
@@ -2073,14 +2075,14 @@
               </a:pPr>
               <a:t>24</a:t>
             </a:fld>
-            <a:endParaRPr lang="en-US"/>
+            <a:endParaRPr lang="en-US" dirty="0"/>
           </a:p>
         </p:txBody>
       </p:sp>
     </p:spTree>
     <p:extLst>
       <p:ext uri="{BB962C8B-B14F-4D97-AF65-F5344CB8AC3E}">
-        <p14:creationId xmlns:p14="http://schemas.microsoft.com/office/powerpoint/2010/main" val="997171877"/>
+        <p14:creationId xmlns:p14="http://schemas.microsoft.com/office/powerpoint/2010/main" val="2063437235"/>
       </p:ext>
     </p:extLst>
   </p:cSld>
@@ -2170,7 +2172,7 @@
     </p:spTree>
     <p:extLst>
       <p:ext uri="{BB962C8B-B14F-4D97-AF65-F5344CB8AC3E}">
-        <p14:creationId xmlns:p14="http://schemas.microsoft.com/office/powerpoint/2010/main" val="1666312967"/>
+        <p14:creationId xmlns:p14="http://schemas.microsoft.com/office/powerpoint/2010/main" val="997171877"/>
       </p:ext>
     </p:extLst>
   </p:cSld>
@@ -2260,7 +2262,7 @@
     </p:spTree>
     <p:extLst>
       <p:ext uri="{BB962C8B-B14F-4D97-AF65-F5344CB8AC3E}">
-        <p14:creationId xmlns:p14="http://schemas.microsoft.com/office/powerpoint/2010/main" val="2154198416"/>
+        <p14:creationId xmlns:p14="http://schemas.microsoft.com/office/powerpoint/2010/main" val="1666312967"/>
       </p:ext>
     </p:extLst>
   </p:cSld>
@@ -2342,6 +2344,96 @@
                 <a:defRPr/>
               </a:pPr>
               <a:t>27</a:t>
+            </a:fld>
+            <a:endParaRPr lang="en-US"/>
+          </a:p>
+        </p:txBody>
+      </p:sp>
+    </p:spTree>
+    <p:extLst>
+      <p:ext uri="{BB962C8B-B14F-4D97-AF65-F5344CB8AC3E}">
+        <p14:creationId xmlns:p14="http://schemas.microsoft.com/office/powerpoint/2010/main" val="2154198416"/>
+      </p:ext>
+    </p:extLst>
+  </p:cSld>
+  <p:clrMapOvr>
+    <a:masterClrMapping/>
+  </p:clrMapOvr>
+</p:notes>
+</file>
+
+<file path=ppt/notesSlides/notesSlide26.xml><?xml version="1.0" encoding="utf-8"?>
+<p:notes xmlns:a="http://schemas.openxmlformats.org/drawingml/2006/main" xmlns:r="http://schemas.openxmlformats.org/officeDocument/2006/relationships" xmlns:p="http://schemas.openxmlformats.org/presentationml/2006/main">
+  <p:cSld>
+    <p:spTree>
+      <p:nvGrpSpPr>
+        <p:cNvPr id="1" name=""/>
+        <p:cNvGrpSpPr/>
+        <p:nvPr/>
+      </p:nvGrpSpPr>
+      <p:grpSpPr>
+        <a:xfrm>
+          <a:off x="0" y="0"/>
+          <a:ext cx="0" cy="0"/>
+          <a:chOff x="0" y="0"/>
+          <a:chExt cx="0" cy="0"/>
+        </a:xfrm>
+      </p:grpSpPr>
+      <p:sp>
+        <p:nvSpPr>
+          <p:cNvPr id="2" name="Slide Image Placeholder 1"/>
+          <p:cNvSpPr>
+            <a:spLocks noGrp="1" noRot="1" noChangeAspect="1"/>
+          </p:cNvSpPr>
+          <p:nvPr>
+            <p:ph type="sldImg"/>
+          </p:nvPr>
+        </p:nvSpPr>
+        <p:spPr/>
+      </p:sp>
+      <p:sp>
+        <p:nvSpPr>
+          <p:cNvPr id="3" name="Notes Placeholder 2"/>
+          <p:cNvSpPr>
+            <a:spLocks noGrp="1"/>
+          </p:cNvSpPr>
+          <p:nvPr>
+            <p:ph type="body" idx="1"/>
+          </p:nvPr>
+        </p:nvSpPr>
+        <p:spPr/>
+        <p:txBody>
+          <a:bodyPr/>
+          <a:lstStyle/>
+          <a:p>
+            <a:endParaRPr lang="en-US" dirty="0"/>
+          </a:p>
+        </p:txBody>
+      </p:sp>
+      <p:sp>
+        <p:nvSpPr>
+          <p:cNvPr id="4" name="Slide Number Placeholder 3"/>
+          <p:cNvSpPr>
+            <a:spLocks noGrp="1"/>
+          </p:cNvSpPr>
+          <p:nvPr>
+            <p:ph type="sldNum" sz="quarter" idx="5"/>
+          </p:nvPr>
+        </p:nvSpPr>
+        <p:spPr/>
+        <p:txBody>
+          <a:bodyPr/>
+          <a:lstStyle/>
+          <a:p>
+            <a:pPr>
+              <a:defRPr/>
+            </a:pPr>
+            <a:fld id="{6E074355-CE0D-4C68-A6CB-C364ED71B33B}" type="slidenum">
+              <a:rPr lang="en-US" smtClean="0"/>
+              <a:pPr>
+                <a:defRPr/>
+              </a:pPr>
+              <a:t>28</a:t>
             </a:fld>
             <a:endParaRPr lang="en-US"/>
           </a:p>
@@ -7073,19 +7165,19 @@
           <a:p>
             <a:r>
               <a:rPr lang="en-US" sz="2200" dirty="0"/>
-              <a:t>CFI = 0.876</a:t>
+              <a:t>CFI = 0.875</a:t>
             </a:r>
           </a:p>
           <a:p>
             <a:r>
               <a:rPr lang="en-US" sz="2200" dirty="0"/>
-              <a:t>TLI = 0.855</a:t>
+              <a:t>TLI = 0.854</a:t>
             </a:r>
           </a:p>
           <a:p>
             <a:r>
               <a:rPr lang="en-US" sz="2200" dirty="0"/>
-              <a:t>RMSEA = 0.066</a:t>
+              <a:t>RMSEA = 0.060</a:t>
             </a:r>
           </a:p>
           <a:p>
@@ -7960,7 +8052,7 @@
               </a:ext>
             </a:extLst>
           </a:blip>
-          <a:srcRect l="53309" t="-444" r="18823" b="444"/>
+          <a:srcRect l="54408" r="18750"/>
           <a:stretch/>
         </p:blipFill>
         <p:spPr>
@@ -7995,7 +8087,7 @@
               </a:ext>
             </a:extLst>
           </a:blip>
-          <a:srcRect l="56584" r="19606"/>
+          <a:srcRect l="56426" t="471" r="19764" b="-471"/>
           <a:stretch/>
         </p:blipFill>
         <p:spPr>
@@ -8060,7 +8152,7 @@
               </a:ext>
             </a:extLst>
           </a:blip>
-          <a:srcRect l="68359" t="9" r="4799" b="-9"/>
+          <a:srcRect l="69205" t="-261" r="3953" b="261"/>
           <a:stretch/>
         </p:blipFill>
         <p:spPr>
@@ -8238,7 +8330,7 @@
               </a:ext>
             </a:extLst>
           </a:blip>
-          <a:srcRect l="67413" t="53" r="19649" b="-53"/>
+          <a:srcRect l="67415" t="-192" r="19647" b="192"/>
           <a:stretch/>
         </p:blipFill>
         <p:spPr>
@@ -8273,7 +8365,7 @@
               </a:ext>
             </a:extLst>
           </a:blip>
-          <a:srcRect l="64265" r="18897"/>
+          <a:srcRect l="64322" t="-199" r="18840" b="199"/>
           <a:stretch/>
         </p:blipFill>
         <p:spPr>
@@ -8308,7 +8400,7 @@
               </a:ext>
             </a:extLst>
           </a:blip>
-          <a:srcRect l="62518" r="19194"/>
+          <a:srcRect l="61858" r="19854"/>
           <a:stretch/>
         </p:blipFill>
         <p:spPr>
@@ -8343,7 +8435,7 @@
               </a:ext>
             </a:extLst>
           </a:blip>
-          <a:srcRect l="61644" r="20068"/>
+          <a:srcRect l="61597" t="199" r="20115" b="-199"/>
           <a:stretch/>
         </p:blipFill>
         <p:spPr>
@@ -8378,7 +8470,7 @@
               </a:ext>
             </a:extLst>
           </a:blip>
-          <a:srcRect l="58037" r="18153"/>
+          <a:srcRect l="57864" t="441" r="18326" b="-441"/>
           <a:stretch/>
         </p:blipFill>
         <p:spPr>
@@ -8736,6 +8828,45 @@
           </a:p>
         </p:txBody>
       </p:sp>
+      <p:cxnSp>
+        <p:nvCxnSpPr>
+          <p:cNvPr id="9" name="Straight Connector 8">
+            <a:extLst>
+              <a:ext uri="{FF2B5EF4-FFF2-40B4-BE49-F238E27FC236}">
+                <a16:creationId xmlns:a16="http://schemas.microsoft.com/office/drawing/2014/main" id="{2ECEA867-6F4F-DC3C-24D3-13F14C64187E}"/>
+              </a:ext>
+            </a:extLst>
+          </p:cNvPr>
+          <p:cNvCxnSpPr>
+            <a:cxnSpLocks/>
+          </p:cNvCxnSpPr>
+          <p:nvPr/>
+        </p:nvCxnSpPr>
+        <p:spPr>
+          <a:xfrm>
+            <a:off x="381000" y="2655094"/>
+            <a:ext cx="8077200" cy="0"/>
+          </a:xfrm>
+          <a:prstGeom prst="line">
+            <a:avLst/>
+          </a:prstGeom>
+          <a:effectLst/>
+        </p:spPr>
+        <p:style>
+          <a:lnRef idx="2">
+            <a:schemeClr val="accent1"/>
+          </a:lnRef>
+          <a:fillRef idx="0">
+            <a:schemeClr val="accent1"/>
+          </a:fillRef>
+          <a:effectRef idx="1">
+            <a:schemeClr val="accent1"/>
+          </a:effectRef>
+          <a:fontRef idx="minor">
+            <a:schemeClr val="tx1"/>
+          </a:fontRef>
+        </p:style>
+      </p:cxnSp>
     </p:spTree>
     <p:extLst>
       <p:ext uri="{BB962C8B-B14F-4D97-AF65-F5344CB8AC3E}">
@@ -8815,7 +8946,7 @@
         <p:spPr/>
         <p:txBody>
           <a:bodyPr>
-            <a:normAutofit fontScale="92500" lnSpcReduction="10000"/>
+            <a:normAutofit fontScale="92500" lnSpcReduction="20000"/>
           </a:bodyPr>
           <a:lstStyle/>
           <a:p>
@@ -8831,6 +8962,12 @@
             <a:r>
               <a:rPr lang="en-US" sz="1600" dirty="0"/>
               <a:t>10: I prefer when one student regularly takes on a leadership role.</a:t>
+            </a:r>
+          </a:p>
+          <a:p>
+            <a:r>
+              <a:rPr lang="en-US" sz="1600" dirty="0"/>
+              <a:t>11: I prefer when the leadership role rotates between students.</a:t>
             </a:r>
           </a:p>
           <a:p>
@@ -8889,7 +9026,7 @@
         </p:spPr>
         <p:txBody>
           <a:bodyPr>
-            <a:normAutofit fontScale="92500" lnSpcReduction="10000"/>
+            <a:normAutofit fontScale="92500" lnSpcReduction="20000"/>
           </a:bodyPr>
           <a:lstStyle/>
           <a:p>
@@ -9460,10 +9597,10 @@
       </p:grpSpPr>
       <p:pic>
         <p:nvPicPr>
-          <p:cNvPr id="2" name="Picture 1">
+          <p:cNvPr id="5" name="Picture 4">
             <a:extLst>
               <a:ext uri="{FF2B5EF4-FFF2-40B4-BE49-F238E27FC236}">
-                <a16:creationId xmlns:a16="http://schemas.microsoft.com/office/drawing/2014/main" id="{17EDEAD7-F52C-8D46-6A14-D5D70DE8D373}"/>
+                <a16:creationId xmlns:a16="http://schemas.microsoft.com/office/drawing/2014/main" id="{F8F2E141-715B-73A0-7114-5056113E2EA3}"/>
               </a:ext>
             </a:extLst>
           </p:cNvPr>
@@ -9480,13 +9617,13 @@
               </a:ext>
             </a:extLst>
           </a:blip>
-          <a:srcRect l="56549" t="-231" r="19641" b="231"/>
+          <a:srcRect l="61285" r="20427"/>
           <a:stretch/>
         </p:blipFill>
         <p:spPr>
           <a:xfrm>
-            <a:off x="2057400" y="1297290"/>
-            <a:ext cx="1219200" cy="3840472"/>
+            <a:off x="1103571" y="1302380"/>
+            <a:ext cx="936500" cy="3840472"/>
           </a:xfrm>
           <a:prstGeom prst="rect">
             <a:avLst/>
@@ -9618,7 +9755,7 @@
             <a:pPr lvl="1"/>
             <a:r>
               <a:rPr lang="en-US" sz="1000" dirty="0"/>
-              <a:t>8 “optimal” number of factors</a:t>
+              <a:t>5 “optimal” number of factors</a:t>
             </a:r>
           </a:p>
         </p:txBody>
@@ -9645,7 +9782,7 @@
               </a:ext>
             </a:extLst>
           </a:blip>
-          <a:srcRect l="61644" r="20068"/>
+          <a:srcRect l="62487" r="19225"/>
           <a:stretch/>
         </p:blipFill>
         <p:spPr>
@@ -9680,12 +9817,12 @@
               </a:ext>
             </a:extLst>
           </a:blip>
-          <a:srcRect l="58037" r="20073"/>
+          <a:srcRect l="58059" r="20051"/>
           <a:stretch/>
         </p:blipFill>
         <p:spPr>
           <a:xfrm>
-            <a:off x="936500" y="1303028"/>
+            <a:off x="2134761" y="1303028"/>
             <a:ext cx="1120899" cy="3840472"/>
           </a:xfrm>
           <a:prstGeom prst="rect">
@@ -9723,7 +9860,7 @@
           <a:p>
             <a:r>
               <a:rPr lang="en-US" sz="1600" dirty="0"/>
-              <a:t>6</a:t>
+              <a:t>5</a:t>
             </a:r>
           </a:p>
         </p:txBody>
@@ -9742,8 +9879,8 @@
         </p:nvSpPr>
         <p:spPr>
           <a:xfrm>
-            <a:off x="1353652" y="1169501"/>
-            <a:ext cx="436338" cy="338554"/>
+            <a:off x="1487818" y="1183789"/>
+            <a:ext cx="298480" cy="338554"/>
           </a:xfrm>
           <a:prstGeom prst="rect">
             <a:avLst/>
@@ -9758,50 +9895,11 @@
           <a:p>
             <a:r>
               <a:rPr lang="en-US" sz="1600" dirty="0"/>
-              <a:t>“7”</a:t>
+              <a:t>6</a:t>
             </a:r>
           </a:p>
         </p:txBody>
       </p:sp>
-      <p:cxnSp>
-        <p:nvCxnSpPr>
-          <p:cNvPr id="15" name="Straight Connector 14">
-            <a:extLst>
-              <a:ext uri="{FF2B5EF4-FFF2-40B4-BE49-F238E27FC236}">
-                <a16:creationId xmlns:a16="http://schemas.microsoft.com/office/drawing/2014/main" id="{8E2D0645-80AA-9219-D2B3-A55B8EA97857}"/>
-              </a:ext>
-            </a:extLst>
-          </p:cNvPr>
-          <p:cNvCxnSpPr>
-            <a:cxnSpLocks/>
-          </p:cNvCxnSpPr>
-          <p:nvPr/>
-        </p:nvCxnSpPr>
-        <p:spPr>
-          <a:xfrm>
-            <a:off x="1932920" y="1500455"/>
-            <a:ext cx="0" cy="3281095"/>
-          </a:xfrm>
-          <a:prstGeom prst="line">
-            <a:avLst/>
-          </a:prstGeom>
-          <a:effectLst/>
-        </p:spPr>
-        <p:style>
-          <a:lnRef idx="2">
-            <a:schemeClr val="accent1"/>
-          </a:lnRef>
-          <a:fillRef idx="0">
-            <a:schemeClr val="accent1"/>
-          </a:fillRef>
-          <a:effectRef idx="1">
-            <a:schemeClr val="accent1"/>
-          </a:effectRef>
-          <a:fontRef idx="minor">
-            <a:schemeClr val="tx1"/>
-          </a:fontRef>
-        </p:style>
-      </p:cxnSp>
       <p:sp>
         <p:nvSpPr>
           <p:cNvPr id="3" name="TextBox 2">
@@ -9816,7 +9914,7 @@
         </p:nvSpPr>
         <p:spPr>
           <a:xfrm>
-            <a:off x="2562323" y="1199642"/>
+            <a:off x="2562323" y="1178210"/>
             <a:ext cx="641522" cy="338554"/>
           </a:xfrm>
           <a:prstGeom prst="rect">
@@ -9832,7 +9930,7 @@
           <a:p>
             <a:r>
               <a:rPr lang="en-US" sz="1600" dirty="0"/>
-              <a:t>“8”…</a:t>
+              <a:t>“7”…</a:t>
             </a:r>
           </a:p>
         </p:txBody>
@@ -9853,7 +9951,7 @@
         </p:nvCxnSpPr>
         <p:spPr>
           <a:xfrm>
-            <a:off x="3124200" y="1494717"/>
+            <a:off x="3138488" y="1494717"/>
             <a:ext cx="0" cy="3281095"/>
           </a:xfrm>
           <a:prstGeom prst="line">
@@ -9878,7 +9976,7 @@
       </p:cxnSp>
       <p:pic>
         <p:nvPicPr>
-          <p:cNvPr id="7" name="Picture 6" descr="Chart, scatter chart&#10;&#10;Description automatically generated">
+          <p:cNvPr id="7" name="Picture 6">
             <a:extLst>
               <a:ext uri="{FF2B5EF4-FFF2-40B4-BE49-F238E27FC236}">
                 <a16:creationId xmlns:a16="http://schemas.microsoft.com/office/drawing/2014/main" id="{D891F56A-34DD-2C06-3BE3-685EB80175A4}"/>
@@ -9898,9 +9996,8 @@
               </a:ext>
             </a:extLst>
           </a:blip>
-          <a:stretch>
-            <a:fillRect/>
-          </a:stretch>
+          <a:srcRect/>
+          <a:stretch/>
         </p:blipFill>
         <p:spPr>
           <a:xfrm>
@@ -9991,7 +10088,7 @@
         <p:spPr/>
         <p:txBody>
           <a:bodyPr>
-            <a:normAutofit fontScale="85000" lnSpcReduction="20000"/>
+            <a:normAutofit fontScale="92500" lnSpcReduction="20000"/>
           </a:bodyPr>
           <a:lstStyle/>
           <a:p>
@@ -10001,14 +10098,14 @@
             </a:pPr>
             <a:r>
               <a:rPr lang="en-US" sz="2000" dirty="0"/>
-              <a:t>Quality of process</a:t>
+              <a:t>Factor 1</a:t>
             </a:r>
           </a:p>
           <a:p>
             <a:pPr lvl="1"/>
             <a:r>
               <a:rPr lang="en-US" sz="1100" dirty="0"/>
-              <a:t>‘When I work in a group, I end up doing most of the work.', 'The work takes more time to complete when I work with other students.', 'The material is easier to understand when I work with other students.', 'The workload is usually less when I work with other students.', 'I do not think a group grade is fair.', 'I feel working in groups is a waste of time.', 'When I work with other students the work is divided equally.'</a:t>
+              <a:t>'When I work in a group, I am able to share my ideas.', 'The material is easier to understand when I work with other students.', 'I feel I am part of what is going on in the group.', 'I try to make sure my group members learn the material.', 'I learn to work with students who are different from me.', 'I prefer to take on tasks that will help me better learn the material.', 'I also learn when I teach the material to my group members.', 'Everyone’s ideas are needed if we are going to be successful.', 'My group did higher quality work when my group members worked on tasks together.’</a:t>
             </a:r>
             <a:endParaRPr lang="en-US" sz="1600" dirty="0"/>
           </a:p>
@@ -10019,14 +10116,14 @@
             </a:pPr>
             <a:r>
               <a:rPr lang="en-US" sz="2000" dirty="0"/>
-              <a:t>Individual Belonging</a:t>
+              <a:t>Mindset</a:t>
             </a:r>
           </a:p>
           <a:p>
             <a:pPr lvl="1"/>
             <a:r>
               <a:rPr lang="en-US" sz="1100" dirty="0"/>
-              <a:t>'When I work in a group, I am able to share my ideas.', 'My group members make me feel that I am not as smart as they are.', 'My group members respect my opinions.', 'I feel I am part of what is going on in the group.', 'My group members do not care about my feelings.'</a:t>
+              <a:t>'You have a certain amount of physics intelligence, and you can’t really do much to change it.', 'Your physics intelligence is something about you that you can change.', 'You can learn new things, but you can’t really change your basic physics intelligence.’</a:t>
             </a:r>
             <a:endParaRPr lang="en-US" sz="1600" dirty="0"/>
           </a:p>
@@ -10037,14 +10134,14 @@
             </a:pPr>
             <a:r>
               <a:rPr lang="en-US" sz="2000" dirty="0"/>
-              <a:t>Mindset</a:t>
+              <a:t>Frustrations</a:t>
             </a:r>
           </a:p>
           <a:p>
             <a:pPr lvl="1"/>
             <a:r>
               <a:rPr lang="en-US" sz="1100" dirty="0"/>
-              <a:t>'You have a certain amount of physics intelligence, and you can’t really do much to change it.', 'Your physics intelligence is something about you that you can change.', 'You can learn new things, but you can’t really change your basic physics intelligence.'</a:t>
+              <a:t>'When I work in a group, I end up doing most of the work.', 'The work takes more time to complete when I work with other students.', 'I do not think a group grade is fair.', 'I feel working in groups is a waste of time.', 'I become frustrated when my group members do not understand the material.’</a:t>
             </a:r>
             <a:endParaRPr lang="en-US" sz="1600" dirty="0"/>
           </a:p>
@@ -10055,14 +10152,14 @@
             </a:pPr>
             <a:r>
               <a:rPr lang="en-US" sz="2000" dirty="0"/>
-              <a:t>Forms of Learning (giving)</a:t>
+              <a:t>Individual Belonging</a:t>
             </a:r>
           </a:p>
           <a:p>
             <a:pPr lvl="1"/>
             <a:r>
               <a:rPr lang="en-US" sz="1100" dirty="0"/>
-              <a:t>'I learn to work with students who are different from me.', 'I also learn when I teach the material to my group members.'</a:t>
+              <a:t>'My group members make me feel that I am not as smart as they are.', 'My group members respect my opinions.', 'My group members do not care about my feelings.’</a:t>
             </a:r>
             <a:endParaRPr lang="en-US" sz="1600" dirty="0"/>
           </a:p>
@@ -10073,50 +10170,14 @@
             </a:pPr>
             <a:r>
               <a:rPr lang="en-US" sz="2000" dirty="0"/>
-              <a:t>Collective Learning</a:t>
+              <a:t>Quality of process</a:t>
             </a:r>
           </a:p>
           <a:p>
             <a:pPr lvl="1"/>
             <a:r>
               <a:rPr lang="en-US" sz="1100" dirty="0"/>
-              <a:t>'I prefer when the leadership role rotates between students.', 'I try to make sure my group members learn the material.', 'Everyone’s ideas are needed if we are going to be successful.', 'My group did higher quality work when my group members worked on tasks together.'</a:t>
-            </a:r>
-            <a:endParaRPr lang="en-US" sz="1600" dirty="0"/>
-          </a:p>
-          <a:p>
-            <a:pPr marL="514350" indent="-457200">
-              <a:buFont typeface="+mj-lt"/>
-              <a:buAutoNum type="arabicPeriod"/>
-            </a:pPr>
-            <a:r>
-              <a:rPr lang="en-US" sz="2000" dirty="0"/>
-              <a:t>Frustrations with Group Members (but more specific)</a:t>
-            </a:r>
-          </a:p>
-          <a:p>
-            <a:pPr lvl="1"/>
-            <a:r>
-              <a:rPr lang="en-US" sz="1100" dirty="0"/>
-              <a:t>'I have to work with students who are not as smart as I am.', 'I become frustrated when my group members do not understand the material.'</a:t>
-            </a:r>
-            <a:endParaRPr lang="en-US" sz="1600" dirty="0"/>
-          </a:p>
-          <a:p>
-            <a:pPr marL="514350" indent="-457200">
-              <a:buFont typeface="+mj-lt"/>
-              <a:buAutoNum type="arabicPeriod"/>
-            </a:pPr>
-            <a:r>
-              <a:rPr lang="en-US" sz="2000" dirty="0"/>
-              <a:t>Forms of Learning (receiving)</a:t>
-            </a:r>
-          </a:p>
-          <a:p>
-            <a:pPr lvl="1"/>
-            <a:r>
-              <a:rPr lang="en-US" sz="1100" dirty="0"/>
-              <a:t>'My group members help explain things that I do not understand.'</a:t>
+              <a:t>'The workload is usually less when I work with other students.', 'When I work with other students the work is divided equally.'</a:t>
             </a:r>
             <a:endParaRPr lang="en-US" sz="1600" dirty="0"/>
           </a:p>
@@ -10136,6 +10197,216 @@
 </file>
 
 <file path=ppt/slides/slide18.xml><?xml version="1.0" encoding="utf-8"?>
+<p:sld xmlns:a="http://schemas.openxmlformats.org/drawingml/2006/main" xmlns:r="http://schemas.openxmlformats.org/officeDocument/2006/relationships" xmlns:p="http://schemas.openxmlformats.org/presentationml/2006/main" show="0">
+  <p:cSld>
+    <p:spTree>
+      <p:nvGrpSpPr>
+        <p:cNvPr id="1" name=""/>
+        <p:cNvGrpSpPr/>
+        <p:nvPr/>
+      </p:nvGrpSpPr>
+      <p:grpSpPr>
+        <a:xfrm>
+          <a:off x="0" y="0"/>
+          <a:ext cx="0" cy="0"/>
+          <a:chOff x="0" y="0"/>
+          <a:chExt cx="0" cy="0"/>
+        </a:xfrm>
+      </p:grpSpPr>
+      <p:sp>
+        <p:nvSpPr>
+          <p:cNvPr id="6" name="Title 5">
+            <a:extLst>
+              <a:ext uri="{FF2B5EF4-FFF2-40B4-BE49-F238E27FC236}">
+                <a16:creationId xmlns:a16="http://schemas.microsoft.com/office/drawing/2014/main" id="{30712870-2CAF-45CA-9FFD-0087F78E9339}"/>
+              </a:ext>
+            </a:extLst>
+          </p:cNvPr>
+          <p:cNvSpPr>
+            <a:spLocks noGrp="1"/>
+          </p:cNvSpPr>
+          <p:nvPr>
+            <p:ph type="title"/>
+          </p:nvPr>
+        </p:nvSpPr>
+        <p:spPr/>
+        <p:txBody>
+          <a:bodyPr>
+            <a:normAutofit/>
+          </a:bodyPr>
+          <a:lstStyle/>
+          <a:p>
+            <a:r>
+              <a:rPr lang="en-US" sz="3200" dirty="0"/>
+              <a:t>Exploratory Factor Analysis</a:t>
+            </a:r>
+          </a:p>
+        </p:txBody>
+      </p:sp>
+      <p:sp>
+        <p:nvSpPr>
+          <p:cNvPr id="7" name="Content Placeholder 6">
+            <a:extLst>
+              <a:ext uri="{FF2B5EF4-FFF2-40B4-BE49-F238E27FC236}">
+                <a16:creationId xmlns:a16="http://schemas.microsoft.com/office/drawing/2014/main" id="{9114D3AD-6DF6-4C88-942E-9CAEC7F33550}"/>
+              </a:ext>
+            </a:extLst>
+          </p:cNvPr>
+          <p:cNvSpPr>
+            <a:spLocks noGrp="1"/>
+          </p:cNvSpPr>
+          <p:nvPr>
+            <p:ph idx="1"/>
+          </p:nvPr>
+        </p:nvSpPr>
+        <p:spPr/>
+        <p:txBody>
+          <a:bodyPr>
+            <a:normAutofit fontScale="85000" lnSpcReduction="20000"/>
+          </a:bodyPr>
+          <a:lstStyle/>
+          <a:p>
+            <a:pPr marL="514350" indent="-457200">
+              <a:buFont typeface="+mj-lt"/>
+              <a:buAutoNum type="arabicPeriod"/>
+            </a:pPr>
+            <a:r>
+              <a:rPr lang="en-US" sz="2000" dirty="0"/>
+              <a:t>Quality of process</a:t>
+            </a:r>
+          </a:p>
+          <a:p>
+            <a:pPr lvl="1"/>
+            <a:r>
+              <a:rPr lang="en-US" sz="1100" dirty="0"/>
+              <a:t>‘When I work in a group, I end up doing most of the work.', 'The work takes more time to complete when I work with other students.', 'The material is easier to understand when I work with other students.', 'The workload is usually less when I work with other students.', 'I do not think a group grade is fair.', 'I feel working in groups is a waste of time.', 'When I work with other students the work is divided equally.'</a:t>
+            </a:r>
+            <a:endParaRPr lang="en-US" sz="1600" dirty="0"/>
+          </a:p>
+          <a:p>
+            <a:pPr marL="514350" indent="-457200">
+              <a:buFont typeface="+mj-lt"/>
+              <a:buAutoNum type="arabicPeriod"/>
+            </a:pPr>
+            <a:r>
+              <a:rPr lang="en-US" sz="2000" dirty="0"/>
+              <a:t>Individual Belonging</a:t>
+            </a:r>
+          </a:p>
+          <a:p>
+            <a:pPr lvl="1"/>
+            <a:r>
+              <a:rPr lang="en-US" sz="1100" dirty="0"/>
+              <a:t>'When I work in a group, I am able to share my ideas.', 'My group members make me feel that I am not as smart as they are.', 'My group members respect my opinions.', 'I feel I am part of what is going on in the group.', 'My group members do not care about my feelings.'</a:t>
+            </a:r>
+            <a:endParaRPr lang="en-US" sz="1600" dirty="0"/>
+          </a:p>
+          <a:p>
+            <a:pPr marL="514350" indent="-457200">
+              <a:buFont typeface="+mj-lt"/>
+              <a:buAutoNum type="arabicPeriod"/>
+            </a:pPr>
+            <a:r>
+              <a:rPr lang="en-US" sz="2000" dirty="0"/>
+              <a:t>Mindset</a:t>
+            </a:r>
+          </a:p>
+          <a:p>
+            <a:pPr lvl="1"/>
+            <a:r>
+              <a:rPr lang="en-US" sz="1100" dirty="0"/>
+              <a:t>'You have a certain amount of physics intelligence, and you can’t really do much to change it.', 'Your physics intelligence is something about you that you can change.', 'You can learn new things, but you can’t really change your basic physics intelligence.'</a:t>
+            </a:r>
+            <a:endParaRPr lang="en-US" sz="1600" dirty="0"/>
+          </a:p>
+          <a:p>
+            <a:pPr marL="514350" indent="-457200">
+              <a:buFont typeface="+mj-lt"/>
+              <a:buAutoNum type="arabicPeriod"/>
+            </a:pPr>
+            <a:r>
+              <a:rPr lang="en-US" sz="2000" dirty="0"/>
+              <a:t>Forms of Learning (giving)</a:t>
+            </a:r>
+          </a:p>
+          <a:p>
+            <a:pPr lvl="1"/>
+            <a:r>
+              <a:rPr lang="en-US" sz="1100" dirty="0"/>
+              <a:t>'I learn to work with students who are different from me.', 'I also learn when I teach the material to my group members.'</a:t>
+            </a:r>
+            <a:endParaRPr lang="en-US" sz="1600" dirty="0"/>
+          </a:p>
+          <a:p>
+            <a:pPr marL="514350" indent="-457200">
+              <a:buFont typeface="+mj-lt"/>
+              <a:buAutoNum type="arabicPeriod"/>
+            </a:pPr>
+            <a:r>
+              <a:rPr lang="en-US" sz="2000" dirty="0"/>
+              <a:t>Collective Learning</a:t>
+            </a:r>
+          </a:p>
+          <a:p>
+            <a:pPr lvl="1"/>
+            <a:r>
+              <a:rPr lang="en-US" sz="1100" dirty="0"/>
+              <a:t>'I prefer when the leadership role rotates between students.', 'I try to make sure my group members learn the material.', 'Everyone’s ideas are needed if we are going to be successful.', 'My group did higher quality work when my group members worked on tasks together.'</a:t>
+            </a:r>
+            <a:endParaRPr lang="en-US" sz="1600" dirty="0"/>
+          </a:p>
+          <a:p>
+            <a:pPr marL="514350" indent="-457200">
+              <a:buFont typeface="+mj-lt"/>
+              <a:buAutoNum type="arabicPeriod"/>
+            </a:pPr>
+            <a:r>
+              <a:rPr lang="en-US" sz="2000" dirty="0"/>
+              <a:t>Frustrations with Group Members (but more specific)</a:t>
+            </a:r>
+          </a:p>
+          <a:p>
+            <a:pPr lvl="1"/>
+            <a:r>
+              <a:rPr lang="en-US" sz="1100" dirty="0"/>
+              <a:t>'I have to work with students who are not as smart as I am.', 'I become frustrated when my group members do not understand the material.'</a:t>
+            </a:r>
+            <a:endParaRPr lang="en-US" sz="1600" dirty="0"/>
+          </a:p>
+          <a:p>
+            <a:pPr marL="514350" indent="-457200">
+              <a:buFont typeface="+mj-lt"/>
+              <a:buAutoNum type="arabicPeriod"/>
+            </a:pPr>
+            <a:r>
+              <a:rPr lang="en-US" sz="2000" dirty="0"/>
+              <a:t>Forms of Learning (receiving)</a:t>
+            </a:r>
+          </a:p>
+          <a:p>
+            <a:pPr lvl="1"/>
+            <a:r>
+              <a:rPr lang="en-US" sz="1100" dirty="0"/>
+              <a:t>'My group members help explain things that I do not understand.'</a:t>
+            </a:r>
+            <a:endParaRPr lang="en-US" sz="1600" dirty="0"/>
+          </a:p>
+        </p:txBody>
+      </p:sp>
+    </p:spTree>
+    <p:extLst>
+      <p:ext uri="{BB962C8B-B14F-4D97-AF65-F5344CB8AC3E}">
+        <p14:creationId xmlns:p14="http://schemas.microsoft.com/office/powerpoint/2010/main" val="2336534871"/>
+      </p:ext>
+    </p:extLst>
+  </p:cSld>
+  <p:clrMapOvr>
+    <a:masterClrMapping/>
+  </p:clrMapOvr>
+</p:sld>
+</file>
+
+<file path=ppt/slides/slide19.xml><?xml version="1.0" encoding="utf-8"?>
 <p:sld xmlns:a="http://schemas.openxmlformats.org/drawingml/2006/main" xmlns:r="http://schemas.openxmlformats.org/officeDocument/2006/relationships" xmlns:p="http://schemas.openxmlformats.org/presentationml/2006/main">
   <p:cSld>
     <p:spTree>
@@ -10201,7 +10472,7 @@
         <p:spPr/>
         <p:txBody>
           <a:bodyPr>
-            <a:normAutofit fontScale="85000" lnSpcReduction="20000"/>
+            <a:normAutofit fontScale="77500" lnSpcReduction="20000"/>
           </a:bodyPr>
           <a:lstStyle/>
           <a:p>
@@ -10294,6 +10565,13 @@
             </a:r>
           </a:p>
           <a:p>
+            <a:pPr marL="800100" lvl="1"/>
+            <a:r>
+              <a:rPr lang="en-US" sz="1200" dirty="0"/>
+              <a:t>Suggestion to first analyze using a “mixed representation” category. Then depending on the results, it may be better included in one of the other categories</a:t>
+            </a:r>
+          </a:p>
+          <a:p>
             <a:pPr marL="400050">
               <a:buFont typeface="+mj-lt"/>
               <a:buAutoNum type="arabicPeriod"/>
@@ -10351,6 +10629,13 @@
             <a:r>
               <a:rPr lang="en-US" sz="1200" dirty="0"/>
               <a:t>Based on the “average UT Austin student?”</a:t>
+            </a:r>
+          </a:p>
+          <a:p>
+            <a:pPr marL="800100" lvl="1"/>
+            <a:r>
+              <a:rPr lang="en-US" sz="1200" dirty="0"/>
+              <a:t>Suggestion to refine our hypothesis and base our control from that</a:t>
             </a:r>
           </a:p>
           <a:p>
@@ -10388,7 +10673,156 @@
 </p:sld>
 </file>
 
-<file path=ppt/slides/slide19.xml><?xml version="1.0" encoding="utf-8"?>
+<file path=ppt/slides/slide2.xml><?xml version="1.0" encoding="utf-8"?>
+<p:sld xmlns:a="http://schemas.openxmlformats.org/drawingml/2006/main" xmlns:r="http://schemas.openxmlformats.org/officeDocument/2006/relationships" xmlns:p="http://schemas.openxmlformats.org/presentationml/2006/main">
+  <p:cSld>
+    <p:spTree>
+      <p:nvGrpSpPr>
+        <p:cNvPr id="1" name=""/>
+        <p:cNvGrpSpPr/>
+        <p:nvPr/>
+      </p:nvGrpSpPr>
+      <p:grpSpPr>
+        <a:xfrm>
+          <a:off x="0" y="0"/>
+          <a:ext cx="0" cy="0"/>
+          <a:chOff x="0" y="0"/>
+          <a:chExt cx="0" cy="0"/>
+        </a:xfrm>
+      </p:grpSpPr>
+      <p:sp>
+        <p:nvSpPr>
+          <p:cNvPr id="2" name="Title 1">
+            <a:extLst>
+              <a:ext uri="{FF2B5EF4-FFF2-40B4-BE49-F238E27FC236}">
+                <a16:creationId xmlns:a16="http://schemas.microsoft.com/office/drawing/2014/main" id="{EE942BA3-1274-4ACF-B493-D83026640C8D}"/>
+              </a:ext>
+            </a:extLst>
+          </p:cNvPr>
+          <p:cNvSpPr>
+            <a:spLocks noGrp="1"/>
+          </p:cNvSpPr>
+          <p:nvPr>
+            <p:ph type="title"/>
+          </p:nvPr>
+        </p:nvSpPr>
+        <p:spPr/>
+        <p:txBody>
+          <a:bodyPr>
+            <a:normAutofit/>
+          </a:bodyPr>
+          <a:lstStyle/>
+          <a:p>
+            <a:r>
+              <a:rPr lang="en-US" sz="3200" dirty="0"/>
+              <a:t>SAGE Survey validation</a:t>
+            </a:r>
+          </a:p>
+        </p:txBody>
+      </p:sp>
+      <p:sp>
+        <p:nvSpPr>
+          <p:cNvPr id="3" name="Content Placeholder 2">
+            <a:extLst>
+              <a:ext uri="{FF2B5EF4-FFF2-40B4-BE49-F238E27FC236}">
+                <a16:creationId xmlns:a16="http://schemas.microsoft.com/office/drawing/2014/main" id="{4BE01A12-C067-4E9B-B10F-7D7A6A0EA2D9}"/>
+              </a:ext>
+            </a:extLst>
+          </p:cNvPr>
+          <p:cNvSpPr>
+            <a:spLocks noGrp="1"/>
+          </p:cNvSpPr>
+          <p:nvPr>
+            <p:ph idx="1"/>
+          </p:nvPr>
+        </p:nvSpPr>
+        <p:spPr/>
+        <p:txBody>
+          <a:bodyPr>
+            <a:normAutofit fontScale="70000" lnSpcReduction="20000"/>
+          </a:bodyPr>
+          <a:lstStyle/>
+          <a:p>
+            <a:r>
+              <a:rPr lang="en-US" sz="2800" dirty="0"/>
+              <a:t>One of the “issues” we had with the SAGE survey was whether the tool would work well to measure the intended traits:</a:t>
+            </a:r>
+          </a:p>
+          <a:p>
+            <a:pPr lvl="1"/>
+            <a:r>
+              <a:rPr lang="en-US" sz="2400" dirty="0"/>
+              <a:t>Group effectiveness</a:t>
+            </a:r>
+          </a:p>
+          <a:p>
+            <a:pPr lvl="1"/>
+            <a:r>
+              <a:rPr lang="en-US" sz="2400" dirty="0"/>
+              <a:t>Equity and fairness of group work</a:t>
+            </a:r>
+          </a:p>
+          <a:p>
+            <a:pPr lvl="1"/>
+            <a:r>
+              <a:rPr lang="en-US" sz="2400" dirty="0"/>
+              <a:t>Sense of belonging</a:t>
+            </a:r>
+          </a:p>
+          <a:p>
+            <a:pPr lvl="1"/>
+            <a:r>
+              <a:rPr lang="en-US" sz="2400" dirty="0"/>
+              <a:t>Social, psychological and other benefits</a:t>
+            </a:r>
+          </a:p>
+          <a:p>
+            <a:r>
+              <a:rPr lang="en-US" sz="2800" dirty="0"/>
+              <a:t>Reduced their 54-item questionnaire down to ~20</a:t>
+            </a:r>
+          </a:p>
+          <a:p>
+            <a:r>
+              <a:rPr lang="en-US" sz="2800" dirty="0"/>
+              <a:t>Different populations (high school vs college)</a:t>
+            </a:r>
+          </a:p>
+          <a:p>
+            <a:endParaRPr lang="en-US" sz="2800" dirty="0"/>
+          </a:p>
+          <a:p>
+            <a:r>
+              <a:rPr lang="en-US" sz="2800" dirty="0"/>
+              <a:t>Need to validate the survey</a:t>
+            </a:r>
+          </a:p>
+          <a:p>
+            <a:pPr lvl="1"/>
+            <a:r>
+              <a:rPr lang="en-US" sz="2400" dirty="0"/>
+              <a:t>Does the survey measure the intended factors, and is it reliable?</a:t>
+            </a:r>
+          </a:p>
+          <a:p>
+            <a:endParaRPr lang="en-US" sz="2800" dirty="0"/>
+          </a:p>
+        </p:txBody>
+      </p:sp>
+    </p:spTree>
+    <p:extLst>
+      <p:ext uri="{BB962C8B-B14F-4D97-AF65-F5344CB8AC3E}">
+        <p14:creationId xmlns:p14="http://schemas.microsoft.com/office/powerpoint/2010/main" val="3752492781"/>
+      </p:ext>
+    </p:extLst>
+  </p:cSld>
+  <p:clrMapOvr>
+    <a:masterClrMapping/>
+  </p:clrMapOvr>
+</p:sld>
+</file>
+
+<file path=ppt/slides/slide20.xml><?xml version="1.0" encoding="utf-8"?>
 <p:sld xmlns:a="http://schemas.openxmlformats.org/drawingml/2006/main" xmlns:r="http://schemas.openxmlformats.org/officeDocument/2006/relationships" xmlns:p="http://schemas.openxmlformats.org/presentationml/2006/main" show="0">
   <p:cSld>
     <p:spTree>
@@ -10773,156 +11207,7 @@
 </p:sld>
 </file>
 
-<file path=ppt/slides/slide2.xml><?xml version="1.0" encoding="utf-8"?>
-<p:sld xmlns:a="http://schemas.openxmlformats.org/drawingml/2006/main" xmlns:r="http://schemas.openxmlformats.org/officeDocument/2006/relationships" xmlns:p="http://schemas.openxmlformats.org/presentationml/2006/main">
-  <p:cSld>
-    <p:spTree>
-      <p:nvGrpSpPr>
-        <p:cNvPr id="1" name=""/>
-        <p:cNvGrpSpPr/>
-        <p:nvPr/>
-      </p:nvGrpSpPr>
-      <p:grpSpPr>
-        <a:xfrm>
-          <a:off x="0" y="0"/>
-          <a:ext cx="0" cy="0"/>
-          <a:chOff x="0" y="0"/>
-          <a:chExt cx="0" cy="0"/>
-        </a:xfrm>
-      </p:grpSpPr>
-      <p:sp>
-        <p:nvSpPr>
-          <p:cNvPr id="2" name="Title 1">
-            <a:extLst>
-              <a:ext uri="{FF2B5EF4-FFF2-40B4-BE49-F238E27FC236}">
-                <a16:creationId xmlns:a16="http://schemas.microsoft.com/office/drawing/2014/main" id="{EE942BA3-1274-4ACF-B493-D83026640C8D}"/>
-              </a:ext>
-            </a:extLst>
-          </p:cNvPr>
-          <p:cNvSpPr>
-            <a:spLocks noGrp="1"/>
-          </p:cNvSpPr>
-          <p:nvPr>
-            <p:ph type="title"/>
-          </p:nvPr>
-        </p:nvSpPr>
-        <p:spPr/>
-        <p:txBody>
-          <a:bodyPr>
-            <a:normAutofit/>
-          </a:bodyPr>
-          <a:lstStyle/>
-          <a:p>
-            <a:r>
-              <a:rPr lang="en-US" sz="3200" dirty="0"/>
-              <a:t>SAGE Survey validation</a:t>
-            </a:r>
-          </a:p>
-        </p:txBody>
-      </p:sp>
-      <p:sp>
-        <p:nvSpPr>
-          <p:cNvPr id="3" name="Content Placeholder 2">
-            <a:extLst>
-              <a:ext uri="{FF2B5EF4-FFF2-40B4-BE49-F238E27FC236}">
-                <a16:creationId xmlns:a16="http://schemas.microsoft.com/office/drawing/2014/main" id="{4BE01A12-C067-4E9B-B10F-7D7A6A0EA2D9}"/>
-              </a:ext>
-            </a:extLst>
-          </p:cNvPr>
-          <p:cNvSpPr>
-            <a:spLocks noGrp="1"/>
-          </p:cNvSpPr>
-          <p:nvPr>
-            <p:ph idx="1"/>
-          </p:nvPr>
-        </p:nvSpPr>
-        <p:spPr/>
-        <p:txBody>
-          <a:bodyPr>
-            <a:normAutofit fontScale="70000" lnSpcReduction="20000"/>
-          </a:bodyPr>
-          <a:lstStyle/>
-          <a:p>
-            <a:r>
-              <a:rPr lang="en-US" sz="2800" dirty="0"/>
-              <a:t>One of the “issues” we had with the SAGE survey was whether the tool would work well to measure the intended traits:</a:t>
-            </a:r>
-          </a:p>
-          <a:p>
-            <a:pPr lvl="1"/>
-            <a:r>
-              <a:rPr lang="en-US" sz="2400" dirty="0"/>
-              <a:t>Group effectiveness</a:t>
-            </a:r>
-          </a:p>
-          <a:p>
-            <a:pPr lvl="1"/>
-            <a:r>
-              <a:rPr lang="en-US" sz="2400" dirty="0"/>
-              <a:t>Equity and fairness of group work</a:t>
-            </a:r>
-          </a:p>
-          <a:p>
-            <a:pPr lvl="1"/>
-            <a:r>
-              <a:rPr lang="en-US" sz="2400" dirty="0"/>
-              <a:t>Sense of belonging</a:t>
-            </a:r>
-          </a:p>
-          <a:p>
-            <a:pPr lvl="1"/>
-            <a:r>
-              <a:rPr lang="en-US" sz="2400" dirty="0"/>
-              <a:t>Social, psychological and other benefits</a:t>
-            </a:r>
-          </a:p>
-          <a:p>
-            <a:r>
-              <a:rPr lang="en-US" sz="2800" dirty="0"/>
-              <a:t>Reduced their 54-item questionnaire down to ~20</a:t>
-            </a:r>
-          </a:p>
-          <a:p>
-            <a:r>
-              <a:rPr lang="en-US" sz="2800" dirty="0"/>
-              <a:t>Different populations (high school vs college)</a:t>
-            </a:r>
-          </a:p>
-          <a:p>
-            <a:endParaRPr lang="en-US" sz="2800" dirty="0"/>
-          </a:p>
-          <a:p>
-            <a:r>
-              <a:rPr lang="en-US" sz="2800" dirty="0"/>
-              <a:t>Need to validate the survey</a:t>
-            </a:r>
-          </a:p>
-          <a:p>
-            <a:pPr lvl="1"/>
-            <a:r>
-              <a:rPr lang="en-US" sz="2400" dirty="0"/>
-              <a:t>Does the survey measure the intended factors, and is it reliable?</a:t>
-            </a:r>
-          </a:p>
-          <a:p>
-            <a:endParaRPr lang="en-US" sz="2800" dirty="0"/>
-          </a:p>
-        </p:txBody>
-      </p:sp>
-    </p:spTree>
-    <p:extLst>
-      <p:ext uri="{BB962C8B-B14F-4D97-AF65-F5344CB8AC3E}">
-        <p14:creationId xmlns:p14="http://schemas.microsoft.com/office/powerpoint/2010/main" val="3752492781"/>
-      </p:ext>
-    </p:extLst>
-  </p:cSld>
-  <p:clrMapOvr>
-    <a:masterClrMapping/>
-  </p:clrMapOvr>
-</p:sld>
-</file>
-
-<file path=ppt/slides/slide20.xml><?xml version="1.0" encoding="utf-8"?>
+<file path=ppt/slides/slide21.xml><?xml version="1.0" encoding="utf-8"?>
 <p:sld xmlns:a="http://schemas.openxmlformats.org/drawingml/2006/main" xmlns:r="http://schemas.openxmlformats.org/officeDocument/2006/relationships" xmlns:p="http://schemas.openxmlformats.org/presentationml/2006/main" show="0">
   <p:cSld>
     <p:spTree>
@@ -11271,7 +11556,7 @@
 </p:sld>
 </file>
 
-<file path=ppt/slides/slide21.xml><?xml version="1.0" encoding="utf-8"?>
+<file path=ppt/slides/slide22.xml><?xml version="1.0" encoding="utf-8"?>
 <p:sld xmlns:a="http://schemas.openxmlformats.org/drawingml/2006/main" xmlns:r="http://schemas.openxmlformats.org/officeDocument/2006/relationships" xmlns:p="http://schemas.openxmlformats.org/presentationml/2006/main" show="0">
   <p:cSld>
     <p:spTree>
@@ -11636,7 +11921,7 @@
 </p:sld>
 </file>
 
-<file path=ppt/slides/slide22.xml><?xml version="1.0" encoding="utf-8"?>
+<file path=ppt/slides/slide23.xml><?xml version="1.0" encoding="utf-8"?>
 <p:sld xmlns:a="http://schemas.openxmlformats.org/drawingml/2006/main" xmlns:r="http://schemas.openxmlformats.org/officeDocument/2006/relationships" xmlns:p="http://schemas.openxmlformats.org/presentationml/2006/main" show="0">
   <p:cSld>
     <p:spTree>
@@ -11995,7 +12280,7 @@
 </p:sld>
 </file>
 
-<file path=ppt/slides/slide23.xml><?xml version="1.0" encoding="utf-8"?>
+<file path=ppt/slides/slide24.xml><?xml version="1.0" encoding="utf-8"?>
 <p:sld xmlns:a="http://schemas.openxmlformats.org/drawingml/2006/main" xmlns:r="http://schemas.openxmlformats.org/officeDocument/2006/relationships" xmlns:p="http://schemas.openxmlformats.org/presentationml/2006/main" show="0">
   <p:cSld>
     <p:spTree>
@@ -12357,7 +12642,7 @@
 </p:sld>
 </file>
 
-<file path=ppt/slides/slide24.xml><?xml version="1.0" encoding="utf-8"?>
+<file path=ppt/slides/slide25.xml><?xml version="1.0" encoding="utf-8"?>
 <p:sld xmlns:a="http://schemas.openxmlformats.org/drawingml/2006/main" xmlns:r="http://schemas.openxmlformats.org/officeDocument/2006/relationships" xmlns:p="http://schemas.openxmlformats.org/presentationml/2006/main" show="0">
   <p:cSld>
     <p:spTree>
@@ -12823,7 +13108,7 @@
 </p:sld>
 </file>
 
-<file path=ppt/slides/slide25.xml><?xml version="1.0" encoding="utf-8"?>
+<file path=ppt/slides/slide26.xml><?xml version="1.0" encoding="utf-8"?>
 <p:sld xmlns:a="http://schemas.openxmlformats.org/drawingml/2006/main" xmlns:r="http://schemas.openxmlformats.org/officeDocument/2006/relationships" xmlns:p="http://schemas.openxmlformats.org/presentationml/2006/main" show="0">
   <p:cSld>
     <p:spTree>
@@ -12968,7 +13253,7 @@
 </p:sld>
 </file>
 
-<file path=ppt/slides/slide26.xml><?xml version="1.0" encoding="utf-8"?>
+<file path=ppt/slides/slide27.xml><?xml version="1.0" encoding="utf-8"?>
 <p:sld xmlns:a="http://schemas.openxmlformats.org/drawingml/2006/main" xmlns:r="http://schemas.openxmlformats.org/officeDocument/2006/relationships" xmlns:p="http://schemas.openxmlformats.org/presentationml/2006/main" show="0">
   <p:cSld>
     <p:spTree>
@@ -13184,7 +13469,7 @@
 </p:sld>
 </file>
 
-<file path=ppt/slides/slide27.xml><?xml version="1.0" encoding="utf-8"?>
+<file path=ppt/slides/slide28.xml><?xml version="1.0" encoding="utf-8"?>
 <p:sld xmlns:a="http://schemas.openxmlformats.org/drawingml/2006/main" xmlns:r="http://schemas.openxmlformats.org/officeDocument/2006/relationships" xmlns:p="http://schemas.openxmlformats.org/presentationml/2006/main" show="0">
   <p:cSld>
     <p:spTree>
@@ -14002,7 +14287,7 @@
             <p:spPr/>
             <p:txBody>
               <a:bodyPr>
-                <a:normAutofit fontScale="70000" lnSpcReduction="20000"/>
+                <a:normAutofit fontScale="77500" lnSpcReduction="20000"/>
               </a:bodyPr>
               <a:lstStyle/>
               <a:p>
@@ -14036,7 +14321,7 @@
                 <a:pPr marL="857250" lvl="1" indent="-457200"/>
                 <a:r>
                   <a:rPr lang="en-US" sz="1600" dirty="0"/>
-                  <a:t>Strongly disagree = 1, ..., Neither agree nor disagree = 3, …,  Strongly agree = 6 (for 6-point Likert questions)</a:t>
+                  <a:t>Strongly disagree = 1, …,  Strongly agree = 6 (for 6-point Likert questions)</a:t>
                 </a:r>
               </a:p>
               <a:p>
@@ -14152,22 +14437,15 @@
               <a:p>
                 <a:pPr marL="857250" lvl="1" indent="-457200"/>
                 <a:r>
-                  <a:rPr lang="en-US" sz="1600" b="1" dirty="0"/>
+                  <a:rPr lang="en-US" sz="1600" dirty="0"/>
                   <a:t>Method 2: Change 6-point to pseudo-5-point by multiplying by 5/6 (produces same as z-score)</a:t>
                 </a:r>
               </a:p>
               <a:p>
                 <a:pPr marL="857250" lvl="1" indent="-457200"/>
                 <a:r>
-                  <a:rPr lang="en-US" sz="1600" dirty="0"/>
-                  <a:t>Method 3: SD+D = -1, N = 0, SA+A = 1 </a:t>
-                </a:r>
-              </a:p>
-              <a:p>
-                <a:pPr marL="857250" lvl="1" indent="-457200"/>
-                <a:r>
-                  <a:rPr lang="en-US" sz="1600" dirty="0"/>
-                  <a:t>(all produce identical analysis)</a:t>
+                  <a:rPr lang="en-US" sz="1600" b="1" dirty="0"/>
+                  <a:t>Method 3: SD= -1, …, N = 0, …, SA= 1 </a:t>
                 </a:r>
               </a:p>
               <a:p>
@@ -14220,7 +14498,7 @@
               <a:blipFill>
                 <a:blip r:embed="rId3"/>
                 <a:stretch>
-                  <a:fillRect l="-222" t="-1627"/>
+                  <a:fillRect l="-370" t="-1808"/>
                 </a:stretch>
               </a:blipFill>
             </p:spPr>
@@ -14857,7 +15135,7 @@
           <a:p>
             <a:r>
               <a:rPr lang="en-US" sz="2200" dirty="0"/>
-              <a:t>*The python package fails to converge in the fit</a:t>
+              <a:t>*The python package fails to converge so we use R instead </a:t>
             </a:r>
           </a:p>
         </p:txBody>
@@ -14876,7 +15154,7 @@
 </file>
 
 <file path=ppt/slides/slide9.xml><?xml version="1.0" encoding="utf-8"?>
-<p:sld xmlns:a="http://schemas.openxmlformats.org/drawingml/2006/main" xmlns:r="http://schemas.openxmlformats.org/officeDocument/2006/relationships" xmlns:p="http://schemas.openxmlformats.org/presentationml/2006/main">
+<p:sld xmlns:a="http://schemas.openxmlformats.org/drawingml/2006/main" xmlns:r="http://schemas.openxmlformats.org/officeDocument/2006/relationships" xmlns:p="http://schemas.openxmlformats.org/presentationml/2006/main" show="0">
   <p:cSld>
     <p:spTree>
       <p:nvGrpSpPr>

</xml_diff>

<commit_message>
Updates the Factor Analysis
</commit_message>
<xml_diff>
--- a/Analysis_explanation.pptx
+++ b/Analysis_explanation.pptx
@@ -408,7 +408,7 @@
               <a:pPr>
                 <a:defRPr/>
               </a:pPr>
-              <a:t>2/27/2023</a:t>
+              <a:t>2/28/2023</a:t>
             </a:fld>
             <a:endParaRPr lang="en-US" dirty="0"/>
           </a:p>
@@ -10608,7 +10608,7 @@
         <p:spPr/>
         <p:txBody>
           <a:bodyPr>
-            <a:normAutofit fontScale="92500" lnSpcReduction="20000"/>
+            <a:normAutofit fontScale="85000" lnSpcReduction="20000"/>
           </a:bodyPr>
           <a:lstStyle/>
           <a:p>
@@ -10618,14 +10618,14 @@
             </a:pPr>
             <a:r>
               <a:rPr lang="en-US" sz="2000" dirty="0"/>
-              <a:t>Factor 1 (theme?)</a:t>
+              <a:t>Quality of process</a:t>
             </a:r>
           </a:p>
           <a:p>
             <a:pPr lvl="1"/>
             <a:r>
               <a:rPr lang="en-US" sz="1100" dirty="0"/>
-              <a:t>'When I work in a group, I am able to share my ideas.', 'The material is easier to understand when I work with other students.', 'I feel I am part of what is going on in the group.', 'I try to make sure my group members learn the material.', 'I learn to work with students who are different from me.', 'I prefer to take on tasks that will help me better learn the material.', 'I also learn when I teach the material to my group members.', 'Everyone’s ideas are needed if we are going to be successful.', 'My group did higher quality work when my group members worked on tasks together.’</a:t>
+              <a:t>'When I work in a group, I end up doing most of the work.', 'The work takes more time to complete when I work with other students.', 'The workload is usually less when I work with other students.', 'I do not think a group grade is fair.', 'I feel working in groups is a waste of time.', 'When I work with other students the work is divided equally.’</a:t>
             </a:r>
             <a:endParaRPr lang="en-US" sz="1600" dirty="0"/>
           </a:p>
@@ -10636,14 +10636,14 @@
             </a:pPr>
             <a:r>
               <a:rPr lang="en-US" sz="2000" dirty="0"/>
-              <a:t>Mindset</a:t>
+              <a:t>Collective Learning</a:t>
             </a:r>
           </a:p>
           <a:p>
             <a:pPr lvl="1"/>
             <a:r>
               <a:rPr lang="en-US" sz="1100" dirty="0"/>
-              <a:t>'You have a certain amount of physics intelligence, and you can’t really do much to change it.', 'Your physics intelligence is something about you that you can change.', 'You can learn new things, but you can’t really change your basic physics intelligence.’</a:t>
+              <a:t>'I feel I am part of what is going on in the group.', 'I try to make sure my group members learn the material.', 'I learn to work with students who are different from me.', 'I prefer to take on tasks that will help me better learn the material.', 'I also learn when I teach the material to my group members.', 'Everyone’s ideas are needed if we are going to be successful.’</a:t>
             </a:r>
             <a:endParaRPr lang="en-US" sz="1600" dirty="0"/>
           </a:p>
@@ -10654,14 +10654,14 @@
             </a:pPr>
             <a:r>
               <a:rPr lang="en-US" sz="2000" dirty="0"/>
-              <a:t>Frustrations</a:t>
+              <a:t>Individual Belonging</a:t>
             </a:r>
           </a:p>
           <a:p>
             <a:pPr lvl="1"/>
             <a:r>
               <a:rPr lang="en-US" sz="1100" dirty="0"/>
-              <a:t>'When I work in a group, I end up doing most of the work.', 'The work takes more time to complete when I work with other students.', 'I do not think a group grade is fair.', 'I feel working in groups is a waste of time.', 'I become frustrated when my group members do not understand the material.’</a:t>
+              <a:t>'When I work in a group, I am able to share my ideas.', 'My group members make me feel that I am not as smart as they are.', 'My group members respect my opinions.', 'My group members do not care about my feelings.’</a:t>
             </a:r>
             <a:endParaRPr lang="en-US" sz="1600" dirty="0"/>
           </a:p>
@@ -10672,14 +10672,14 @@
             </a:pPr>
             <a:r>
               <a:rPr lang="en-US" sz="2000" dirty="0"/>
-              <a:t>Individual Belonging</a:t>
+              <a:t>Mindset</a:t>
             </a:r>
           </a:p>
           <a:p>
             <a:pPr lvl="1"/>
             <a:r>
               <a:rPr lang="en-US" sz="1100" dirty="0"/>
-              <a:t>'My group members make me feel that I am not as smart as they are.', 'My group members respect my opinions.', 'My group members do not care about my feelings.’</a:t>
+              <a:t>'You have a certain amount of physics intelligence, and you can’t really do much to change it.', 'Your physics intelligence is something about you that you can change.', 'You can learn new things, but you can’t really change your basic physics intelligence.’</a:t>
             </a:r>
             <a:endParaRPr lang="en-US" sz="1600" dirty="0"/>
           </a:p>
@@ -10690,14 +10690,32 @@
             </a:pPr>
             <a:r>
               <a:rPr lang="en-US" sz="2000" dirty="0"/>
-              <a:t>Quality of process</a:t>
+              <a:t>Factor5 (Theme?)</a:t>
             </a:r>
           </a:p>
           <a:p>
             <a:pPr lvl="1"/>
             <a:r>
               <a:rPr lang="en-US" sz="1100" dirty="0"/>
-              <a:t>'The workload is usually less when I work with other students.', 'When I work with other students the work is divided equally.'</a:t>
+              <a:t>'When I work in a group, I do higher quality work.', 'The material is easier to understand when I work with other students.'</a:t>
+            </a:r>
+          </a:p>
+          <a:p>
+            <a:pPr marL="514350" indent="-457200">
+              <a:buFont typeface="+mj-lt"/>
+              <a:buAutoNum type="arabicPeriod"/>
+            </a:pPr>
+            <a:r>
+              <a:rPr lang="en-US" sz="2000" dirty="0"/>
+              <a:t>Frustrations</a:t>
+            </a:r>
+            <a:endParaRPr lang="en-US" sz="1600" dirty="0"/>
+          </a:p>
+          <a:p>
+            <a:pPr lvl="1"/>
+            <a:r>
+              <a:rPr lang="en-US" sz="1100" dirty="0"/>
+              <a:t>'I have to work with students who are not as smart as I am.', 'I become frustrated when my group members do not understand the material.'</a:t>
             </a:r>
             <a:endParaRPr lang="en-US" sz="1600" dirty="0"/>
           </a:p>
@@ -19447,8 +19465,8 @@
           </a:p>
         </p:txBody>
       </p:sp>
-      <mc:AlternateContent xmlns:mc="http://schemas.openxmlformats.org/markup-compatibility/2006" xmlns:a14="http://schemas.microsoft.com/office/drawing/2010/main">
-        <mc:Choice Requires="a14">
+      <mc:AlternateContent xmlns:mc="http://schemas.openxmlformats.org/markup-compatibility/2006">
+        <mc:Choice xmlns:a14="http://schemas.microsoft.com/office/drawing/2010/main" Requires="a14">
           <p:sp>
             <p:nvSpPr>
               <p:cNvPr id="7" name="Content Placeholder 6">
@@ -19619,7 +19637,7 @@
                 <a:pPr marL="857250" lvl="1" indent="-457200"/>
                 <a:r>
                   <a:rPr lang="en-US" sz="1600" dirty="0"/>
-                  <a:t>Method 2: Change 6-point to pseudo-5-point by multiplying by 5/6 (produces same as z-score)</a:t>
+                  <a:t>Method 2: Change 6-point to pseudo-5-point by (*0.8+0.2) (produces same as z-score)</a:t>
                 </a:r>
               </a:p>
               <a:p>
@@ -19628,6 +19646,7 @@
                   <a:rPr lang="en-US" sz="1600" b="1" dirty="0"/>
                   <a:t>Method 3: SD= -1, …, N = 0, …, SA= 1 </a:t>
                 </a:r>
+                <a:endParaRPr lang="en-US" sz="1200" b="1" dirty="0"/>
               </a:p>
               <a:p>
                 <a:pPr marL="457200" indent="-457200">
@@ -19658,7 +19677,7 @@
             </p:txBody>
           </p:sp>
         </mc:Choice>
-        <mc:Fallback xmlns="">
+        <mc:Fallback>
           <p:sp>
             <p:nvSpPr>
               <p:cNvPr id="7" name="Content Placeholder 6">

</xml_diff>

<commit_message>
Includes separate boxplots of factor ratings by intervention
</commit_message>
<xml_diff>
--- a/Analysis_explanation.pptx
+++ b/Analysis_explanation.pptx
@@ -408,7 +408,7 @@
               <a:pPr>
                 <a:defRPr/>
               </a:pPr>
-              <a:t>2/28/2023</a:t>
+              <a:t>3/3/2023</a:t>
             </a:fld>
             <a:endParaRPr lang="en-US" dirty="0"/>
           </a:p>
@@ -11010,7 +11010,7 @@
         <p:spPr/>
         <p:txBody>
           <a:bodyPr>
-            <a:normAutofit fontScale="92500" lnSpcReduction="20000"/>
+            <a:normAutofit fontScale="92500" lnSpcReduction="10000"/>
           </a:bodyPr>
           <a:lstStyle/>
           <a:p>
@@ -11060,13 +11060,6 @@
             <a:r>
               <a:rPr lang="en-US" sz="1200" dirty="0"/>
               <a:t>Dependent variables are continuous</a:t>
-            </a:r>
-          </a:p>
-          <a:p>
-            <a:pPr marL="800100" lvl="1"/>
-            <a:r>
-              <a:rPr lang="en-US" sz="1200" dirty="0"/>
-              <a:t>Suggestion to first analyze using a “mixed representation” category. Then depending on the results, it may be better included in one of the other categories</a:t>
             </a:r>
           </a:p>
           <a:p>
@@ -19465,8 +19458,8 @@
           </a:p>
         </p:txBody>
       </p:sp>
-      <mc:AlternateContent xmlns:mc="http://schemas.openxmlformats.org/markup-compatibility/2006">
-        <mc:Choice xmlns:a14="http://schemas.microsoft.com/office/drawing/2010/main" Requires="a14">
+      <mc:AlternateContent xmlns:mc="http://schemas.openxmlformats.org/markup-compatibility/2006" xmlns:a14="http://schemas.microsoft.com/office/drawing/2010/main">
+        <mc:Choice Requires="a14">
           <p:sp>
             <p:nvSpPr>
               <p:cNvPr id="7" name="Content Placeholder 6">
@@ -19677,7 +19670,7 @@
             </p:txBody>
           </p:sp>
         </mc:Choice>
-        <mc:Fallback>
+        <mc:Fallback xmlns="">
           <p:sp>
             <p:nvSpPr>
               <p:cNvPr id="7" name="Content Placeholder 6">

</xml_diff>

<commit_message>
Tests the differences of different item cutoffs
</commit_message>
<xml_diff>
--- a/Analysis_explanation.pptx
+++ b/Analysis_explanation.pptx
@@ -7,7 +7,7 @@
     <p:sldMasterId id="2147483669" r:id="rId3"/>
   </p:sldMasterIdLst>
   <p:notesMasterIdLst>
-    <p:notesMasterId r:id="rId44"/>
+    <p:notesMasterId r:id="rId45"/>
   </p:notesMasterIdLst>
   <p:sldIdLst>
     <p:sldId id="710" r:id="rId4"/>
@@ -27,29 +27,30 @@
     <p:sldId id="738" r:id="rId18"/>
     <p:sldId id="740" r:id="rId19"/>
     <p:sldId id="739" r:id="rId20"/>
-    <p:sldId id="741" r:id="rId21"/>
-    <p:sldId id="743" r:id="rId22"/>
-    <p:sldId id="744" r:id="rId23"/>
-    <p:sldId id="745" r:id="rId24"/>
-    <p:sldId id="746" r:id="rId25"/>
-    <p:sldId id="747" r:id="rId26"/>
-    <p:sldId id="748" r:id="rId27"/>
-    <p:sldId id="742" r:id="rId28"/>
-    <p:sldId id="749" r:id="rId29"/>
-    <p:sldId id="750" r:id="rId30"/>
-    <p:sldId id="751" r:id="rId31"/>
-    <p:sldId id="752" r:id="rId32"/>
-    <p:sldId id="753" r:id="rId33"/>
-    <p:sldId id="723" r:id="rId34"/>
-    <p:sldId id="724" r:id="rId35"/>
-    <p:sldId id="725" r:id="rId36"/>
-    <p:sldId id="726" r:id="rId37"/>
-    <p:sldId id="727" r:id="rId38"/>
-    <p:sldId id="728" r:id="rId39"/>
-    <p:sldId id="729" r:id="rId40"/>
-    <p:sldId id="714" r:id="rId41"/>
-    <p:sldId id="721" r:id="rId42"/>
-    <p:sldId id="722" r:id="rId43"/>
+    <p:sldId id="754" r:id="rId21"/>
+    <p:sldId id="741" r:id="rId22"/>
+    <p:sldId id="743" r:id="rId23"/>
+    <p:sldId id="744" r:id="rId24"/>
+    <p:sldId id="745" r:id="rId25"/>
+    <p:sldId id="746" r:id="rId26"/>
+    <p:sldId id="747" r:id="rId27"/>
+    <p:sldId id="748" r:id="rId28"/>
+    <p:sldId id="742" r:id="rId29"/>
+    <p:sldId id="749" r:id="rId30"/>
+    <p:sldId id="750" r:id="rId31"/>
+    <p:sldId id="751" r:id="rId32"/>
+    <p:sldId id="752" r:id="rId33"/>
+    <p:sldId id="753" r:id="rId34"/>
+    <p:sldId id="723" r:id="rId35"/>
+    <p:sldId id="724" r:id="rId36"/>
+    <p:sldId id="725" r:id="rId37"/>
+    <p:sldId id="726" r:id="rId38"/>
+    <p:sldId id="727" r:id="rId39"/>
+    <p:sldId id="728" r:id="rId40"/>
+    <p:sldId id="729" r:id="rId41"/>
+    <p:sldId id="714" r:id="rId42"/>
+    <p:sldId id="721" r:id="rId43"/>
+    <p:sldId id="722" r:id="rId44"/>
   </p:sldIdLst>
   <p:sldSz cx="9144000" cy="5143500" type="screen16x9"/>
   <p:notesSz cx="6858000" cy="9313863"/>
@@ -200,6 +201,7 @@
             <p14:sldId id="738"/>
             <p14:sldId id="740"/>
             <p14:sldId id="739"/>
+            <p14:sldId id="754"/>
             <p14:sldId id="741"/>
             <p14:sldId id="743"/>
             <p14:sldId id="744"/>
@@ -424,7 +426,7 @@
               <a:pPr>
                 <a:defRPr/>
               </a:pPr>
-              <a:t>3/6/2023</a:t>
+              <a:t>3/20/2023</a:t>
             </a:fld>
             <a:endParaRPr lang="en-US" dirty="0"/>
           </a:p>
@@ -1469,14 +1471,14 @@
               </a:pPr>
               <a:t>18</a:t>
             </a:fld>
-            <a:endParaRPr lang="en-US"/>
+            <a:endParaRPr lang="en-US" dirty="0"/>
           </a:p>
         </p:txBody>
       </p:sp>
     </p:spTree>
     <p:extLst>
       <p:ext uri="{BB962C8B-B14F-4D97-AF65-F5344CB8AC3E}">
-        <p14:creationId xmlns:p14="http://schemas.microsoft.com/office/powerpoint/2010/main" val="234011316"/>
+        <p14:creationId xmlns:p14="http://schemas.microsoft.com/office/powerpoint/2010/main" val="1358395206"/>
       </p:ext>
     </p:extLst>
   </p:cSld>
@@ -1566,7 +1568,7 @@
     </p:spTree>
     <p:extLst>
       <p:ext uri="{BB962C8B-B14F-4D97-AF65-F5344CB8AC3E}">
-        <p14:creationId xmlns:p14="http://schemas.microsoft.com/office/powerpoint/2010/main" val="3769106545"/>
+        <p14:creationId xmlns:p14="http://schemas.microsoft.com/office/powerpoint/2010/main" val="234011316"/>
       </p:ext>
     </p:extLst>
   </p:cSld>
@@ -1656,7 +1658,7 @@
     </p:spTree>
     <p:extLst>
       <p:ext uri="{BB962C8B-B14F-4D97-AF65-F5344CB8AC3E}">
-        <p14:creationId xmlns:p14="http://schemas.microsoft.com/office/powerpoint/2010/main" val="662227111"/>
+        <p14:creationId xmlns:p14="http://schemas.microsoft.com/office/powerpoint/2010/main" val="3769106545"/>
       </p:ext>
     </p:extLst>
   </p:cSld>
@@ -1746,7 +1748,7 @@
     </p:spTree>
     <p:extLst>
       <p:ext uri="{BB962C8B-B14F-4D97-AF65-F5344CB8AC3E}">
-        <p14:creationId xmlns:p14="http://schemas.microsoft.com/office/powerpoint/2010/main" val="2330631042"/>
+        <p14:creationId xmlns:p14="http://schemas.microsoft.com/office/powerpoint/2010/main" val="662227111"/>
       </p:ext>
     </p:extLst>
   </p:cSld>
@@ -1926,7 +1928,7 @@
     </p:spTree>
     <p:extLst>
       <p:ext uri="{BB962C8B-B14F-4D97-AF65-F5344CB8AC3E}">
-        <p14:creationId xmlns:p14="http://schemas.microsoft.com/office/powerpoint/2010/main" val="250044831"/>
+        <p14:creationId xmlns:p14="http://schemas.microsoft.com/office/powerpoint/2010/main" val="2330631042"/>
       </p:ext>
     </p:extLst>
   </p:cSld>
@@ -2016,7 +2018,7 @@
     </p:spTree>
     <p:extLst>
       <p:ext uri="{BB962C8B-B14F-4D97-AF65-F5344CB8AC3E}">
-        <p14:creationId xmlns:p14="http://schemas.microsoft.com/office/powerpoint/2010/main" val="1445927326"/>
+        <p14:creationId xmlns:p14="http://schemas.microsoft.com/office/powerpoint/2010/main" val="250044831"/>
       </p:ext>
     </p:extLst>
   </p:cSld>
@@ -2106,7 +2108,7 @@
     </p:spTree>
     <p:extLst>
       <p:ext uri="{BB962C8B-B14F-4D97-AF65-F5344CB8AC3E}">
-        <p14:creationId xmlns:p14="http://schemas.microsoft.com/office/powerpoint/2010/main" val="1370505400"/>
+        <p14:creationId xmlns:p14="http://schemas.microsoft.com/office/powerpoint/2010/main" val="1445927326"/>
       </p:ext>
     </p:extLst>
   </p:cSld>
@@ -2196,7 +2198,7 @@
     </p:spTree>
     <p:extLst>
       <p:ext uri="{BB962C8B-B14F-4D97-AF65-F5344CB8AC3E}">
-        <p14:creationId xmlns:p14="http://schemas.microsoft.com/office/powerpoint/2010/main" val="1853964926"/>
+        <p14:creationId xmlns:p14="http://schemas.microsoft.com/office/powerpoint/2010/main" val="1370505400"/>
       </p:ext>
     </p:extLst>
   </p:cSld>
@@ -2286,7 +2288,7 @@
     </p:spTree>
     <p:extLst>
       <p:ext uri="{BB962C8B-B14F-4D97-AF65-F5344CB8AC3E}">
-        <p14:creationId xmlns:p14="http://schemas.microsoft.com/office/powerpoint/2010/main" val="1416801720"/>
+        <p14:creationId xmlns:p14="http://schemas.microsoft.com/office/powerpoint/2010/main" val="1853964926"/>
       </p:ext>
     </p:extLst>
   </p:cSld>
@@ -2376,7 +2378,7 @@
     </p:spTree>
     <p:extLst>
       <p:ext uri="{BB962C8B-B14F-4D97-AF65-F5344CB8AC3E}">
-        <p14:creationId xmlns:p14="http://schemas.microsoft.com/office/powerpoint/2010/main" val="2362349655"/>
+        <p14:creationId xmlns:p14="http://schemas.microsoft.com/office/powerpoint/2010/main" val="1416801720"/>
       </p:ext>
     </p:extLst>
   </p:cSld>
@@ -2466,7 +2468,7 @@
     </p:spTree>
     <p:extLst>
       <p:ext uri="{BB962C8B-B14F-4D97-AF65-F5344CB8AC3E}">
-        <p14:creationId xmlns:p14="http://schemas.microsoft.com/office/powerpoint/2010/main" val="3375816162"/>
+        <p14:creationId xmlns:p14="http://schemas.microsoft.com/office/powerpoint/2010/main" val="2362349655"/>
       </p:ext>
     </p:extLst>
   </p:cSld>
@@ -2556,7 +2558,7 @@
     </p:spTree>
     <p:extLst>
       <p:ext uri="{BB962C8B-B14F-4D97-AF65-F5344CB8AC3E}">
-        <p14:creationId xmlns:p14="http://schemas.microsoft.com/office/powerpoint/2010/main" val="903944279"/>
+        <p14:creationId xmlns:p14="http://schemas.microsoft.com/office/powerpoint/2010/main" val="3375816162"/>
       </p:ext>
     </p:extLst>
   </p:cSld>
@@ -2646,7 +2648,7 @@
     </p:spTree>
     <p:extLst>
       <p:ext uri="{BB962C8B-B14F-4D97-AF65-F5344CB8AC3E}">
-        <p14:creationId xmlns:p14="http://schemas.microsoft.com/office/powerpoint/2010/main" val="850653099"/>
+        <p14:creationId xmlns:p14="http://schemas.microsoft.com/office/powerpoint/2010/main" val="903944279"/>
       </p:ext>
     </p:extLst>
   </p:cSld>
@@ -2729,14 +2731,14 @@
               </a:pPr>
               <a:t>31</a:t>
             </a:fld>
-            <a:endParaRPr lang="en-US" dirty="0"/>
+            <a:endParaRPr lang="en-US"/>
           </a:p>
         </p:txBody>
       </p:sp>
     </p:spTree>
     <p:extLst>
       <p:ext uri="{BB962C8B-B14F-4D97-AF65-F5344CB8AC3E}">
-        <p14:creationId xmlns:p14="http://schemas.microsoft.com/office/powerpoint/2010/main" val="234557235"/>
+        <p14:creationId xmlns:p14="http://schemas.microsoft.com/office/powerpoint/2010/main" val="850653099"/>
       </p:ext>
     </p:extLst>
   </p:cSld>
@@ -2916,7 +2918,7 @@
     </p:spTree>
     <p:extLst>
       <p:ext uri="{BB962C8B-B14F-4D97-AF65-F5344CB8AC3E}">
-        <p14:creationId xmlns:p14="http://schemas.microsoft.com/office/powerpoint/2010/main" val="2033376885"/>
+        <p14:creationId xmlns:p14="http://schemas.microsoft.com/office/powerpoint/2010/main" val="234557235"/>
       </p:ext>
     </p:extLst>
   </p:cSld>
@@ -3006,7 +3008,7 @@
     </p:spTree>
     <p:extLst>
       <p:ext uri="{BB962C8B-B14F-4D97-AF65-F5344CB8AC3E}">
-        <p14:creationId xmlns:p14="http://schemas.microsoft.com/office/powerpoint/2010/main" val="3739200774"/>
+        <p14:creationId xmlns:p14="http://schemas.microsoft.com/office/powerpoint/2010/main" val="2033376885"/>
       </p:ext>
     </p:extLst>
   </p:cSld>
@@ -3096,7 +3098,7 @@
     </p:spTree>
     <p:extLst>
       <p:ext uri="{BB962C8B-B14F-4D97-AF65-F5344CB8AC3E}">
-        <p14:creationId xmlns:p14="http://schemas.microsoft.com/office/powerpoint/2010/main" val="4121783378"/>
+        <p14:creationId xmlns:p14="http://schemas.microsoft.com/office/powerpoint/2010/main" val="3739200774"/>
       </p:ext>
     </p:extLst>
   </p:cSld>
@@ -3186,7 +3188,7 @@
     </p:spTree>
     <p:extLst>
       <p:ext uri="{BB962C8B-B14F-4D97-AF65-F5344CB8AC3E}">
-        <p14:creationId xmlns:p14="http://schemas.microsoft.com/office/powerpoint/2010/main" val="822069775"/>
+        <p14:creationId xmlns:p14="http://schemas.microsoft.com/office/powerpoint/2010/main" val="4121783378"/>
       </p:ext>
     </p:extLst>
   </p:cSld>
@@ -3276,7 +3278,7 @@
     </p:spTree>
     <p:extLst>
       <p:ext uri="{BB962C8B-B14F-4D97-AF65-F5344CB8AC3E}">
-        <p14:creationId xmlns:p14="http://schemas.microsoft.com/office/powerpoint/2010/main" val="2063437235"/>
+        <p14:creationId xmlns:p14="http://schemas.microsoft.com/office/powerpoint/2010/main" val="822069775"/>
       </p:ext>
     </p:extLst>
   </p:cSld>
@@ -3359,14 +3361,14 @@
               </a:pPr>
               <a:t>37</a:t>
             </a:fld>
-            <a:endParaRPr lang="en-US"/>
+            <a:endParaRPr lang="en-US" dirty="0"/>
           </a:p>
         </p:txBody>
       </p:sp>
     </p:spTree>
     <p:extLst>
       <p:ext uri="{BB962C8B-B14F-4D97-AF65-F5344CB8AC3E}">
-        <p14:creationId xmlns:p14="http://schemas.microsoft.com/office/powerpoint/2010/main" val="997171877"/>
+        <p14:creationId xmlns:p14="http://schemas.microsoft.com/office/powerpoint/2010/main" val="2063437235"/>
       </p:ext>
     </p:extLst>
   </p:cSld>
@@ -3456,7 +3458,7 @@
     </p:spTree>
     <p:extLst>
       <p:ext uri="{BB962C8B-B14F-4D97-AF65-F5344CB8AC3E}">
-        <p14:creationId xmlns:p14="http://schemas.microsoft.com/office/powerpoint/2010/main" val="1666312967"/>
+        <p14:creationId xmlns:p14="http://schemas.microsoft.com/office/powerpoint/2010/main" val="997171877"/>
       </p:ext>
     </p:extLst>
   </p:cSld>
@@ -3546,7 +3548,7 @@
     </p:spTree>
     <p:extLst>
       <p:ext uri="{BB962C8B-B14F-4D97-AF65-F5344CB8AC3E}">
-        <p14:creationId xmlns:p14="http://schemas.microsoft.com/office/powerpoint/2010/main" val="2154198416"/>
+        <p14:creationId xmlns:p14="http://schemas.microsoft.com/office/powerpoint/2010/main" val="1666312967"/>
       </p:ext>
     </p:extLst>
   </p:cSld>
@@ -3628,6 +3630,96 @@
                 <a:defRPr/>
               </a:pPr>
               <a:t>40</a:t>
+            </a:fld>
+            <a:endParaRPr lang="en-US"/>
+          </a:p>
+        </p:txBody>
+      </p:sp>
+    </p:spTree>
+    <p:extLst>
+      <p:ext uri="{BB962C8B-B14F-4D97-AF65-F5344CB8AC3E}">
+        <p14:creationId xmlns:p14="http://schemas.microsoft.com/office/powerpoint/2010/main" val="2154198416"/>
+      </p:ext>
+    </p:extLst>
+  </p:cSld>
+  <p:clrMapOvr>
+    <a:masterClrMapping/>
+  </p:clrMapOvr>
+</p:notes>
+</file>
+
+<file path=ppt/notesSlides/notesSlide39.xml><?xml version="1.0" encoding="utf-8"?>
+<p:notes xmlns:a="http://schemas.openxmlformats.org/drawingml/2006/main" xmlns:r="http://schemas.openxmlformats.org/officeDocument/2006/relationships" xmlns:p="http://schemas.openxmlformats.org/presentationml/2006/main">
+  <p:cSld>
+    <p:spTree>
+      <p:nvGrpSpPr>
+        <p:cNvPr id="1" name=""/>
+        <p:cNvGrpSpPr/>
+        <p:nvPr/>
+      </p:nvGrpSpPr>
+      <p:grpSpPr>
+        <a:xfrm>
+          <a:off x="0" y="0"/>
+          <a:ext cx="0" cy="0"/>
+          <a:chOff x="0" y="0"/>
+          <a:chExt cx="0" cy="0"/>
+        </a:xfrm>
+      </p:grpSpPr>
+      <p:sp>
+        <p:nvSpPr>
+          <p:cNvPr id="2" name="Slide Image Placeholder 1"/>
+          <p:cNvSpPr>
+            <a:spLocks noGrp="1" noRot="1" noChangeAspect="1"/>
+          </p:cNvSpPr>
+          <p:nvPr>
+            <p:ph type="sldImg"/>
+          </p:nvPr>
+        </p:nvSpPr>
+        <p:spPr/>
+      </p:sp>
+      <p:sp>
+        <p:nvSpPr>
+          <p:cNvPr id="3" name="Notes Placeholder 2"/>
+          <p:cNvSpPr>
+            <a:spLocks noGrp="1"/>
+          </p:cNvSpPr>
+          <p:nvPr>
+            <p:ph type="body" idx="1"/>
+          </p:nvPr>
+        </p:nvSpPr>
+        <p:spPr/>
+        <p:txBody>
+          <a:bodyPr/>
+          <a:lstStyle/>
+          <a:p>
+            <a:endParaRPr lang="en-US" dirty="0"/>
+          </a:p>
+        </p:txBody>
+      </p:sp>
+      <p:sp>
+        <p:nvSpPr>
+          <p:cNvPr id="4" name="Slide Number Placeholder 3"/>
+          <p:cNvSpPr>
+            <a:spLocks noGrp="1"/>
+          </p:cNvSpPr>
+          <p:nvPr>
+            <p:ph type="sldNum" sz="quarter" idx="5"/>
+          </p:nvPr>
+        </p:nvSpPr>
+        <p:spPr/>
+        <p:txBody>
+          <a:bodyPr/>
+          <a:lstStyle/>
+          <a:p>
+            <a:pPr>
+              <a:defRPr/>
+            </a:pPr>
+            <a:fld id="{6E074355-CE0D-4C68-A6CB-C364ED71B33B}" type="slidenum">
+              <a:rPr lang="en-US" smtClean="0"/>
+              <a:pPr>
+                <a:defRPr/>
+              </a:pPr>
+              <a:t>41</a:t>
             </a:fld>
             <a:endParaRPr lang="en-US"/>
           </a:p>
@@ -9108,45 +9200,6 @@
           </a:prstGeom>
         </p:spPr>
       </p:pic>
-      <p:cxnSp>
-        <p:nvCxnSpPr>
-          <p:cNvPr id="37" name="Straight Connector 36">
-            <a:extLst>
-              <a:ext uri="{FF2B5EF4-FFF2-40B4-BE49-F238E27FC236}">
-                <a16:creationId xmlns:a16="http://schemas.microsoft.com/office/drawing/2014/main" id="{49831381-7F3C-48C4-80EE-7690D87B3E11}"/>
-              </a:ext>
-            </a:extLst>
-          </p:cNvPr>
-          <p:cNvCxnSpPr>
-            <a:cxnSpLocks/>
-          </p:cNvCxnSpPr>
-          <p:nvPr/>
-        </p:nvCxnSpPr>
-        <p:spPr>
-          <a:xfrm>
-            <a:off x="178238" y="438150"/>
-            <a:ext cx="8077200" cy="0"/>
-          </a:xfrm>
-          <a:prstGeom prst="line">
-            <a:avLst/>
-          </a:prstGeom>
-          <a:effectLst/>
-        </p:spPr>
-        <p:style>
-          <a:lnRef idx="2">
-            <a:schemeClr val="accent1"/>
-          </a:lnRef>
-          <a:fillRef idx="0">
-            <a:schemeClr val="accent1"/>
-          </a:fillRef>
-          <a:effectRef idx="1">
-            <a:schemeClr val="accent1"/>
-          </a:effectRef>
-          <a:fontRef idx="minor">
-            <a:schemeClr val="tx1"/>
-          </a:fontRef>
-        </p:style>
-      </p:cxnSp>
       <p:sp>
         <p:nvSpPr>
           <p:cNvPr id="16" name="TextBox 15">
@@ -10472,8 +10525,8 @@
         </p:blipFill>
         <p:spPr>
           <a:xfrm>
-            <a:off x="4800601" y="1893811"/>
-            <a:ext cx="2819399" cy="2433213"/>
+            <a:off x="4800601" y="2053143"/>
+            <a:ext cx="2819399" cy="2114549"/>
           </a:xfrm>
           <a:prstGeom prst="rect">
             <a:avLst/>
@@ -10988,7 +11041,7 @@
             </a:pPr>
             <a:r>
               <a:rPr lang="en-US" sz="2000" dirty="0"/>
-              <a:t>Individual Perceptions</a:t>
+              <a:t>Impact on Individual</a:t>
             </a:r>
           </a:p>
           <a:p>
@@ -11411,26 +11464,6 @@
               <a:t>Suggestion to refine our hypothesis and base our control from that</a:t>
             </a:r>
           </a:p>
-          <a:p>
-            <a:pPr marL="400050">
-              <a:buFont typeface="+mj-lt"/>
-              <a:buAutoNum type="arabicPeriod"/>
-            </a:pPr>
-            <a:r>
-              <a:rPr lang="en-US" sz="1600" dirty="0"/>
-              <a:t>What constitutes a statistically significant and/or strong correlation?</a:t>
-            </a:r>
-          </a:p>
-          <a:p>
-            <a:pPr marL="800100" lvl="1">
-              <a:buFont typeface="+mj-lt"/>
-              <a:buAutoNum type="arabicPeriod"/>
-            </a:pPr>
-            <a:r>
-              <a:rPr lang="en-US" sz="1200" dirty="0"/>
-              <a:t>What’s the size of these effects?</a:t>
-            </a:r>
-          </a:p>
         </p:txBody>
       </p:sp>
     </p:spTree>
@@ -11463,6 +11496,474 @@
           <a:chExt cx="0" cy="0"/>
         </a:xfrm>
       </p:grpSpPr>
+      <p:pic>
+        <p:nvPicPr>
+          <p:cNvPr id="5" name="Picture 4">
+            <a:extLst>
+              <a:ext uri="{FF2B5EF4-FFF2-40B4-BE49-F238E27FC236}">
+                <a16:creationId xmlns:a16="http://schemas.microsoft.com/office/drawing/2014/main" id="{075A5971-755A-DBF1-7C1F-FB8E1D6B0A63}"/>
+              </a:ext>
+            </a:extLst>
+          </p:cNvPr>
+          <p:cNvPicPr>
+            <a:picLocks noChangeAspect="1"/>
+          </p:cNvPicPr>
+          <p:nvPr/>
+        </p:nvPicPr>
+        <p:blipFill rotWithShape="1">
+          <a:blip r:embed="rId3">
+            <a:extLst>
+              <a:ext uri="{28A0092B-C50C-407E-A947-70E740481C1C}">
+                <a14:useLocalDpi xmlns:a14="http://schemas.microsoft.com/office/drawing/2010/main" val="0"/>
+              </a:ext>
+            </a:extLst>
+          </a:blip>
+          <a:srcRect l="60889" r="20889"/>
+          <a:stretch/>
+        </p:blipFill>
+        <p:spPr>
+          <a:xfrm>
+            <a:off x="102078" y="1303028"/>
+            <a:ext cx="933072" cy="3840472"/>
+          </a:xfrm>
+          <a:prstGeom prst="rect">
+            <a:avLst/>
+          </a:prstGeom>
+        </p:spPr>
+      </p:pic>
+      <p:pic>
+        <p:nvPicPr>
+          <p:cNvPr id="28" name="Picture 27">
+            <a:extLst>
+              <a:ext uri="{FF2B5EF4-FFF2-40B4-BE49-F238E27FC236}">
+                <a16:creationId xmlns:a16="http://schemas.microsoft.com/office/drawing/2014/main" id="{42CACA44-1183-CA03-B502-1C9FA57F6CA2}"/>
+              </a:ext>
+            </a:extLst>
+          </p:cNvPr>
+          <p:cNvPicPr>
+            <a:picLocks noChangeAspect="1"/>
+          </p:cNvPicPr>
+          <p:nvPr/>
+        </p:nvPicPr>
+        <p:blipFill rotWithShape="1">
+          <a:blip r:embed="rId4">
+            <a:extLst>
+              <a:ext uri="{28A0092B-C50C-407E-A947-70E740481C1C}">
+                <a14:useLocalDpi xmlns:a14="http://schemas.microsoft.com/office/drawing/2010/main" val="0"/>
+              </a:ext>
+            </a:extLst>
+          </a:blip>
+          <a:srcRect l="61331" r="20449"/>
+          <a:stretch/>
+        </p:blipFill>
+        <p:spPr>
+          <a:xfrm>
+            <a:off x="1107280" y="1304702"/>
+            <a:ext cx="933072" cy="3840472"/>
+          </a:xfrm>
+          <a:prstGeom prst="rect">
+            <a:avLst/>
+          </a:prstGeom>
+        </p:spPr>
+      </p:pic>
+      <p:pic>
+        <p:nvPicPr>
+          <p:cNvPr id="9" name="Picture 8">
+            <a:extLst>
+              <a:ext uri="{FF2B5EF4-FFF2-40B4-BE49-F238E27FC236}">
+                <a16:creationId xmlns:a16="http://schemas.microsoft.com/office/drawing/2014/main" id="{8C65F390-47AB-3688-5B73-C81A321C36CE}"/>
+              </a:ext>
+            </a:extLst>
+          </p:cNvPr>
+          <p:cNvPicPr>
+            <a:picLocks noChangeAspect="1"/>
+          </p:cNvPicPr>
+          <p:nvPr/>
+        </p:nvPicPr>
+        <p:blipFill rotWithShape="1">
+          <a:blip r:embed="rId5">
+            <a:extLst>
+              <a:ext uri="{28A0092B-C50C-407E-A947-70E740481C1C}">
+                <a14:useLocalDpi xmlns:a14="http://schemas.microsoft.com/office/drawing/2010/main" val="0"/>
+              </a:ext>
+            </a:extLst>
+          </a:blip>
+          <a:srcRect l="60739" r="642"/>
+          <a:stretch/>
+        </p:blipFill>
+        <p:spPr>
+          <a:xfrm>
+            <a:off x="2061004" y="1303028"/>
+            <a:ext cx="1977596" cy="3840472"/>
+          </a:xfrm>
+          <a:prstGeom prst="rect">
+            <a:avLst/>
+          </a:prstGeom>
+        </p:spPr>
+      </p:pic>
+      <p:sp>
+        <p:nvSpPr>
+          <p:cNvPr id="6" name="Title 5">
+            <a:extLst>
+              <a:ext uri="{FF2B5EF4-FFF2-40B4-BE49-F238E27FC236}">
+                <a16:creationId xmlns:a16="http://schemas.microsoft.com/office/drawing/2014/main" id="{30712870-2CAF-45CA-9FFD-0087F78E9339}"/>
+              </a:ext>
+            </a:extLst>
+          </p:cNvPr>
+          <p:cNvSpPr>
+            <a:spLocks noGrp="1"/>
+          </p:cNvSpPr>
+          <p:nvPr>
+            <p:ph type="title"/>
+          </p:nvPr>
+        </p:nvSpPr>
+        <p:spPr/>
+        <p:txBody>
+          <a:bodyPr>
+            <a:normAutofit/>
+          </a:bodyPr>
+          <a:lstStyle/>
+          <a:p>
+            <a:r>
+              <a:rPr lang="en-US" sz="3200" dirty="0"/>
+              <a:t>What happens if we increase cutoffs? </a:t>
+            </a:r>
+            <a:r>
+              <a:rPr lang="en-US" sz="1600" dirty="0"/>
+              <a:t>(n=6)</a:t>
+            </a:r>
+            <a:endParaRPr lang="en-US" sz="3200" dirty="0"/>
+          </a:p>
+        </p:txBody>
+      </p:sp>
+      <p:sp>
+        <p:nvSpPr>
+          <p:cNvPr id="13" name="TextBox 12">
+            <a:extLst>
+              <a:ext uri="{FF2B5EF4-FFF2-40B4-BE49-F238E27FC236}">
+                <a16:creationId xmlns:a16="http://schemas.microsoft.com/office/drawing/2014/main" id="{BEDC58A3-FD20-2CC1-CAAA-E07BF825980E}"/>
+              </a:ext>
+            </a:extLst>
+          </p:cNvPr>
+          <p:cNvSpPr txBox="1"/>
+          <p:nvPr/>
+        </p:nvSpPr>
+        <p:spPr>
+          <a:xfrm>
+            <a:off x="352160" y="1166305"/>
+            <a:ext cx="470000" cy="338554"/>
+          </a:xfrm>
+          <a:prstGeom prst="rect">
+            <a:avLst/>
+          </a:prstGeom>
+          <a:noFill/>
+        </p:spPr>
+        <p:txBody>
+          <a:bodyPr wrap="none" rtlCol="0">
+            <a:spAutoFit/>
+          </a:bodyPr>
+          <a:lstStyle/>
+          <a:p>
+            <a:r>
+              <a:rPr lang="en-US" sz="1600" dirty="0"/>
+              <a:t>0.4</a:t>
+            </a:r>
+          </a:p>
+        </p:txBody>
+      </p:sp>
+      <p:sp>
+        <p:nvSpPr>
+          <p:cNvPr id="14" name="TextBox 13">
+            <a:extLst>
+              <a:ext uri="{FF2B5EF4-FFF2-40B4-BE49-F238E27FC236}">
+                <a16:creationId xmlns:a16="http://schemas.microsoft.com/office/drawing/2014/main" id="{306CCF9F-4281-6178-874A-B7B61D3058A3}"/>
+              </a:ext>
+            </a:extLst>
+          </p:cNvPr>
+          <p:cNvSpPr txBox="1"/>
+          <p:nvPr/>
+        </p:nvSpPr>
+        <p:spPr>
+          <a:xfrm>
+            <a:off x="1405075" y="1166305"/>
+            <a:ext cx="583814" cy="338554"/>
+          </a:xfrm>
+          <a:prstGeom prst="rect">
+            <a:avLst/>
+          </a:prstGeom>
+          <a:noFill/>
+        </p:spPr>
+        <p:txBody>
+          <a:bodyPr wrap="none" rtlCol="0">
+            <a:spAutoFit/>
+          </a:bodyPr>
+          <a:lstStyle/>
+          <a:p>
+            <a:r>
+              <a:rPr lang="en-US" sz="1600" dirty="0"/>
+              <a:t>0.45</a:t>
+            </a:r>
+          </a:p>
+        </p:txBody>
+      </p:sp>
+      <p:sp>
+        <p:nvSpPr>
+          <p:cNvPr id="3" name="TextBox 2">
+            <a:extLst>
+              <a:ext uri="{FF2B5EF4-FFF2-40B4-BE49-F238E27FC236}">
+                <a16:creationId xmlns:a16="http://schemas.microsoft.com/office/drawing/2014/main" id="{7097511F-2B66-4EE8-CA25-483CF9A778DB}"/>
+              </a:ext>
+            </a:extLst>
+          </p:cNvPr>
+          <p:cNvSpPr txBox="1"/>
+          <p:nvPr/>
+        </p:nvSpPr>
+        <p:spPr>
+          <a:xfrm>
+            <a:off x="2465645" y="1178210"/>
+            <a:ext cx="470000" cy="338554"/>
+          </a:xfrm>
+          <a:prstGeom prst="rect">
+            <a:avLst/>
+          </a:prstGeom>
+          <a:noFill/>
+        </p:spPr>
+        <p:txBody>
+          <a:bodyPr wrap="none" rtlCol="0">
+            <a:spAutoFit/>
+          </a:bodyPr>
+          <a:lstStyle/>
+          <a:p>
+            <a:r>
+              <a:rPr lang="en-US" sz="1600" dirty="0"/>
+              <a:t>0.5</a:t>
+            </a:r>
+          </a:p>
+        </p:txBody>
+      </p:sp>
+      <p:sp>
+        <p:nvSpPr>
+          <p:cNvPr id="4" name="Content Placeholder 3">
+            <a:extLst>
+              <a:ext uri="{FF2B5EF4-FFF2-40B4-BE49-F238E27FC236}">
+                <a16:creationId xmlns:a16="http://schemas.microsoft.com/office/drawing/2014/main" id="{A9129292-4383-1447-6B58-3BB690650C2C}"/>
+              </a:ext>
+            </a:extLst>
+          </p:cNvPr>
+          <p:cNvSpPr>
+            <a:spLocks noGrp="1"/>
+          </p:cNvSpPr>
+          <p:nvPr>
+            <p:ph sz="half" idx="2"/>
+          </p:nvPr>
+        </p:nvSpPr>
+        <p:spPr>
+          <a:xfrm>
+            <a:off x="4038600" y="1295400"/>
+            <a:ext cx="4648200" cy="3562350"/>
+          </a:xfrm>
+        </p:spPr>
+        <p:txBody>
+          <a:bodyPr>
+            <a:normAutofit/>
+          </a:bodyPr>
+          <a:lstStyle/>
+          <a:p>
+            <a:r>
+              <a:rPr lang="en-US" sz="1800" dirty="0"/>
+              <a:t>Decrease of items loading on factors</a:t>
+            </a:r>
+          </a:p>
+          <a:p>
+            <a:r>
+              <a:rPr lang="en-US" sz="1800" dirty="0"/>
+              <a:t>No more items loading onto multiple factors (item 9)</a:t>
+            </a:r>
+          </a:p>
+          <a:p>
+            <a:r>
+              <a:rPr lang="en-US" sz="1800" dirty="0"/>
+              <a:t>CFI increases: 0.893 -&gt; 0.952</a:t>
+            </a:r>
+          </a:p>
+          <a:p>
+            <a:r>
+              <a:rPr lang="en-US" sz="1800" dirty="0"/>
+              <a:t>AIC picture is more difficult to determine</a:t>
+            </a:r>
+          </a:p>
+        </p:txBody>
+      </p:sp>
+      <p:pic>
+        <p:nvPicPr>
+          <p:cNvPr id="10" name="Picture 9">
+            <a:extLst>
+              <a:ext uri="{FF2B5EF4-FFF2-40B4-BE49-F238E27FC236}">
+                <a16:creationId xmlns:a16="http://schemas.microsoft.com/office/drawing/2014/main" id="{2DED35CB-7426-BE23-B0CC-3AFEB942B226}"/>
+              </a:ext>
+            </a:extLst>
+          </p:cNvPr>
+          <p:cNvPicPr>
+            <a:picLocks noChangeAspect="1"/>
+          </p:cNvPicPr>
+          <p:nvPr/>
+        </p:nvPicPr>
+        <p:blipFill>
+          <a:blip r:embed="rId6" cstate="print">
+            <a:extLst>
+              <a:ext uri="{28A0092B-C50C-407E-A947-70E740481C1C}">
+                <a14:useLocalDpi xmlns:a14="http://schemas.microsoft.com/office/drawing/2010/main" val="0"/>
+              </a:ext>
+            </a:extLst>
+          </a:blip>
+          <a:srcRect/>
+          <a:stretch/>
+        </p:blipFill>
+        <p:spPr>
+          <a:xfrm>
+            <a:off x="4267200" y="3124201"/>
+            <a:ext cx="2311399" cy="1733549"/>
+          </a:xfrm>
+          <a:prstGeom prst="rect">
+            <a:avLst/>
+          </a:prstGeom>
+        </p:spPr>
+      </p:pic>
+      <p:pic>
+        <p:nvPicPr>
+          <p:cNvPr id="11" name="Picture 10">
+            <a:extLst>
+              <a:ext uri="{FF2B5EF4-FFF2-40B4-BE49-F238E27FC236}">
+                <a16:creationId xmlns:a16="http://schemas.microsoft.com/office/drawing/2014/main" id="{C4F4AE02-F11E-C280-465A-785154F9AA29}"/>
+              </a:ext>
+            </a:extLst>
+          </p:cNvPr>
+          <p:cNvPicPr>
+            <a:picLocks noChangeAspect="1"/>
+          </p:cNvPicPr>
+          <p:nvPr/>
+        </p:nvPicPr>
+        <p:blipFill>
+          <a:blip r:embed="rId7" cstate="print">
+            <a:extLst>
+              <a:ext uri="{28A0092B-C50C-407E-A947-70E740481C1C}">
+                <a14:useLocalDpi xmlns:a14="http://schemas.microsoft.com/office/drawing/2010/main" val="0"/>
+              </a:ext>
+            </a:extLst>
+          </a:blip>
+          <a:srcRect/>
+          <a:stretch/>
+        </p:blipFill>
+        <p:spPr>
+          <a:xfrm>
+            <a:off x="6575886" y="3124201"/>
+            <a:ext cx="2311398" cy="1733549"/>
+          </a:xfrm>
+          <a:prstGeom prst="rect">
+            <a:avLst/>
+          </a:prstGeom>
+        </p:spPr>
+      </p:pic>
+      <p:sp>
+        <p:nvSpPr>
+          <p:cNvPr id="12" name="TextBox 11">
+            <a:extLst>
+              <a:ext uri="{FF2B5EF4-FFF2-40B4-BE49-F238E27FC236}">
+                <a16:creationId xmlns:a16="http://schemas.microsoft.com/office/drawing/2014/main" id="{20587861-14D5-6121-0FCF-C2B191F7AB9A}"/>
+              </a:ext>
+            </a:extLst>
+          </p:cNvPr>
+          <p:cNvSpPr txBox="1"/>
+          <p:nvPr/>
+        </p:nvSpPr>
+        <p:spPr>
+          <a:xfrm>
+            <a:off x="7496585" y="2907298"/>
+            <a:ext cx="470000" cy="338554"/>
+          </a:xfrm>
+          <a:prstGeom prst="rect">
+            <a:avLst/>
+          </a:prstGeom>
+          <a:noFill/>
+        </p:spPr>
+        <p:txBody>
+          <a:bodyPr wrap="none" rtlCol="0">
+            <a:spAutoFit/>
+          </a:bodyPr>
+          <a:lstStyle/>
+          <a:p>
+            <a:r>
+              <a:rPr lang="en-US" sz="1600" dirty="0"/>
+              <a:t>0.5</a:t>
+            </a:r>
+          </a:p>
+        </p:txBody>
+      </p:sp>
+      <p:sp>
+        <p:nvSpPr>
+          <p:cNvPr id="15" name="TextBox 14">
+            <a:extLst>
+              <a:ext uri="{FF2B5EF4-FFF2-40B4-BE49-F238E27FC236}">
+                <a16:creationId xmlns:a16="http://schemas.microsoft.com/office/drawing/2014/main" id="{F8A53186-B0CB-5FB5-2337-4E4B0B481537}"/>
+              </a:ext>
+            </a:extLst>
+          </p:cNvPr>
+          <p:cNvSpPr txBox="1"/>
+          <p:nvPr/>
+        </p:nvSpPr>
+        <p:spPr>
+          <a:xfrm>
+            <a:off x="5187900" y="2911370"/>
+            <a:ext cx="470000" cy="338554"/>
+          </a:xfrm>
+          <a:prstGeom prst="rect">
+            <a:avLst/>
+          </a:prstGeom>
+          <a:noFill/>
+        </p:spPr>
+        <p:txBody>
+          <a:bodyPr wrap="none" rtlCol="0">
+            <a:spAutoFit/>
+          </a:bodyPr>
+          <a:lstStyle/>
+          <a:p>
+            <a:r>
+              <a:rPr lang="en-US" sz="1600" dirty="0"/>
+              <a:t>0.4</a:t>
+            </a:r>
+          </a:p>
+        </p:txBody>
+      </p:sp>
+    </p:spTree>
+    <p:extLst>
+      <p:ext uri="{BB962C8B-B14F-4D97-AF65-F5344CB8AC3E}">
+        <p14:creationId xmlns:p14="http://schemas.microsoft.com/office/powerpoint/2010/main" val="1028969492"/>
+      </p:ext>
+    </p:extLst>
+  </p:cSld>
+  <p:clrMapOvr>
+    <a:masterClrMapping/>
+  </p:clrMapOvr>
+</p:sld>
+</file>
+
+<file path=ppt/slides/slide19.xml><?xml version="1.0" encoding="utf-8"?>
+<p:sld xmlns:a="http://schemas.openxmlformats.org/drawingml/2006/main" xmlns:r="http://schemas.openxmlformats.org/officeDocument/2006/relationships" xmlns:p="http://schemas.openxmlformats.org/presentationml/2006/main">
+  <p:cSld>
+    <p:spTree>
+      <p:nvGrpSpPr>
+        <p:cNvPr id="1" name=""/>
+        <p:cNvGrpSpPr/>
+        <p:nvPr/>
+      </p:nvGrpSpPr>
+      <p:grpSpPr>
+        <a:xfrm>
+          <a:off x="0" y="0"/>
+          <a:ext cx="0" cy="0"/>
+          <a:chOff x="0" y="0"/>
+          <a:chExt cx="0" cy="0"/>
+        </a:xfrm>
+      </p:grpSpPr>
       <p:sp>
         <p:nvSpPr>
           <p:cNvPr id="6" name="Title 5">
@@ -11639,7 +12140,156 @@
 </p:sld>
 </file>
 
-<file path=ppt/slides/slide19.xml><?xml version="1.0" encoding="utf-8"?>
+<file path=ppt/slides/slide2.xml><?xml version="1.0" encoding="utf-8"?>
+<p:sld xmlns:a="http://schemas.openxmlformats.org/drawingml/2006/main" xmlns:r="http://schemas.openxmlformats.org/officeDocument/2006/relationships" xmlns:p="http://schemas.openxmlformats.org/presentationml/2006/main">
+  <p:cSld>
+    <p:spTree>
+      <p:nvGrpSpPr>
+        <p:cNvPr id="1" name=""/>
+        <p:cNvGrpSpPr/>
+        <p:nvPr/>
+      </p:nvGrpSpPr>
+      <p:grpSpPr>
+        <a:xfrm>
+          <a:off x="0" y="0"/>
+          <a:ext cx="0" cy="0"/>
+          <a:chOff x="0" y="0"/>
+          <a:chExt cx="0" cy="0"/>
+        </a:xfrm>
+      </p:grpSpPr>
+      <p:sp>
+        <p:nvSpPr>
+          <p:cNvPr id="2" name="Title 1">
+            <a:extLst>
+              <a:ext uri="{FF2B5EF4-FFF2-40B4-BE49-F238E27FC236}">
+                <a16:creationId xmlns:a16="http://schemas.microsoft.com/office/drawing/2014/main" id="{EE942BA3-1274-4ACF-B493-D83026640C8D}"/>
+              </a:ext>
+            </a:extLst>
+          </p:cNvPr>
+          <p:cNvSpPr>
+            <a:spLocks noGrp="1"/>
+          </p:cNvSpPr>
+          <p:nvPr>
+            <p:ph type="title"/>
+          </p:nvPr>
+        </p:nvSpPr>
+        <p:spPr/>
+        <p:txBody>
+          <a:bodyPr>
+            <a:normAutofit/>
+          </a:bodyPr>
+          <a:lstStyle/>
+          <a:p>
+            <a:r>
+              <a:rPr lang="en-US" sz="3200" dirty="0"/>
+              <a:t>SAGE Survey validation</a:t>
+            </a:r>
+          </a:p>
+        </p:txBody>
+      </p:sp>
+      <p:sp>
+        <p:nvSpPr>
+          <p:cNvPr id="3" name="Content Placeholder 2">
+            <a:extLst>
+              <a:ext uri="{FF2B5EF4-FFF2-40B4-BE49-F238E27FC236}">
+                <a16:creationId xmlns:a16="http://schemas.microsoft.com/office/drawing/2014/main" id="{4BE01A12-C067-4E9B-B10F-7D7A6A0EA2D9}"/>
+              </a:ext>
+            </a:extLst>
+          </p:cNvPr>
+          <p:cNvSpPr>
+            <a:spLocks noGrp="1"/>
+          </p:cNvSpPr>
+          <p:nvPr>
+            <p:ph idx="1"/>
+          </p:nvPr>
+        </p:nvSpPr>
+        <p:spPr/>
+        <p:txBody>
+          <a:bodyPr>
+            <a:normAutofit fontScale="70000" lnSpcReduction="20000"/>
+          </a:bodyPr>
+          <a:lstStyle/>
+          <a:p>
+            <a:r>
+              <a:rPr lang="en-US" sz="2800" dirty="0"/>
+              <a:t>One of the “issues” we had with the SAGE survey was whether the tool would work well to measure the intended traits:</a:t>
+            </a:r>
+          </a:p>
+          <a:p>
+            <a:pPr lvl="1"/>
+            <a:r>
+              <a:rPr lang="en-US" sz="2400" dirty="0"/>
+              <a:t>Group effectiveness</a:t>
+            </a:r>
+          </a:p>
+          <a:p>
+            <a:pPr lvl="1"/>
+            <a:r>
+              <a:rPr lang="en-US" sz="2400" dirty="0"/>
+              <a:t>Equity and fairness of group work</a:t>
+            </a:r>
+          </a:p>
+          <a:p>
+            <a:pPr lvl="1"/>
+            <a:r>
+              <a:rPr lang="en-US" sz="2400" dirty="0"/>
+              <a:t>Sense of belonging</a:t>
+            </a:r>
+          </a:p>
+          <a:p>
+            <a:pPr lvl="1"/>
+            <a:r>
+              <a:rPr lang="en-US" sz="2400" dirty="0"/>
+              <a:t>Social, psychological and other benefits</a:t>
+            </a:r>
+          </a:p>
+          <a:p>
+            <a:r>
+              <a:rPr lang="en-US" sz="2800" dirty="0"/>
+              <a:t>Reduced their 54-item questionnaire down to ~20</a:t>
+            </a:r>
+          </a:p>
+          <a:p>
+            <a:r>
+              <a:rPr lang="en-US" sz="2800" dirty="0"/>
+              <a:t>Different populations (high school vs college)</a:t>
+            </a:r>
+          </a:p>
+          <a:p>
+            <a:endParaRPr lang="en-US" sz="2800" dirty="0"/>
+          </a:p>
+          <a:p>
+            <a:r>
+              <a:rPr lang="en-US" sz="2800" dirty="0"/>
+              <a:t>Need to validate the survey</a:t>
+            </a:r>
+          </a:p>
+          <a:p>
+            <a:pPr lvl="1"/>
+            <a:r>
+              <a:rPr lang="en-US" sz="2400" dirty="0"/>
+              <a:t>Does the survey measure the intended factors, and is it reliable?</a:t>
+            </a:r>
+          </a:p>
+          <a:p>
+            <a:endParaRPr lang="en-US" sz="2800" dirty="0"/>
+          </a:p>
+        </p:txBody>
+      </p:sp>
+    </p:spTree>
+    <p:extLst>
+      <p:ext uri="{BB962C8B-B14F-4D97-AF65-F5344CB8AC3E}">
+        <p14:creationId xmlns:p14="http://schemas.microsoft.com/office/powerpoint/2010/main" val="3752492781"/>
+      </p:ext>
+    </p:extLst>
+  </p:cSld>
+  <p:clrMapOvr>
+    <a:masterClrMapping/>
+  </p:clrMapOvr>
+</p:sld>
+</file>
+
+<file path=ppt/slides/slide20.xml><?xml version="1.0" encoding="utf-8"?>
 <p:sld xmlns:a="http://schemas.openxmlformats.org/drawingml/2006/main" xmlns:r="http://schemas.openxmlformats.org/officeDocument/2006/relationships" xmlns:p="http://schemas.openxmlformats.org/presentationml/2006/main">
   <p:cSld>
     <p:spTree>
@@ -11768,156 +12418,7 @@
 </p:sld>
 </file>
 
-<file path=ppt/slides/slide2.xml><?xml version="1.0" encoding="utf-8"?>
-<p:sld xmlns:a="http://schemas.openxmlformats.org/drawingml/2006/main" xmlns:r="http://schemas.openxmlformats.org/officeDocument/2006/relationships" xmlns:p="http://schemas.openxmlformats.org/presentationml/2006/main">
-  <p:cSld>
-    <p:spTree>
-      <p:nvGrpSpPr>
-        <p:cNvPr id="1" name=""/>
-        <p:cNvGrpSpPr/>
-        <p:nvPr/>
-      </p:nvGrpSpPr>
-      <p:grpSpPr>
-        <a:xfrm>
-          <a:off x="0" y="0"/>
-          <a:ext cx="0" cy="0"/>
-          <a:chOff x="0" y="0"/>
-          <a:chExt cx="0" cy="0"/>
-        </a:xfrm>
-      </p:grpSpPr>
-      <p:sp>
-        <p:nvSpPr>
-          <p:cNvPr id="2" name="Title 1">
-            <a:extLst>
-              <a:ext uri="{FF2B5EF4-FFF2-40B4-BE49-F238E27FC236}">
-                <a16:creationId xmlns:a16="http://schemas.microsoft.com/office/drawing/2014/main" id="{EE942BA3-1274-4ACF-B493-D83026640C8D}"/>
-              </a:ext>
-            </a:extLst>
-          </p:cNvPr>
-          <p:cNvSpPr>
-            <a:spLocks noGrp="1"/>
-          </p:cNvSpPr>
-          <p:nvPr>
-            <p:ph type="title"/>
-          </p:nvPr>
-        </p:nvSpPr>
-        <p:spPr/>
-        <p:txBody>
-          <a:bodyPr>
-            <a:normAutofit/>
-          </a:bodyPr>
-          <a:lstStyle/>
-          <a:p>
-            <a:r>
-              <a:rPr lang="en-US" sz="3200" dirty="0"/>
-              <a:t>SAGE Survey validation</a:t>
-            </a:r>
-          </a:p>
-        </p:txBody>
-      </p:sp>
-      <p:sp>
-        <p:nvSpPr>
-          <p:cNvPr id="3" name="Content Placeholder 2">
-            <a:extLst>
-              <a:ext uri="{FF2B5EF4-FFF2-40B4-BE49-F238E27FC236}">
-                <a16:creationId xmlns:a16="http://schemas.microsoft.com/office/drawing/2014/main" id="{4BE01A12-C067-4E9B-B10F-7D7A6A0EA2D9}"/>
-              </a:ext>
-            </a:extLst>
-          </p:cNvPr>
-          <p:cNvSpPr>
-            <a:spLocks noGrp="1"/>
-          </p:cNvSpPr>
-          <p:nvPr>
-            <p:ph idx="1"/>
-          </p:nvPr>
-        </p:nvSpPr>
-        <p:spPr/>
-        <p:txBody>
-          <a:bodyPr>
-            <a:normAutofit fontScale="70000" lnSpcReduction="20000"/>
-          </a:bodyPr>
-          <a:lstStyle/>
-          <a:p>
-            <a:r>
-              <a:rPr lang="en-US" sz="2800" dirty="0"/>
-              <a:t>One of the “issues” we had with the SAGE survey was whether the tool would work well to measure the intended traits:</a:t>
-            </a:r>
-          </a:p>
-          <a:p>
-            <a:pPr lvl="1"/>
-            <a:r>
-              <a:rPr lang="en-US" sz="2400" dirty="0"/>
-              <a:t>Group effectiveness</a:t>
-            </a:r>
-          </a:p>
-          <a:p>
-            <a:pPr lvl="1"/>
-            <a:r>
-              <a:rPr lang="en-US" sz="2400" dirty="0"/>
-              <a:t>Equity and fairness of group work</a:t>
-            </a:r>
-          </a:p>
-          <a:p>
-            <a:pPr lvl="1"/>
-            <a:r>
-              <a:rPr lang="en-US" sz="2400" dirty="0"/>
-              <a:t>Sense of belonging</a:t>
-            </a:r>
-          </a:p>
-          <a:p>
-            <a:pPr lvl="1"/>
-            <a:r>
-              <a:rPr lang="en-US" sz="2400" dirty="0"/>
-              <a:t>Social, psychological and other benefits</a:t>
-            </a:r>
-          </a:p>
-          <a:p>
-            <a:r>
-              <a:rPr lang="en-US" sz="2800" dirty="0"/>
-              <a:t>Reduced their 54-item questionnaire down to ~20</a:t>
-            </a:r>
-          </a:p>
-          <a:p>
-            <a:r>
-              <a:rPr lang="en-US" sz="2800" dirty="0"/>
-              <a:t>Different populations (high school vs college)</a:t>
-            </a:r>
-          </a:p>
-          <a:p>
-            <a:endParaRPr lang="en-US" sz="2800" dirty="0"/>
-          </a:p>
-          <a:p>
-            <a:r>
-              <a:rPr lang="en-US" sz="2800" dirty="0"/>
-              <a:t>Need to validate the survey</a:t>
-            </a:r>
-          </a:p>
-          <a:p>
-            <a:pPr lvl="1"/>
-            <a:r>
-              <a:rPr lang="en-US" sz="2400" dirty="0"/>
-              <a:t>Does the survey measure the intended factors, and is it reliable?</a:t>
-            </a:r>
-          </a:p>
-          <a:p>
-            <a:endParaRPr lang="en-US" sz="2800" dirty="0"/>
-          </a:p>
-        </p:txBody>
-      </p:sp>
-    </p:spTree>
-    <p:extLst>
-      <p:ext uri="{BB962C8B-B14F-4D97-AF65-F5344CB8AC3E}">
-        <p14:creationId xmlns:p14="http://schemas.microsoft.com/office/powerpoint/2010/main" val="3752492781"/>
-      </p:ext>
-    </p:extLst>
-  </p:cSld>
-  <p:clrMapOvr>
-    <a:masterClrMapping/>
-  </p:clrMapOvr>
-</p:sld>
-</file>
-
-<file path=ppt/slides/slide20.xml><?xml version="1.0" encoding="utf-8"?>
+<file path=ppt/slides/slide21.xml><?xml version="1.0" encoding="utf-8"?>
 <p:sld xmlns:a="http://schemas.openxmlformats.org/drawingml/2006/main" xmlns:r="http://schemas.openxmlformats.org/officeDocument/2006/relationships" xmlns:p="http://schemas.openxmlformats.org/presentationml/2006/main">
   <p:cSld>
     <p:spTree>
@@ -12081,70 +12582,6 @@
 </p:sld>
 </file>
 
-<file path=ppt/slides/slide21.xml><?xml version="1.0" encoding="utf-8"?>
-<p:sld xmlns:a="http://schemas.openxmlformats.org/drawingml/2006/main" xmlns:r="http://schemas.openxmlformats.org/officeDocument/2006/relationships" xmlns:p="http://schemas.openxmlformats.org/presentationml/2006/main">
-  <p:cSld>
-    <p:spTree>
-      <p:nvGrpSpPr>
-        <p:cNvPr id="1" name=""/>
-        <p:cNvGrpSpPr/>
-        <p:nvPr/>
-      </p:nvGrpSpPr>
-      <p:grpSpPr>
-        <a:xfrm>
-          <a:off x="0" y="0"/>
-          <a:ext cx="0" cy="0"/>
-          <a:chOff x="0" y="0"/>
-          <a:chExt cx="0" cy="0"/>
-        </a:xfrm>
-      </p:grpSpPr>
-      <p:pic>
-        <p:nvPicPr>
-          <p:cNvPr id="5" name="Content Placeholder 4">
-            <a:extLst>
-              <a:ext uri="{FF2B5EF4-FFF2-40B4-BE49-F238E27FC236}">
-                <a16:creationId xmlns:a16="http://schemas.microsoft.com/office/drawing/2014/main" id="{F93C01CE-B673-464C-962B-8D5EF2F346BB}"/>
-              </a:ext>
-            </a:extLst>
-          </p:cNvPr>
-          <p:cNvPicPr>
-            <a:picLocks noGrp="1" noChangeAspect="1"/>
-          </p:cNvPicPr>
-          <p:nvPr>
-            <p:ph sz="half" idx="1"/>
-          </p:nvPr>
-        </p:nvPicPr>
-        <p:blipFill>
-          <a:blip r:embed="rId3">
-            <a:extLst>
-              <a:ext uri="{28A0092B-C50C-407E-A947-70E740481C1C}">
-                <a14:useLocalDpi xmlns:a14="http://schemas.microsoft.com/office/drawing/2010/main" val="0"/>
-              </a:ext>
-            </a:extLst>
-          </a:blip>
-          <a:srcRect/>
-          <a:stretch/>
-        </p:blipFill>
-        <p:spPr>
-          <a:xfrm>
-            <a:off x="914400" y="514350"/>
-            <a:ext cx="7315200" cy="4529535"/>
-          </a:xfrm>
-        </p:spPr>
-      </p:pic>
-    </p:spTree>
-    <p:extLst>
-      <p:ext uri="{BB962C8B-B14F-4D97-AF65-F5344CB8AC3E}">
-        <p14:creationId xmlns:p14="http://schemas.microsoft.com/office/powerpoint/2010/main" val="256414971"/>
-      </p:ext>
-    </p:extLst>
-  </p:cSld>
-  <p:clrMapOvr>
-    <a:masterClrMapping/>
-  </p:clrMapOvr>
-</p:sld>
-</file>
-
 <file path=ppt/slides/slide22.xml><?xml version="1.0" encoding="utf-8"?>
 <p:sld xmlns:a="http://schemas.openxmlformats.org/drawingml/2006/main" xmlns:r="http://schemas.openxmlformats.org/officeDocument/2006/relationships" xmlns:p="http://schemas.openxmlformats.org/presentationml/2006/main">
   <p:cSld>
@@ -12191,15 +12628,15 @@
         </p:blipFill>
         <p:spPr>
           <a:xfrm>
-            <a:off x="838200" y="466725"/>
-            <a:ext cx="7467600" cy="4667250"/>
+            <a:off x="914400" y="514350"/>
+            <a:ext cx="7315200" cy="4529535"/>
           </a:xfrm>
         </p:spPr>
       </p:pic>
     </p:spTree>
     <p:extLst>
       <p:ext uri="{BB962C8B-B14F-4D97-AF65-F5344CB8AC3E}">
-        <p14:creationId xmlns:p14="http://schemas.microsoft.com/office/powerpoint/2010/main" val="2423193204"/>
+        <p14:creationId xmlns:p14="http://schemas.microsoft.com/office/powerpoint/2010/main" val="256414971"/>
       </p:ext>
     </p:extLst>
   </p:cSld>
@@ -12255,15 +12692,15 @@
         </p:blipFill>
         <p:spPr>
           <a:xfrm>
-            <a:off x="723805" y="548642"/>
-            <a:ext cx="7696390" cy="4594858"/>
+            <a:off x="838200" y="466725"/>
+            <a:ext cx="7467600" cy="4667250"/>
           </a:xfrm>
         </p:spPr>
       </p:pic>
     </p:spTree>
     <p:extLst>
       <p:ext uri="{BB962C8B-B14F-4D97-AF65-F5344CB8AC3E}">
-        <p14:creationId xmlns:p14="http://schemas.microsoft.com/office/powerpoint/2010/main" val="3403485851"/>
+        <p14:creationId xmlns:p14="http://schemas.microsoft.com/office/powerpoint/2010/main" val="2423193204"/>
       </p:ext>
     </p:extLst>
   </p:cSld>
@@ -12319,6 +12756,70 @@
         </p:blipFill>
         <p:spPr>
           <a:xfrm>
+            <a:off x="723805" y="548642"/>
+            <a:ext cx="7696390" cy="4594858"/>
+          </a:xfrm>
+        </p:spPr>
+      </p:pic>
+    </p:spTree>
+    <p:extLst>
+      <p:ext uri="{BB962C8B-B14F-4D97-AF65-F5344CB8AC3E}">
+        <p14:creationId xmlns:p14="http://schemas.microsoft.com/office/powerpoint/2010/main" val="3403485851"/>
+      </p:ext>
+    </p:extLst>
+  </p:cSld>
+  <p:clrMapOvr>
+    <a:masterClrMapping/>
+  </p:clrMapOvr>
+</p:sld>
+</file>
+
+<file path=ppt/slides/slide25.xml><?xml version="1.0" encoding="utf-8"?>
+<p:sld xmlns:a="http://schemas.openxmlformats.org/drawingml/2006/main" xmlns:r="http://schemas.openxmlformats.org/officeDocument/2006/relationships" xmlns:p="http://schemas.openxmlformats.org/presentationml/2006/main">
+  <p:cSld>
+    <p:spTree>
+      <p:nvGrpSpPr>
+        <p:cNvPr id="1" name=""/>
+        <p:cNvGrpSpPr/>
+        <p:nvPr/>
+      </p:nvGrpSpPr>
+      <p:grpSpPr>
+        <a:xfrm>
+          <a:off x="0" y="0"/>
+          <a:ext cx="0" cy="0"/>
+          <a:chOff x="0" y="0"/>
+          <a:chExt cx="0" cy="0"/>
+        </a:xfrm>
+      </p:grpSpPr>
+      <p:pic>
+        <p:nvPicPr>
+          <p:cNvPr id="5" name="Content Placeholder 4">
+            <a:extLst>
+              <a:ext uri="{FF2B5EF4-FFF2-40B4-BE49-F238E27FC236}">
+                <a16:creationId xmlns:a16="http://schemas.microsoft.com/office/drawing/2014/main" id="{F93C01CE-B673-464C-962B-8D5EF2F346BB}"/>
+              </a:ext>
+            </a:extLst>
+          </p:cNvPr>
+          <p:cNvPicPr>
+            <a:picLocks noGrp="1" noChangeAspect="1"/>
+          </p:cNvPicPr>
+          <p:nvPr>
+            <p:ph sz="half" idx="1"/>
+          </p:nvPr>
+        </p:nvPicPr>
+        <p:blipFill>
+          <a:blip r:embed="rId3">
+            <a:extLst>
+              <a:ext uri="{28A0092B-C50C-407E-A947-70E740481C1C}">
+                <a14:useLocalDpi xmlns:a14="http://schemas.microsoft.com/office/drawing/2010/main" val="0"/>
+              </a:ext>
+            </a:extLst>
+          </a:blip>
+          <a:srcRect/>
+          <a:stretch/>
+        </p:blipFill>
+        <p:spPr>
+          <a:xfrm>
             <a:off x="800100" y="438150"/>
             <a:ext cx="7543800" cy="4648059"/>
           </a:xfrm>
@@ -12337,7 +12838,7 @@
 </p:sld>
 </file>
 
-<file path=ppt/slides/slide25.xml><?xml version="1.0" encoding="utf-8"?>
+<file path=ppt/slides/slide26.xml><?xml version="1.0" encoding="utf-8"?>
 <p:sld xmlns:a="http://schemas.openxmlformats.org/drawingml/2006/main" xmlns:r="http://schemas.openxmlformats.org/officeDocument/2006/relationships" xmlns:p="http://schemas.openxmlformats.org/presentationml/2006/main">
   <p:cSld>
     <p:spTree>
@@ -12427,7 +12928,7 @@
 </p:sld>
 </file>
 
-<file path=ppt/slides/slide26.xml><?xml version="1.0" encoding="utf-8"?>
+<file path=ppt/slides/slide27.xml><?xml version="1.0" encoding="utf-8"?>
 <p:sld xmlns:a="http://schemas.openxmlformats.org/drawingml/2006/main" xmlns:r="http://schemas.openxmlformats.org/officeDocument/2006/relationships" xmlns:p="http://schemas.openxmlformats.org/presentationml/2006/main">
   <p:cSld>
     <p:spTree>
@@ -12517,7 +13018,7 @@
 </p:sld>
 </file>
 
-<file path=ppt/slides/slide27.xml><?xml version="1.0" encoding="utf-8"?>
+<file path=ppt/slides/slide28.xml><?xml version="1.0" encoding="utf-8"?>
 <p:sld xmlns:a="http://schemas.openxmlformats.org/drawingml/2006/main" xmlns:r="http://schemas.openxmlformats.org/officeDocument/2006/relationships" xmlns:p="http://schemas.openxmlformats.org/presentationml/2006/main">
   <p:cSld>
     <p:spTree>
@@ -12607,7 +13108,7 @@
 </p:sld>
 </file>
 
-<file path=ppt/slides/slide28.xml><?xml version="1.0" encoding="utf-8"?>
+<file path=ppt/slides/slide29.xml><?xml version="1.0" encoding="utf-8"?>
 <p:sld xmlns:a="http://schemas.openxmlformats.org/drawingml/2006/main" xmlns:r="http://schemas.openxmlformats.org/officeDocument/2006/relationships" xmlns:p="http://schemas.openxmlformats.org/presentationml/2006/main">
   <p:cSld>
     <p:spTree>
@@ -12697,7 +13198,205 @@
 </p:sld>
 </file>
 
-<file path=ppt/slides/slide29.xml><?xml version="1.0" encoding="utf-8"?>
+<file path=ppt/slides/slide3.xml><?xml version="1.0" encoding="utf-8"?>
+<p:sld xmlns:a="http://schemas.openxmlformats.org/drawingml/2006/main" xmlns:r="http://schemas.openxmlformats.org/officeDocument/2006/relationships" xmlns:p="http://schemas.openxmlformats.org/presentationml/2006/main">
+  <p:cSld>
+    <p:spTree>
+      <p:nvGrpSpPr>
+        <p:cNvPr id="1" name=""/>
+        <p:cNvGrpSpPr/>
+        <p:nvPr/>
+      </p:nvGrpSpPr>
+      <p:grpSpPr>
+        <a:xfrm>
+          <a:off x="0" y="0"/>
+          <a:ext cx="0" cy="0"/>
+          <a:chOff x="0" y="0"/>
+          <a:chExt cx="0" cy="0"/>
+        </a:xfrm>
+      </p:grpSpPr>
+      <p:sp>
+        <p:nvSpPr>
+          <p:cNvPr id="6" name="Title 5">
+            <a:extLst>
+              <a:ext uri="{FF2B5EF4-FFF2-40B4-BE49-F238E27FC236}">
+                <a16:creationId xmlns:a16="http://schemas.microsoft.com/office/drawing/2014/main" id="{30712870-2CAF-45CA-9FFD-0087F78E9339}"/>
+              </a:ext>
+            </a:extLst>
+          </p:cNvPr>
+          <p:cNvSpPr>
+            <a:spLocks noGrp="1"/>
+          </p:cNvSpPr>
+          <p:nvPr>
+            <p:ph type="title"/>
+          </p:nvPr>
+        </p:nvSpPr>
+        <p:spPr/>
+        <p:txBody>
+          <a:bodyPr>
+            <a:normAutofit/>
+          </a:bodyPr>
+          <a:lstStyle/>
+          <a:p>
+            <a:r>
+              <a:rPr lang="en-US" sz="3200" dirty="0"/>
+              <a:t>Confirmatory Factor Analysis</a:t>
+            </a:r>
+          </a:p>
+        </p:txBody>
+      </p:sp>
+      <p:sp>
+        <p:nvSpPr>
+          <p:cNvPr id="7" name="Content Placeholder 6">
+            <a:extLst>
+              <a:ext uri="{FF2B5EF4-FFF2-40B4-BE49-F238E27FC236}">
+                <a16:creationId xmlns:a16="http://schemas.microsoft.com/office/drawing/2014/main" id="{9114D3AD-6DF6-4C88-942E-9CAEC7F33550}"/>
+              </a:ext>
+            </a:extLst>
+          </p:cNvPr>
+          <p:cNvSpPr>
+            <a:spLocks noGrp="1"/>
+          </p:cNvSpPr>
+          <p:nvPr>
+            <p:ph idx="1"/>
+          </p:nvPr>
+        </p:nvSpPr>
+        <p:spPr/>
+        <p:txBody>
+          <a:bodyPr>
+            <a:normAutofit fontScale="55000" lnSpcReduction="20000"/>
+          </a:bodyPr>
+          <a:lstStyle/>
+          <a:p>
+            <a:r>
+              <a:rPr lang="en-US" sz="2300" dirty="0"/>
+              <a:t>Define the factors (taken from Kouros and </a:t>
+            </a:r>
+            <a:r>
+              <a:rPr lang="en-US" sz="2300" dirty="0" err="1"/>
+              <a:t>Abrami</a:t>
+            </a:r>
+            <a:r>
+              <a:rPr lang="en-US" sz="2300" dirty="0"/>
+              <a:t>, and cross-reference with the asked questions)</a:t>
+            </a:r>
+          </a:p>
+          <a:p>
+            <a:pPr lvl="1"/>
+            <a:r>
+              <a:rPr lang="en-US" sz="1600" dirty="0"/>
+              <a:t>Quality of product and process</a:t>
+            </a:r>
+          </a:p>
+          <a:p>
+            <a:pPr lvl="2"/>
+            <a:r>
+              <a:rPr lang="en-US" sz="1200" dirty="0"/>
+              <a:t>['When I work in a group, I do higher quality work.', 'The material is easier to understand when I work with other students.’, 'My group members help explain things that I do not understand.', 'I feel working in groups is a waste of time.', #'The work takes more time to complete when I work with other students.’,  'The workload is usually less when I work with other students.’]</a:t>
+            </a:r>
+          </a:p>
+          <a:p>
+            <a:pPr lvl="1"/>
+            <a:r>
+              <a:rPr lang="en-US" sz="1600" dirty="0"/>
+              <a:t>Peer support</a:t>
+            </a:r>
+          </a:p>
+          <a:p>
+            <a:pPr lvl="2"/>
+            <a:r>
+              <a:rPr lang="en-US" sz="1200" dirty="0"/>
+              <a:t>['My group members respect my opinions.', 'My group members make me feel that I am not as smart as they are.', 'My group members do not care about my feelings.’, 'I feel I am part of what is going on in the group.', 'When I work in a group, I am able to share my ideas.']</a:t>
+            </a:r>
+          </a:p>
+          <a:p>
+            <a:pPr lvl="1"/>
+            <a:r>
+              <a:rPr lang="en-US" sz="1600" dirty="0"/>
+              <a:t>Student interdependence</a:t>
+            </a:r>
+          </a:p>
+          <a:p>
+            <a:pPr lvl="2"/>
+            <a:r>
+              <a:rPr lang="en-US" sz="1200" dirty="0"/>
+              <a:t>['Everyone’s ideas are needed if we are going to be successful.', 'We cannot complete the assignment unless everyone contributes.', 'I let the other students do most of the work.’, 'I also learn when I teach the material to my group members.', 'I learn to work with students who are different from me.']</a:t>
+            </a:r>
+          </a:p>
+          <a:p>
+            <a:pPr lvl="1"/>
+            <a:r>
+              <a:rPr lang="en-US" sz="1600" dirty="0"/>
+              <a:t>Frustration with group members</a:t>
+            </a:r>
+          </a:p>
+          <a:p>
+            <a:pPr lvl="2"/>
+            <a:r>
+              <a:rPr lang="en-US" sz="1200" dirty="0"/>
+              <a:t>['I become frustrated when my group members do not understand the material.', 'When I work with other students, we spend too much time talking about other things.', 'I have to work with students who are not as smart as I am.']</a:t>
+            </a:r>
+          </a:p>
+          <a:p>
+            <a:pPr lvl="1"/>
+            <a:r>
+              <a:rPr lang="en-US" sz="1600" dirty="0"/>
+              <a:t>Total 19 questions </a:t>
+            </a:r>
+          </a:p>
+          <a:p>
+            <a:r>
+              <a:rPr lang="en-US" sz="2200" dirty="0"/>
+              <a:t>Pass the data through the factors:</a:t>
+            </a:r>
+          </a:p>
+          <a:p>
+            <a:pPr lvl="1"/>
+            <a:r>
+              <a:rPr lang="en-US" sz="1600" dirty="0"/>
+              <a:t>SAGE_CFA.csv, .</a:t>
+            </a:r>
+            <a:r>
+              <a:rPr lang="en-US" sz="1600" dirty="0" err="1"/>
+              <a:t>png</a:t>
+            </a:r>
+            <a:endParaRPr lang="en-US" sz="1600" dirty="0"/>
+          </a:p>
+          <a:p>
+            <a:pPr lvl="1"/>
+            <a:endParaRPr lang="en-US" sz="1600" dirty="0"/>
+          </a:p>
+          <a:p>
+            <a:r>
+              <a:rPr lang="en-US" sz="2200" b="0" i="0" u="none" strike="noStrike" baseline="0" dirty="0"/>
+              <a:t>“The four factors extracted with principal components analysis (with varimax rotation) accounted for 46.10% of the total variance in the data (eigenvalues ranged from 13.90 to 2.04). Items that failed to load .40 or higher were deleted, as well as, items that loaded on more than one factor. Ultimately, 11 items were eliminated from the SAGE questionnaire (items 2, 3, 15, 18, 21, 22, 24, 35, 39, 42, and 51).”</a:t>
+            </a:r>
+          </a:p>
+          <a:p>
+            <a:endParaRPr lang="en-US" sz="2200" dirty="0"/>
+          </a:p>
+          <a:p>
+            <a:r>
+              <a:rPr lang="en-US" sz="2200" dirty="0"/>
+              <a:t>*The python package fails to converge so we use R instead </a:t>
+            </a:r>
+          </a:p>
+        </p:txBody>
+      </p:sp>
+    </p:spTree>
+    <p:extLst>
+      <p:ext uri="{BB962C8B-B14F-4D97-AF65-F5344CB8AC3E}">
+        <p14:creationId xmlns:p14="http://schemas.microsoft.com/office/powerpoint/2010/main" val="2789904357"/>
+      </p:ext>
+    </p:extLst>
+  </p:cSld>
+  <p:clrMapOvr>
+    <a:masterClrMapping/>
+  </p:clrMapOvr>
+</p:sld>
+</file>
+
+<file path=ppt/slides/slide30.xml><?xml version="1.0" encoding="utf-8"?>
 <p:sld xmlns:a="http://schemas.openxmlformats.org/drawingml/2006/main" xmlns:r="http://schemas.openxmlformats.org/officeDocument/2006/relationships" xmlns:p="http://schemas.openxmlformats.org/presentationml/2006/main">
   <p:cSld>
     <p:spTree>
@@ -12787,205 +13486,7 @@
 </p:sld>
 </file>
 
-<file path=ppt/slides/slide3.xml><?xml version="1.0" encoding="utf-8"?>
-<p:sld xmlns:a="http://schemas.openxmlformats.org/drawingml/2006/main" xmlns:r="http://schemas.openxmlformats.org/officeDocument/2006/relationships" xmlns:p="http://schemas.openxmlformats.org/presentationml/2006/main">
-  <p:cSld>
-    <p:spTree>
-      <p:nvGrpSpPr>
-        <p:cNvPr id="1" name=""/>
-        <p:cNvGrpSpPr/>
-        <p:nvPr/>
-      </p:nvGrpSpPr>
-      <p:grpSpPr>
-        <a:xfrm>
-          <a:off x="0" y="0"/>
-          <a:ext cx="0" cy="0"/>
-          <a:chOff x="0" y="0"/>
-          <a:chExt cx="0" cy="0"/>
-        </a:xfrm>
-      </p:grpSpPr>
-      <p:sp>
-        <p:nvSpPr>
-          <p:cNvPr id="6" name="Title 5">
-            <a:extLst>
-              <a:ext uri="{FF2B5EF4-FFF2-40B4-BE49-F238E27FC236}">
-                <a16:creationId xmlns:a16="http://schemas.microsoft.com/office/drawing/2014/main" id="{30712870-2CAF-45CA-9FFD-0087F78E9339}"/>
-              </a:ext>
-            </a:extLst>
-          </p:cNvPr>
-          <p:cNvSpPr>
-            <a:spLocks noGrp="1"/>
-          </p:cNvSpPr>
-          <p:nvPr>
-            <p:ph type="title"/>
-          </p:nvPr>
-        </p:nvSpPr>
-        <p:spPr/>
-        <p:txBody>
-          <a:bodyPr>
-            <a:normAutofit/>
-          </a:bodyPr>
-          <a:lstStyle/>
-          <a:p>
-            <a:r>
-              <a:rPr lang="en-US" sz="3200" dirty="0"/>
-              <a:t>Confirmatory Factor Analysis</a:t>
-            </a:r>
-          </a:p>
-        </p:txBody>
-      </p:sp>
-      <p:sp>
-        <p:nvSpPr>
-          <p:cNvPr id="7" name="Content Placeholder 6">
-            <a:extLst>
-              <a:ext uri="{FF2B5EF4-FFF2-40B4-BE49-F238E27FC236}">
-                <a16:creationId xmlns:a16="http://schemas.microsoft.com/office/drawing/2014/main" id="{9114D3AD-6DF6-4C88-942E-9CAEC7F33550}"/>
-              </a:ext>
-            </a:extLst>
-          </p:cNvPr>
-          <p:cNvSpPr>
-            <a:spLocks noGrp="1"/>
-          </p:cNvSpPr>
-          <p:nvPr>
-            <p:ph idx="1"/>
-          </p:nvPr>
-        </p:nvSpPr>
-        <p:spPr/>
-        <p:txBody>
-          <a:bodyPr>
-            <a:normAutofit fontScale="55000" lnSpcReduction="20000"/>
-          </a:bodyPr>
-          <a:lstStyle/>
-          <a:p>
-            <a:r>
-              <a:rPr lang="en-US" sz="2300" dirty="0"/>
-              <a:t>Define the factors (taken from Kouros and </a:t>
-            </a:r>
-            <a:r>
-              <a:rPr lang="en-US" sz="2300" dirty="0" err="1"/>
-              <a:t>Abrami</a:t>
-            </a:r>
-            <a:r>
-              <a:rPr lang="en-US" sz="2300" dirty="0"/>
-              <a:t>, and cross-reference with the asked questions)</a:t>
-            </a:r>
-          </a:p>
-          <a:p>
-            <a:pPr lvl="1"/>
-            <a:r>
-              <a:rPr lang="en-US" sz="1600" dirty="0"/>
-              <a:t>Quality of product and process</a:t>
-            </a:r>
-          </a:p>
-          <a:p>
-            <a:pPr lvl="2"/>
-            <a:r>
-              <a:rPr lang="en-US" sz="1200" dirty="0"/>
-              <a:t>['When I work in a group, I do higher quality work.', 'The material is easier to understand when I work with other students.’, 'My group members help explain things that I do not understand.', 'I feel working in groups is a waste of time.', #'The work takes more time to complete when I work with other students.’,  'The workload is usually less when I work with other students.’]</a:t>
-            </a:r>
-          </a:p>
-          <a:p>
-            <a:pPr lvl="1"/>
-            <a:r>
-              <a:rPr lang="en-US" sz="1600" dirty="0"/>
-              <a:t>Peer support</a:t>
-            </a:r>
-          </a:p>
-          <a:p>
-            <a:pPr lvl="2"/>
-            <a:r>
-              <a:rPr lang="en-US" sz="1200" dirty="0"/>
-              <a:t>['My group members respect my opinions.', 'My group members make me feel that I am not as smart as they are.', 'My group members do not care about my feelings.’, 'I feel I am part of what is going on in the group.', 'When I work in a group, I am able to share my ideas.']</a:t>
-            </a:r>
-          </a:p>
-          <a:p>
-            <a:pPr lvl="1"/>
-            <a:r>
-              <a:rPr lang="en-US" sz="1600" dirty="0"/>
-              <a:t>Student interdependence</a:t>
-            </a:r>
-          </a:p>
-          <a:p>
-            <a:pPr lvl="2"/>
-            <a:r>
-              <a:rPr lang="en-US" sz="1200" dirty="0"/>
-              <a:t>['Everyone’s ideas are needed if we are going to be successful.', 'We cannot complete the assignment unless everyone contributes.', 'I let the other students do most of the work.’, 'I also learn when I teach the material to my group members.', 'I learn to work with students who are different from me.']</a:t>
-            </a:r>
-          </a:p>
-          <a:p>
-            <a:pPr lvl="1"/>
-            <a:r>
-              <a:rPr lang="en-US" sz="1600" dirty="0"/>
-              <a:t>Frustration with group members</a:t>
-            </a:r>
-          </a:p>
-          <a:p>
-            <a:pPr lvl="2"/>
-            <a:r>
-              <a:rPr lang="en-US" sz="1200" dirty="0"/>
-              <a:t>['I become frustrated when my group members do not understand the material.', 'When I work with other students, we spend too much time talking about other things.', 'I have to work with students who are not as smart as I am.']</a:t>
-            </a:r>
-          </a:p>
-          <a:p>
-            <a:pPr lvl="1"/>
-            <a:r>
-              <a:rPr lang="en-US" sz="1600" dirty="0"/>
-              <a:t>Total 19 questions </a:t>
-            </a:r>
-          </a:p>
-          <a:p>
-            <a:r>
-              <a:rPr lang="en-US" sz="2200" dirty="0"/>
-              <a:t>Pass the data through the factors:</a:t>
-            </a:r>
-          </a:p>
-          <a:p>
-            <a:pPr lvl="1"/>
-            <a:r>
-              <a:rPr lang="en-US" sz="1600" dirty="0"/>
-              <a:t>SAGE_CFA.csv, .</a:t>
-            </a:r>
-            <a:r>
-              <a:rPr lang="en-US" sz="1600" dirty="0" err="1"/>
-              <a:t>png</a:t>
-            </a:r>
-            <a:endParaRPr lang="en-US" sz="1600" dirty="0"/>
-          </a:p>
-          <a:p>
-            <a:pPr lvl="1"/>
-            <a:endParaRPr lang="en-US" sz="1600" dirty="0"/>
-          </a:p>
-          <a:p>
-            <a:r>
-              <a:rPr lang="en-US" sz="2200" b="0" i="0" u="none" strike="noStrike" baseline="0" dirty="0"/>
-              <a:t>“The four factors extracted with principal components analysis (with varimax rotation) accounted for 46.10% of the total variance in the data (eigenvalues ranged from 13.90 to 2.04). Items that failed to load .40 or higher were deleted, as well as, items that loaded on more than one factor. Ultimately, 11 items were eliminated from the SAGE questionnaire (items 2, 3, 15, 18, 21, 22, 24, 35, 39, 42, and 51).”</a:t>
-            </a:r>
-          </a:p>
-          <a:p>
-            <a:endParaRPr lang="en-US" sz="2200" dirty="0"/>
-          </a:p>
-          <a:p>
-            <a:r>
-              <a:rPr lang="en-US" sz="2200" dirty="0"/>
-              <a:t>*The python package fails to converge so we use R instead </a:t>
-            </a:r>
-          </a:p>
-        </p:txBody>
-      </p:sp>
-    </p:spTree>
-    <p:extLst>
-      <p:ext uri="{BB962C8B-B14F-4D97-AF65-F5344CB8AC3E}">
-        <p14:creationId xmlns:p14="http://schemas.microsoft.com/office/powerpoint/2010/main" val="2789904357"/>
-      </p:ext>
-    </p:extLst>
-  </p:cSld>
-  <p:clrMapOvr>
-    <a:masterClrMapping/>
-  </p:clrMapOvr>
-</p:sld>
-</file>
-
-<file path=ppt/slides/slide30.xml><?xml version="1.0" encoding="utf-8"?>
+<file path=ppt/slides/slide31.xml><?xml version="1.0" encoding="utf-8"?>
 <p:sld xmlns:a="http://schemas.openxmlformats.org/drawingml/2006/main" xmlns:r="http://schemas.openxmlformats.org/officeDocument/2006/relationships" xmlns:p="http://schemas.openxmlformats.org/presentationml/2006/main">
   <p:cSld>
     <p:spTree>
@@ -13075,7 +13576,7 @@
 </p:sld>
 </file>
 
-<file path=ppt/slides/slide31.xml><?xml version="1.0" encoding="utf-8"?>
+<file path=ppt/slides/slide32.xml><?xml version="1.0" encoding="utf-8"?>
 <p:sld xmlns:a="http://schemas.openxmlformats.org/drawingml/2006/main" xmlns:r="http://schemas.openxmlformats.org/officeDocument/2006/relationships" xmlns:p="http://schemas.openxmlformats.org/presentationml/2006/main" show="0">
   <p:cSld>
     <p:spTree>
@@ -13335,7 +13836,7 @@
 </p:sld>
 </file>
 
-<file path=ppt/slides/slide32.xml><?xml version="1.0" encoding="utf-8"?>
+<file path=ppt/slides/slide33.xml><?xml version="1.0" encoding="utf-8"?>
 <p:sld xmlns:a="http://schemas.openxmlformats.org/drawingml/2006/main" xmlns:r="http://schemas.openxmlformats.org/officeDocument/2006/relationships" xmlns:p="http://schemas.openxmlformats.org/presentationml/2006/main" show="0">
   <p:cSld>
     <p:spTree>
@@ -13720,7 +14221,7 @@
 </p:sld>
 </file>
 
-<file path=ppt/slides/slide33.xml><?xml version="1.0" encoding="utf-8"?>
+<file path=ppt/slides/slide34.xml><?xml version="1.0" encoding="utf-8"?>
 <p:sld xmlns:a="http://schemas.openxmlformats.org/drawingml/2006/main" xmlns:r="http://schemas.openxmlformats.org/officeDocument/2006/relationships" xmlns:p="http://schemas.openxmlformats.org/presentationml/2006/main" show="0">
   <p:cSld>
     <p:spTree>
@@ -14069,7 +14570,7 @@
 </p:sld>
 </file>
 
-<file path=ppt/slides/slide34.xml><?xml version="1.0" encoding="utf-8"?>
+<file path=ppt/slides/slide35.xml><?xml version="1.0" encoding="utf-8"?>
 <p:sld xmlns:a="http://schemas.openxmlformats.org/drawingml/2006/main" xmlns:r="http://schemas.openxmlformats.org/officeDocument/2006/relationships" xmlns:p="http://schemas.openxmlformats.org/presentationml/2006/main" show="0">
   <p:cSld>
     <p:spTree>
@@ -14434,7 +14935,7 @@
 </p:sld>
 </file>
 
-<file path=ppt/slides/slide35.xml><?xml version="1.0" encoding="utf-8"?>
+<file path=ppt/slides/slide36.xml><?xml version="1.0" encoding="utf-8"?>
 <p:sld xmlns:a="http://schemas.openxmlformats.org/drawingml/2006/main" xmlns:r="http://schemas.openxmlformats.org/officeDocument/2006/relationships" xmlns:p="http://schemas.openxmlformats.org/presentationml/2006/main" show="0">
   <p:cSld>
     <p:spTree>
@@ -14793,7 +15294,7 @@
 </p:sld>
 </file>
 
-<file path=ppt/slides/slide36.xml><?xml version="1.0" encoding="utf-8"?>
+<file path=ppt/slides/slide37.xml><?xml version="1.0" encoding="utf-8"?>
 <p:sld xmlns:a="http://schemas.openxmlformats.org/drawingml/2006/main" xmlns:r="http://schemas.openxmlformats.org/officeDocument/2006/relationships" xmlns:p="http://schemas.openxmlformats.org/presentationml/2006/main" show="0">
   <p:cSld>
     <p:spTree>
@@ -15155,7 +15656,7 @@
 </p:sld>
 </file>
 
-<file path=ppt/slides/slide37.xml><?xml version="1.0" encoding="utf-8"?>
+<file path=ppt/slides/slide38.xml><?xml version="1.0" encoding="utf-8"?>
 <p:sld xmlns:a="http://schemas.openxmlformats.org/drawingml/2006/main" xmlns:r="http://schemas.openxmlformats.org/officeDocument/2006/relationships" xmlns:p="http://schemas.openxmlformats.org/presentationml/2006/main" show="0">
   <p:cSld>
     <p:spTree>
@@ -15621,7 +16122,7 @@
 </p:sld>
 </file>
 
-<file path=ppt/slides/slide38.xml><?xml version="1.0" encoding="utf-8"?>
+<file path=ppt/slides/slide39.xml><?xml version="1.0" encoding="utf-8"?>
 <p:sld xmlns:a="http://schemas.openxmlformats.org/drawingml/2006/main" xmlns:r="http://schemas.openxmlformats.org/officeDocument/2006/relationships" xmlns:p="http://schemas.openxmlformats.org/presentationml/2006/main" show="0">
   <p:cSld>
     <p:spTree>
@@ -15766,7 +16267,115 @@
 </p:sld>
 </file>
 
-<file path=ppt/slides/slide39.xml><?xml version="1.0" encoding="utf-8"?>
+<file path=ppt/slides/slide4.xml><?xml version="1.0" encoding="utf-8"?>
+<p:sld xmlns:a="http://schemas.openxmlformats.org/drawingml/2006/main" xmlns:r="http://schemas.openxmlformats.org/officeDocument/2006/relationships" xmlns:p="http://schemas.openxmlformats.org/presentationml/2006/main">
+  <p:cSld>
+    <p:spTree>
+      <p:nvGrpSpPr>
+        <p:cNvPr id="1" name=""/>
+        <p:cNvGrpSpPr/>
+        <p:nvPr/>
+      </p:nvGrpSpPr>
+      <p:grpSpPr>
+        <a:xfrm>
+          <a:off x="0" y="0"/>
+          <a:ext cx="0" cy="0"/>
+          <a:chOff x="0" y="0"/>
+          <a:chExt cx="0" cy="0"/>
+        </a:xfrm>
+      </p:grpSpPr>
+      <p:sp>
+        <p:nvSpPr>
+          <p:cNvPr id="6" name="Title 5">
+            <a:extLst>
+              <a:ext uri="{FF2B5EF4-FFF2-40B4-BE49-F238E27FC236}">
+                <a16:creationId xmlns:a16="http://schemas.microsoft.com/office/drawing/2014/main" id="{30712870-2CAF-45CA-9FFD-0087F78E9339}"/>
+              </a:ext>
+            </a:extLst>
+          </p:cNvPr>
+          <p:cNvSpPr>
+            <a:spLocks noGrp="1"/>
+          </p:cNvSpPr>
+          <p:nvPr>
+            <p:ph type="title"/>
+          </p:nvPr>
+        </p:nvSpPr>
+        <p:spPr/>
+        <p:txBody>
+          <a:bodyPr>
+            <a:normAutofit/>
+          </a:bodyPr>
+          <a:lstStyle/>
+          <a:p>
+            <a:r>
+              <a:rPr lang="en-US" sz="3200" dirty="0"/>
+              <a:t>Confirmatory Factor Analysis</a:t>
+            </a:r>
+          </a:p>
+        </p:txBody>
+      </p:sp>
+      <p:sp>
+        <p:nvSpPr>
+          <p:cNvPr id="7" name="Content Placeholder 6">
+            <a:extLst>
+              <a:ext uri="{FF2B5EF4-FFF2-40B4-BE49-F238E27FC236}">
+                <a16:creationId xmlns:a16="http://schemas.microsoft.com/office/drawing/2014/main" id="{9114D3AD-6DF6-4C88-942E-9CAEC7F33550}"/>
+              </a:ext>
+            </a:extLst>
+          </p:cNvPr>
+          <p:cNvSpPr>
+            <a:spLocks noGrp="1"/>
+          </p:cNvSpPr>
+          <p:nvPr>
+            <p:ph idx="1"/>
+          </p:nvPr>
+        </p:nvSpPr>
+        <p:spPr/>
+        <p:txBody>
+          <a:bodyPr>
+            <a:normAutofit/>
+          </a:bodyPr>
+          <a:lstStyle/>
+          <a:p>
+            <a:r>
+              <a:rPr lang="en-US" sz="2200" dirty="0"/>
+              <a:t>CFI = 0.875</a:t>
+            </a:r>
+          </a:p>
+          <a:p>
+            <a:r>
+              <a:rPr lang="en-US" sz="2200" dirty="0"/>
+              <a:t>TLI = 0.854</a:t>
+            </a:r>
+          </a:p>
+          <a:p>
+            <a:r>
+              <a:rPr lang="en-US" sz="2200" dirty="0"/>
+              <a:t>RMSEA = 0.060</a:t>
+            </a:r>
+          </a:p>
+          <a:p>
+            <a:endParaRPr lang="en-US" sz="2200" dirty="0"/>
+          </a:p>
+          <a:p>
+            <a:endParaRPr lang="en-US" sz="2200" dirty="0"/>
+          </a:p>
+        </p:txBody>
+      </p:sp>
+    </p:spTree>
+    <p:extLst>
+      <p:ext uri="{BB962C8B-B14F-4D97-AF65-F5344CB8AC3E}">
+        <p14:creationId xmlns:p14="http://schemas.microsoft.com/office/powerpoint/2010/main" val="1525089356"/>
+      </p:ext>
+    </p:extLst>
+  </p:cSld>
+  <p:clrMapOvr>
+    <a:masterClrMapping/>
+  </p:clrMapOvr>
+</p:sld>
+</file>
+
+<file path=ppt/slides/slide40.xml><?xml version="1.0" encoding="utf-8"?>
 <p:sld xmlns:a="http://schemas.openxmlformats.org/drawingml/2006/main" xmlns:r="http://schemas.openxmlformats.org/officeDocument/2006/relationships" xmlns:p="http://schemas.openxmlformats.org/presentationml/2006/main" show="0">
   <p:cSld>
     <p:spTree>
@@ -15982,115 +16591,7 @@
 </p:sld>
 </file>
 
-<file path=ppt/slides/slide4.xml><?xml version="1.0" encoding="utf-8"?>
-<p:sld xmlns:a="http://schemas.openxmlformats.org/drawingml/2006/main" xmlns:r="http://schemas.openxmlformats.org/officeDocument/2006/relationships" xmlns:p="http://schemas.openxmlformats.org/presentationml/2006/main">
-  <p:cSld>
-    <p:spTree>
-      <p:nvGrpSpPr>
-        <p:cNvPr id="1" name=""/>
-        <p:cNvGrpSpPr/>
-        <p:nvPr/>
-      </p:nvGrpSpPr>
-      <p:grpSpPr>
-        <a:xfrm>
-          <a:off x="0" y="0"/>
-          <a:ext cx="0" cy="0"/>
-          <a:chOff x="0" y="0"/>
-          <a:chExt cx="0" cy="0"/>
-        </a:xfrm>
-      </p:grpSpPr>
-      <p:sp>
-        <p:nvSpPr>
-          <p:cNvPr id="6" name="Title 5">
-            <a:extLst>
-              <a:ext uri="{FF2B5EF4-FFF2-40B4-BE49-F238E27FC236}">
-                <a16:creationId xmlns:a16="http://schemas.microsoft.com/office/drawing/2014/main" id="{30712870-2CAF-45CA-9FFD-0087F78E9339}"/>
-              </a:ext>
-            </a:extLst>
-          </p:cNvPr>
-          <p:cNvSpPr>
-            <a:spLocks noGrp="1"/>
-          </p:cNvSpPr>
-          <p:nvPr>
-            <p:ph type="title"/>
-          </p:nvPr>
-        </p:nvSpPr>
-        <p:spPr/>
-        <p:txBody>
-          <a:bodyPr>
-            <a:normAutofit/>
-          </a:bodyPr>
-          <a:lstStyle/>
-          <a:p>
-            <a:r>
-              <a:rPr lang="en-US" sz="3200" dirty="0"/>
-              <a:t>Confirmatory Factor Analysis</a:t>
-            </a:r>
-          </a:p>
-        </p:txBody>
-      </p:sp>
-      <p:sp>
-        <p:nvSpPr>
-          <p:cNvPr id="7" name="Content Placeholder 6">
-            <a:extLst>
-              <a:ext uri="{FF2B5EF4-FFF2-40B4-BE49-F238E27FC236}">
-                <a16:creationId xmlns:a16="http://schemas.microsoft.com/office/drawing/2014/main" id="{9114D3AD-6DF6-4C88-942E-9CAEC7F33550}"/>
-              </a:ext>
-            </a:extLst>
-          </p:cNvPr>
-          <p:cNvSpPr>
-            <a:spLocks noGrp="1"/>
-          </p:cNvSpPr>
-          <p:nvPr>
-            <p:ph idx="1"/>
-          </p:nvPr>
-        </p:nvSpPr>
-        <p:spPr/>
-        <p:txBody>
-          <a:bodyPr>
-            <a:normAutofit/>
-          </a:bodyPr>
-          <a:lstStyle/>
-          <a:p>
-            <a:r>
-              <a:rPr lang="en-US" sz="2200" dirty="0"/>
-              <a:t>CFI = 0.875</a:t>
-            </a:r>
-          </a:p>
-          <a:p>
-            <a:r>
-              <a:rPr lang="en-US" sz="2200" dirty="0"/>
-              <a:t>TLI = 0.854</a:t>
-            </a:r>
-          </a:p>
-          <a:p>
-            <a:r>
-              <a:rPr lang="en-US" sz="2200" dirty="0"/>
-              <a:t>RMSEA = 0.060</a:t>
-            </a:r>
-          </a:p>
-          <a:p>
-            <a:endParaRPr lang="en-US" sz="2200" dirty="0"/>
-          </a:p>
-          <a:p>
-            <a:endParaRPr lang="en-US" sz="2200" dirty="0"/>
-          </a:p>
-        </p:txBody>
-      </p:sp>
-    </p:spTree>
-    <p:extLst>
-      <p:ext uri="{BB962C8B-B14F-4D97-AF65-F5344CB8AC3E}">
-        <p14:creationId xmlns:p14="http://schemas.microsoft.com/office/powerpoint/2010/main" val="1525089356"/>
-      </p:ext>
-    </p:extLst>
-  </p:cSld>
-  <p:clrMapOvr>
-    <a:masterClrMapping/>
-  </p:clrMapOvr>
-</p:sld>
-</file>
-
-<file path=ppt/slides/slide40.xml><?xml version="1.0" encoding="utf-8"?>
+<file path=ppt/slides/slide41.xml><?xml version="1.0" encoding="utf-8"?>
 <p:sld xmlns:a="http://schemas.openxmlformats.org/drawingml/2006/main" xmlns:r="http://schemas.openxmlformats.org/officeDocument/2006/relationships" xmlns:p="http://schemas.openxmlformats.org/presentationml/2006/main" show="0">
   <p:cSld>
     <p:spTree>

</xml_diff>